<commit_message>
updated ppt, temporarely deleted pdf
</commit_message>
<xml_diff>
--- a/Preparation files/MyTEDx Presentazione.pptx
+++ b/Preparation files/MyTEDx Presentazione.pptx
@@ -4101,7 +4101,7 @@
         </p:nvSpPr>
         <p:spPr>
           <a:xfrm>
-            <a:off x="7818725" y="2060834"/>
+            <a:off x="9003349" y="2026426"/>
             <a:ext cx="2701255" cy="2633303"/>
           </a:xfrm>
           <a:prstGeom prst="roundRect">
@@ -4296,7 +4296,7 @@
           <a:lstStyle/>
           <a:p>
             <a:r>
-              <a:rPr lang="it-IT" sz="4000">
+              <a:rPr lang="it-IT" sz="4000" dirty="0">
                 <a:solidFill>
                   <a:srgbClr val="FFFFFF"/>
                 </a:solidFill>
@@ -4360,10 +4360,10 @@
       </p:cxnSp>
       <p:pic>
         <p:nvPicPr>
-          <p:cNvPr id="5" name="Immagine 4">
-            <a:extLst>
-              <a:ext uri="{FF2B5EF4-FFF2-40B4-BE49-F238E27FC236}">
-                <a16:creationId xmlns:a16="http://schemas.microsoft.com/office/drawing/2014/main" id="{A08FD8E2-99A2-4A7A-AE7B-813A237967E1}"/>
+          <p:cNvPr id="9" name="Immagine 8">
+            <a:extLst>
+              <a:ext uri="{FF2B5EF4-FFF2-40B4-BE49-F238E27FC236}">
+                <a16:creationId xmlns:a16="http://schemas.microsoft.com/office/drawing/2014/main" id="{1C54A33D-C933-4674-8AF5-D2D073FA0E01}"/>
               </a:ext>
             </a:extLst>
           </p:cNvPr>
@@ -4380,18 +4380,31 @@
         </p:blipFill>
         <p:spPr>
           <a:xfrm>
-            <a:off x="3667382" y="290074"/>
-            <a:ext cx="8383170" cy="6277851"/>
+            <a:off x="4536342" y="134191"/>
+            <a:ext cx="7455276" cy="6589617"/>
           </a:xfrm>
           <a:prstGeom prst="rect">
             <a:avLst/>
           </a:prstGeom>
-          <a:ln w="28575">
-            <a:solidFill>
-              <a:schemeClr val="accent1"/>
-            </a:solidFill>
+          <a:noFill/>
+          <a:ln>
+            <a:noFill/>
           </a:ln>
         </p:spPr>
+        <p:style>
+          <a:lnRef idx="2">
+            <a:schemeClr val="dk1"/>
+          </a:lnRef>
+          <a:fillRef idx="1">
+            <a:schemeClr val="lt1"/>
+          </a:fillRef>
+          <a:effectRef idx="0">
+            <a:schemeClr val="dk1"/>
+          </a:effectRef>
+          <a:fontRef idx="minor">
+            <a:schemeClr val="dk1"/>
+          </a:fontRef>
+        </p:style>
       </p:pic>
     </p:spTree>
     <p:extLst>

</xml_diff>

<commit_message>
ppt updated first homework
</commit_message>
<xml_diff>
--- a/Preparation files/MyTEDx Presentazione.pptx
+++ b/Preparation files/MyTEDx Presentazione.pptx
@@ -11,6 +11,8 @@
     <p:sldId id="258" r:id="rId5"/>
     <p:sldId id="259" r:id="rId6"/>
     <p:sldId id="260" r:id="rId7"/>
+    <p:sldId id="263" r:id="rId8"/>
+    <p:sldId id="264" r:id="rId9"/>
   </p:sldIdLst>
   <p:sldSz cx="12192000" cy="6858000"/>
   <p:notesSz cx="6858000" cy="9144000"/>
@@ -117,6 +119,3625 @@
 </p:presentation>
 </file>
 
+<file path=ppt/diagrams/colors1.xml><?xml version="1.0" encoding="utf-8"?>
+<dgm:colorsDef xmlns:dgm="http://schemas.openxmlformats.org/drawingml/2006/diagram" xmlns:a="http://schemas.openxmlformats.org/drawingml/2006/main" uniqueId="urn:microsoft.com/office/officeart/2018/5/colors/Iconchunking_neutralicontext_colorful1">
+  <dgm:title val=""/>
+  <dgm:desc val=""/>
+  <dgm:catLst>
+    <dgm:cat type="colorful" pri="10100"/>
+  </dgm:catLst>
+  <dgm:styleLbl name="node0">
+    <dgm:fillClrLst meth="repeat">
+      <a:schemeClr val="accent1"/>
+    </dgm:fillClrLst>
+    <dgm:linClrLst meth="repeat">
+      <a:schemeClr val="lt1"/>
+    </dgm:linClrLst>
+    <dgm:effectClrLst/>
+    <dgm:txLinClrLst/>
+    <dgm:txFillClrLst/>
+    <dgm:txEffectClrLst/>
+  </dgm:styleLbl>
+  <dgm:styleLbl name="node1">
+    <dgm:fillClrLst meth="repeat">
+      <a:schemeClr val="bg1"/>
+    </dgm:fillClrLst>
+    <dgm:linClrLst meth="repeat">
+      <a:schemeClr val="lt1">
+        <a:alpha val="0"/>
+      </a:schemeClr>
+    </dgm:linClrLst>
+    <dgm:effectClrLst/>
+    <dgm:txLinClrLst/>
+    <dgm:txFillClrLst meth="repeat">
+      <a:schemeClr val="dk1"/>
+    </dgm:txFillClrLst>
+    <dgm:txEffectClrLst/>
+  </dgm:styleLbl>
+  <dgm:styleLbl name="alignNode1">
+    <dgm:fillClrLst meth="repeat">
+      <a:schemeClr val="accent2"/>
+      <a:schemeClr val="accent3"/>
+      <a:schemeClr val="accent4"/>
+      <a:schemeClr val="accent5"/>
+      <a:schemeClr val="accent6"/>
+    </dgm:fillClrLst>
+    <dgm:linClrLst meth="repeat">
+      <a:schemeClr val="accent2"/>
+      <a:schemeClr val="accent3"/>
+      <a:schemeClr val="accent4"/>
+      <a:schemeClr val="accent5"/>
+      <a:schemeClr val="accent6"/>
+    </dgm:linClrLst>
+    <dgm:effectClrLst/>
+    <dgm:txLinClrLst/>
+    <dgm:txFillClrLst/>
+    <dgm:txEffectClrLst/>
+  </dgm:styleLbl>
+  <dgm:styleLbl name="lnNode1">
+    <dgm:fillClrLst meth="repeat">
+      <a:schemeClr val="accent2"/>
+      <a:schemeClr val="accent3"/>
+      <a:schemeClr val="accent4"/>
+      <a:schemeClr val="accent5"/>
+      <a:schemeClr val="accent6"/>
+    </dgm:fillClrLst>
+    <dgm:linClrLst meth="repeat">
+      <a:schemeClr val="lt1"/>
+    </dgm:linClrLst>
+    <dgm:effectClrLst/>
+    <dgm:txLinClrLst/>
+    <dgm:txFillClrLst/>
+    <dgm:txEffectClrLst/>
+  </dgm:styleLbl>
+  <dgm:styleLbl name="vennNode1">
+    <dgm:fillClrLst meth="repeat">
+      <a:schemeClr val="accent2">
+        <a:alpha val="50000"/>
+      </a:schemeClr>
+      <a:schemeClr val="accent3">
+        <a:alpha val="50000"/>
+      </a:schemeClr>
+      <a:schemeClr val="accent4">
+        <a:alpha val="50000"/>
+      </a:schemeClr>
+      <a:schemeClr val="accent5">
+        <a:alpha val="50000"/>
+      </a:schemeClr>
+      <a:schemeClr val="accent6">
+        <a:alpha val="50000"/>
+      </a:schemeClr>
+    </dgm:fillClrLst>
+    <dgm:linClrLst meth="repeat">
+      <a:schemeClr val="lt1"/>
+    </dgm:linClrLst>
+    <dgm:effectClrLst/>
+    <dgm:txLinClrLst/>
+    <dgm:txFillClrLst/>
+    <dgm:txEffectClrLst/>
+  </dgm:styleLbl>
+  <dgm:styleLbl name="node2">
+    <dgm:fillClrLst>
+      <a:schemeClr val="accent2"/>
+    </dgm:fillClrLst>
+    <dgm:linClrLst meth="repeat">
+      <a:schemeClr val="lt1"/>
+    </dgm:linClrLst>
+    <dgm:effectClrLst/>
+    <dgm:txLinClrLst/>
+    <dgm:txFillClrLst/>
+    <dgm:txEffectClrLst/>
+  </dgm:styleLbl>
+  <dgm:styleLbl name="node3">
+    <dgm:fillClrLst>
+      <a:schemeClr val="accent3"/>
+    </dgm:fillClrLst>
+    <dgm:linClrLst meth="repeat">
+      <a:schemeClr val="lt1"/>
+    </dgm:linClrLst>
+    <dgm:effectClrLst/>
+    <dgm:txLinClrLst/>
+    <dgm:txFillClrLst/>
+    <dgm:txEffectClrLst/>
+  </dgm:styleLbl>
+  <dgm:styleLbl name="node4">
+    <dgm:fillClrLst>
+      <a:schemeClr val="accent4"/>
+    </dgm:fillClrLst>
+    <dgm:linClrLst meth="repeat">
+      <a:schemeClr val="lt1"/>
+    </dgm:linClrLst>
+    <dgm:effectClrLst/>
+    <dgm:txLinClrLst/>
+    <dgm:txFillClrLst/>
+    <dgm:txEffectClrLst/>
+  </dgm:styleLbl>
+  <dgm:styleLbl name="fgImgPlace1">
+    <dgm:fillClrLst meth="repeat">
+      <a:schemeClr val="accent2">
+        <a:tint val="50000"/>
+      </a:schemeClr>
+      <a:schemeClr val="accent3">
+        <a:tint val="50000"/>
+      </a:schemeClr>
+      <a:schemeClr val="accent4">
+        <a:tint val="50000"/>
+      </a:schemeClr>
+      <a:schemeClr val="accent5">
+        <a:tint val="50000"/>
+      </a:schemeClr>
+      <a:schemeClr val="accent6">
+        <a:tint val="50000"/>
+      </a:schemeClr>
+    </dgm:fillClrLst>
+    <dgm:linClrLst meth="repeat">
+      <a:schemeClr val="lt1"/>
+    </dgm:linClrLst>
+    <dgm:effectClrLst/>
+    <dgm:txLinClrLst/>
+    <dgm:txFillClrLst meth="repeat">
+      <a:schemeClr val="lt1"/>
+    </dgm:txFillClrLst>
+    <dgm:txEffectClrLst/>
+  </dgm:styleLbl>
+  <dgm:styleLbl name="alignImgPlace1">
+    <dgm:fillClrLst>
+      <a:schemeClr val="accent1">
+        <a:tint val="50000"/>
+      </a:schemeClr>
+      <a:schemeClr val="accent2">
+        <a:tint val="20000"/>
+      </a:schemeClr>
+    </dgm:fillClrLst>
+    <dgm:linClrLst meth="repeat">
+      <a:schemeClr val="lt1"/>
+    </dgm:linClrLst>
+    <dgm:effectClrLst/>
+    <dgm:txLinClrLst/>
+    <dgm:txFillClrLst meth="repeat">
+      <a:schemeClr val="lt1"/>
+    </dgm:txFillClrLst>
+    <dgm:txEffectClrLst/>
+  </dgm:styleLbl>
+  <dgm:styleLbl name="bgImgPlace1">
+    <dgm:fillClrLst>
+      <a:schemeClr val="accent1">
+        <a:tint val="50000"/>
+      </a:schemeClr>
+      <a:schemeClr val="accent2">
+        <a:tint val="20000"/>
+      </a:schemeClr>
+    </dgm:fillClrLst>
+    <dgm:linClrLst meth="repeat">
+      <a:schemeClr val="lt1"/>
+    </dgm:linClrLst>
+    <dgm:effectClrLst/>
+    <dgm:txLinClrLst/>
+    <dgm:txFillClrLst meth="repeat">
+      <a:schemeClr val="lt1"/>
+    </dgm:txFillClrLst>
+    <dgm:txEffectClrLst/>
+  </dgm:styleLbl>
+  <dgm:styleLbl name="sibTrans2D1">
+    <dgm:fillClrLst meth="repeat">
+      <a:schemeClr val="accent2"/>
+      <a:schemeClr val="accent3"/>
+      <a:schemeClr val="accent4"/>
+      <a:schemeClr val="accent5"/>
+      <a:schemeClr val="accent6"/>
+    </dgm:fillClrLst>
+    <dgm:linClrLst meth="cycle">
+      <a:schemeClr val="lt1"/>
+    </dgm:linClrLst>
+    <dgm:effectClrLst/>
+    <dgm:txLinClrLst/>
+    <dgm:txFillClrLst/>
+    <dgm:txEffectClrLst/>
+  </dgm:styleLbl>
+  <dgm:styleLbl name="fgSibTrans2D1">
+    <dgm:fillClrLst meth="repeat">
+      <a:schemeClr val="accent2"/>
+      <a:schemeClr val="accent3"/>
+      <a:schemeClr val="accent4"/>
+      <a:schemeClr val="accent5"/>
+      <a:schemeClr val="accent6"/>
+    </dgm:fillClrLst>
+    <dgm:linClrLst meth="cycle">
+      <a:schemeClr val="lt1"/>
+    </dgm:linClrLst>
+    <dgm:effectClrLst/>
+    <dgm:txLinClrLst/>
+    <dgm:txFillClrLst meth="repeat">
+      <a:schemeClr val="lt1"/>
+    </dgm:txFillClrLst>
+    <dgm:txEffectClrLst/>
+  </dgm:styleLbl>
+  <dgm:styleLbl name="bgSibTrans2D1">
+    <dgm:fillClrLst meth="repeat">
+      <a:schemeClr val="accent2"/>
+      <a:schemeClr val="accent3"/>
+      <a:schemeClr val="accent4"/>
+      <a:schemeClr val="accent5"/>
+      <a:schemeClr val="accent6"/>
+    </dgm:fillClrLst>
+    <dgm:linClrLst meth="cycle">
+      <a:schemeClr val="lt1"/>
+    </dgm:linClrLst>
+    <dgm:effectClrLst/>
+    <dgm:txLinClrLst/>
+    <dgm:txFillClrLst meth="repeat">
+      <a:schemeClr val="lt1"/>
+    </dgm:txFillClrLst>
+    <dgm:txEffectClrLst/>
+  </dgm:styleLbl>
+  <dgm:styleLbl name="sibTrans1D1">
+    <dgm:fillClrLst meth="repeat">
+      <a:schemeClr val="accent2"/>
+      <a:schemeClr val="accent3"/>
+      <a:schemeClr val="accent4"/>
+      <a:schemeClr val="accent5"/>
+      <a:schemeClr val="accent6"/>
+    </dgm:fillClrLst>
+    <dgm:linClrLst meth="repeat">
+      <a:schemeClr val="accent2"/>
+      <a:schemeClr val="accent3"/>
+      <a:schemeClr val="accent4"/>
+      <a:schemeClr val="accent5"/>
+      <a:schemeClr val="accent6"/>
+    </dgm:linClrLst>
+    <dgm:effectClrLst/>
+    <dgm:txLinClrLst/>
+    <dgm:txFillClrLst meth="repeat">
+      <a:schemeClr val="tx1"/>
+    </dgm:txFillClrLst>
+    <dgm:txEffectClrLst/>
+  </dgm:styleLbl>
+  <dgm:styleLbl name="callout">
+    <dgm:fillClrLst meth="repeat">
+      <a:schemeClr val="accent2"/>
+    </dgm:fillClrLst>
+    <dgm:linClrLst meth="repeat">
+      <a:schemeClr val="accent2">
+        <a:tint val="50000"/>
+      </a:schemeClr>
+    </dgm:linClrLst>
+    <dgm:effectClrLst/>
+    <dgm:txLinClrLst/>
+    <dgm:txFillClrLst meth="repeat">
+      <a:schemeClr val="tx1"/>
+    </dgm:txFillClrLst>
+    <dgm:txEffectClrLst/>
+  </dgm:styleLbl>
+  <dgm:styleLbl name="asst0">
+    <dgm:fillClrLst meth="repeat">
+      <a:schemeClr val="accent1"/>
+    </dgm:fillClrLst>
+    <dgm:linClrLst meth="repeat">
+      <a:schemeClr val="lt1"/>
+    </dgm:linClrLst>
+    <dgm:effectClrLst/>
+    <dgm:txLinClrLst/>
+    <dgm:txFillClrLst/>
+    <dgm:txEffectClrLst/>
+  </dgm:styleLbl>
+  <dgm:styleLbl name="asst1">
+    <dgm:fillClrLst meth="repeat">
+      <a:schemeClr val="accent2"/>
+    </dgm:fillClrLst>
+    <dgm:linClrLst meth="repeat">
+      <a:schemeClr val="lt1"/>
+    </dgm:linClrLst>
+    <dgm:effectClrLst/>
+    <dgm:txLinClrLst/>
+    <dgm:txFillClrLst/>
+    <dgm:txEffectClrLst/>
+  </dgm:styleLbl>
+  <dgm:styleLbl name="asst2">
+    <dgm:fillClrLst>
+      <a:schemeClr val="accent3"/>
+    </dgm:fillClrLst>
+    <dgm:linClrLst meth="repeat">
+      <a:schemeClr val="lt1"/>
+    </dgm:linClrLst>
+    <dgm:effectClrLst/>
+    <dgm:txLinClrLst/>
+    <dgm:txFillClrLst/>
+    <dgm:txEffectClrLst/>
+  </dgm:styleLbl>
+  <dgm:styleLbl name="asst3">
+    <dgm:fillClrLst>
+      <a:schemeClr val="accent4"/>
+    </dgm:fillClrLst>
+    <dgm:linClrLst meth="repeat">
+      <a:schemeClr val="lt1"/>
+    </dgm:linClrLst>
+    <dgm:effectClrLst/>
+    <dgm:txLinClrLst/>
+    <dgm:txFillClrLst/>
+    <dgm:txEffectClrLst/>
+  </dgm:styleLbl>
+  <dgm:styleLbl name="asst4">
+    <dgm:fillClrLst>
+      <a:schemeClr val="accent5"/>
+    </dgm:fillClrLst>
+    <dgm:linClrLst meth="repeat">
+      <a:schemeClr val="lt1"/>
+    </dgm:linClrLst>
+    <dgm:effectClrLst/>
+    <dgm:txLinClrLst/>
+    <dgm:txFillClrLst/>
+    <dgm:txEffectClrLst/>
+  </dgm:styleLbl>
+  <dgm:styleLbl name="parChTrans2D1">
+    <dgm:fillClrLst meth="repeat">
+      <a:schemeClr val="accent2"/>
+    </dgm:fillClrLst>
+    <dgm:linClrLst meth="repeat">
+      <a:schemeClr val="lt1"/>
+    </dgm:linClrLst>
+    <dgm:effectClrLst/>
+    <dgm:txLinClrLst/>
+    <dgm:txFillClrLst meth="repeat">
+      <a:schemeClr val="lt1"/>
+    </dgm:txFillClrLst>
+    <dgm:txEffectClrLst/>
+  </dgm:styleLbl>
+  <dgm:styleLbl name="parChTrans2D2">
+    <dgm:fillClrLst meth="repeat">
+      <a:schemeClr val="accent3"/>
+    </dgm:fillClrLst>
+    <dgm:linClrLst meth="repeat">
+      <a:schemeClr val="lt1"/>
+    </dgm:linClrLst>
+    <dgm:effectClrLst/>
+    <dgm:txLinClrLst/>
+    <dgm:txFillClrLst/>
+    <dgm:txEffectClrLst/>
+  </dgm:styleLbl>
+  <dgm:styleLbl name="parChTrans2D3">
+    <dgm:fillClrLst meth="repeat">
+      <a:schemeClr val="accent4"/>
+    </dgm:fillClrLst>
+    <dgm:linClrLst meth="repeat">
+      <a:schemeClr val="lt1"/>
+    </dgm:linClrLst>
+    <dgm:effectClrLst/>
+    <dgm:txLinClrLst/>
+    <dgm:txFillClrLst/>
+    <dgm:txEffectClrLst/>
+  </dgm:styleLbl>
+  <dgm:styleLbl name="parChTrans2D4">
+    <dgm:fillClrLst meth="repeat">
+      <a:schemeClr val="accent5"/>
+    </dgm:fillClrLst>
+    <dgm:linClrLst meth="repeat">
+      <a:schemeClr val="lt1"/>
+    </dgm:linClrLst>
+    <dgm:effectClrLst/>
+    <dgm:txLinClrLst/>
+    <dgm:txFillClrLst meth="repeat">
+      <a:schemeClr val="lt1"/>
+    </dgm:txFillClrLst>
+    <dgm:txEffectClrLst/>
+  </dgm:styleLbl>
+  <dgm:styleLbl name="parChTrans1D1">
+    <dgm:fillClrLst meth="repeat">
+      <a:schemeClr val="accent2"/>
+    </dgm:fillClrLst>
+    <dgm:linClrLst meth="repeat">
+      <a:schemeClr val="accent1"/>
+    </dgm:linClrLst>
+    <dgm:effectClrLst/>
+    <dgm:txLinClrLst/>
+    <dgm:txFillClrLst meth="repeat">
+      <a:schemeClr val="tx1"/>
+    </dgm:txFillClrLst>
+    <dgm:txEffectClrLst/>
+  </dgm:styleLbl>
+  <dgm:styleLbl name="parChTrans1D2">
+    <dgm:fillClrLst meth="repeat">
+      <a:schemeClr val="accent3">
+        <a:tint val="90000"/>
+      </a:schemeClr>
+    </dgm:fillClrLst>
+    <dgm:linClrLst meth="repeat">
+      <a:schemeClr val="accent2"/>
+    </dgm:linClrLst>
+    <dgm:effectClrLst/>
+    <dgm:txLinClrLst/>
+    <dgm:txFillClrLst meth="repeat">
+      <a:schemeClr val="tx1"/>
+    </dgm:txFillClrLst>
+    <dgm:txEffectClrLst/>
+  </dgm:styleLbl>
+  <dgm:styleLbl name="parChTrans1D3">
+    <dgm:fillClrLst meth="repeat">
+      <a:schemeClr val="accent4">
+        <a:tint val="70000"/>
+      </a:schemeClr>
+    </dgm:fillClrLst>
+    <dgm:linClrLst meth="repeat">
+      <a:schemeClr val="accent3"/>
+    </dgm:linClrLst>
+    <dgm:effectClrLst/>
+    <dgm:txLinClrLst/>
+    <dgm:txFillClrLst meth="repeat">
+      <a:schemeClr val="tx1"/>
+    </dgm:txFillClrLst>
+    <dgm:txEffectClrLst/>
+  </dgm:styleLbl>
+  <dgm:styleLbl name="parChTrans1D4">
+    <dgm:fillClrLst meth="repeat">
+      <a:schemeClr val="accent5">
+        <a:tint val="50000"/>
+      </a:schemeClr>
+    </dgm:fillClrLst>
+    <dgm:linClrLst meth="repeat">
+      <a:schemeClr val="accent4"/>
+    </dgm:linClrLst>
+    <dgm:effectClrLst/>
+    <dgm:txLinClrLst/>
+    <dgm:txFillClrLst meth="repeat">
+      <a:schemeClr val="tx1"/>
+    </dgm:txFillClrLst>
+    <dgm:txEffectClrLst/>
+  </dgm:styleLbl>
+  <dgm:styleLbl name="fgAcc1">
+    <dgm:fillClrLst meth="repeat">
+      <a:schemeClr val="lt1">
+        <a:alpha val="90000"/>
+      </a:schemeClr>
+    </dgm:fillClrLst>
+    <dgm:linClrLst meth="repeat">
+      <a:schemeClr val="accent2"/>
+      <a:schemeClr val="accent3"/>
+      <a:schemeClr val="accent4"/>
+      <a:schemeClr val="accent5"/>
+      <a:schemeClr val="accent6"/>
+    </dgm:linClrLst>
+    <dgm:effectClrLst/>
+    <dgm:txLinClrLst/>
+    <dgm:txFillClrLst meth="repeat">
+      <a:schemeClr val="dk1"/>
+    </dgm:txFillClrLst>
+    <dgm:txEffectClrLst/>
+  </dgm:styleLbl>
+  <dgm:styleLbl name="conFgAcc1">
+    <dgm:fillClrLst meth="repeat">
+      <a:schemeClr val="lt1">
+        <a:alpha val="90000"/>
+      </a:schemeClr>
+    </dgm:fillClrLst>
+    <dgm:linClrLst meth="repeat">
+      <a:schemeClr val="accent2"/>
+      <a:schemeClr val="accent3"/>
+      <a:schemeClr val="accent4"/>
+      <a:schemeClr val="accent5"/>
+      <a:schemeClr val="accent6"/>
+    </dgm:linClrLst>
+    <dgm:effectClrLst/>
+    <dgm:txLinClrLst/>
+    <dgm:txFillClrLst meth="repeat">
+      <a:schemeClr val="dk1"/>
+    </dgm:txFillClrLst>
+    <dgm:txEffectClrLst/>
+  </dgm:styleLbl>
+  <dgm:styleLbl name="alignAcc1">
+    <dgm:fillClrLst meth="repeat">
+      <a:schemeClr val="lt1">
+        <a:alpha val="90000"/>
+      </a:schemeClr>
+    </dgm:fillClrLst>
+    <dgm:linClrLst meth="repeat">
+      <a:schemeClr val="accent2"/>
+      <a:schemeClr val="accent3"/>
+      <a:schemeClr val="accent4"/>
+      <a:schemeClr val="accent5"/>
+      <a:schemeClr val="accent6"/>
+    </dgm:linClrLst>
+    <dgm:effectClrLst/>
+    <dgm:txLinClrLst/>
+    <dgm:txFillClrLst meth="repeat">
+      <a:schemeClr val="dk1"/>
+    </dgm:txFillClrLst>
+    <dgm:txEffectClrLst/>
+  </dgm:styleLbl>
+  <dgm:styleLbl name="trAlignAcc1">
+    <dgm:fillClrLst meth="repeat">
+      <a:schemeClr val="lt1">
+        <a:alpha val="40000"/>
+      </a:schemeClr>
+    </dgm:fillClrLst>
+    <dgm:linClrLst meth="repeat">
+      <a:schemeClr val="accent1"/>
+    </dgm:linClrLst>
+    <dgm:effectClrLst/>
+    <dgm:txLinClrLst/>
+    <dgm:txFillClrLst meth="repeat">
+      <a:schemeClr val="dk1"/>
+    </dgm:txFillClrLst>
+    <dgm:txEffectClrLst/>
+  </dgm:styleLbl>
+  <dgm:styleLbl name="bgAcc1">
+    <dgm:fillClrLst meth="repeat">
+      <a:schemeClr val="lt1">
+        <a:alpha val="90000"/>
+      </a:schemeClr>
+    </dgm:fillClrLst>
+    <dgm:linClrLst meth="repeat">
+      <a:schemeClr val="accent2"/>
+      <a:schemeClr val="accent3"/>
+      <a:schemeClr val="accent4"/>
+      <a:schemeClr val="accent5"/>
+      <a:schemeClr val="accent6"/>
+    </dgm:linClrLst>
+    <dgm:effectClrLst/>
+    <dgm:txLinClrLst/>
+    <dgm:txFillClrLst meth="repeat">
+      <a:schemeClr val="dk1"/>
+    </dgm:txFillClrLst>
+    <dgm:txEffectClrLst/>
+  </dgm:styleLbl>
+  <dgm:styleLbl name="solidFgAcc1">
+    <dgm:fillClrLst meth="repeat">
+      <a:schemeClr val="lt1"/>
+    </dgm:fillClrLst>
+    <dgm:linClrLst meth="repeat">
+      <a:schemeClr val="accent2"/>
+      <a:schemeClr val="accent3"/>
+      <a:schemeClr val="accent4"/>
+      <a:schemeClr val="accent5"/>
+      <a:schemeClr val="accent6"/>
+    </dgm:linClrLst>
+    <dgm:effectClrLst/>
+    <dgm:txLinClrLst/>
+    <dgm:txFillClrLst meth="repeat">
+      <a:schemeClr val="dk1"/>
+    </dgm:txFillClrLst>
+    <dgm:txEffectClrLst/>
+  </dgm:styleLbl>
+  <dgm:styleLbl name="solidAlignAcc1">
+    <dgm:fillClrLst meth="repeat">
+      <a:schemeClr val="lt1"/>
+    </dgm:fillClrLst>
+    <dgm:linClrLst meth="repeat">
+      <a:schemeClr val="accent2"/>
+      <a:schemeClr val="accent3"/>
+      <a:schemeClr val="accent4"/>
+      <a:schemeClr val="accent5"/>
+      <a:schemeClr val="accent6"/>
+    </dgm:linClrLst>
+    <dgm:effectClrLst/>
+    <dgm:txLinClrLst/>
+    <dgm:txFillClrLst meth="repeat">
+      <a:schemeClr val="dk1"/>
+    </dgm:txFillClrLst>
+    <dgm:txEffectClrLst/>
+  </dgm:styleLbl>
+  <dgm:styleLbl name="solidBgAcc1">
+    <dgm:fillClrLst meth="repeat">
+      <a:schemeClr val="lt1"/>
+    </dgm:fillClrLst>
+    <dgm:linClrLst meth="repeat">
+      <a:schemeClr val="accent2"/>
+      <a:schemeClr val="accent3"/>
+      <a:schemeClr val="accent4"/>
+      <a:schemeClr val="accent5"/>
+      <a:schemeClr val="accent6"/>
+    </dgm:linClrLst>
+    <dgm:effectClrLst/>
+    <dgm:txLinClrLst/>
+    <dgm:txFillClrLst meth="repeat">
+      <a:schemeClr val="dk1"/>
+    </dgm:txFillClrLst>
+    <dgm:txEffectClrLst/>
+  </dgm:styleLbl>
+  <dgm:styleLbl name="fgAccFollowNode1">
+    <dgm:fillClrLst meth="repeat">
+      <a:schemeClr val="accent2">
+        <a:tint val="40000"/>
+        <a:alpha val="90000"/>
+      </a:schemeClr>
+      <a:schemeClr val="accent3">
+        <a:tint val="40000"/>
+        <a:alpha val="90000"/>
+      </a:schemeClr>
+      <a:schemeClr val="accent4">
+        <a:tint val="40000"/>
+        <a:alpha val="90000"/>
+      </a:schemeClr>
+      <a:schemeClr val="accent5">
+        <a:tint val="40000"/>
+        <a:alpha val="90000"/>
+      </a:schemeClr>
+      <a:schemeClr val="accent6">
+        <a:tint val="40000"/>
+        <a:alpha val="90000"/>
+      </a:schemeClr>
+    </dgm:fillClrLst>
+    <dgm:linClrLst meth="repeat">
+      <a:schemeClr val="accent2">
+        <a:tint val="40000"/>
+        <a:alpha val="90000"/>
+      </a:schemeClr>
+      <a:schemeClr val="accent3">
+        <a:tint val="40000"/>
+        <a:alpha val="90000"/>
+      </a:schemeClr>
+      <a:schemeClr val="accent4">
+        <a:tint val="40000"/>
+        <a:alpha val="90000"/>
+      </a:schemeClr>
+      <a:schemeClr val="accent5">
+        <a:tint val="40000"/>
+        <a:alpha val="90000"/>
+      </a:schemeClr>
+      <a:schemeClr val="accent6">
+        <a:tint val="40000"/>
+        <a:alpha val="90000"/>
+      </a:schemeClr>
+    </dgm:linClrLst>
+    <dgm:effectClrLst/>
+    <dgm:txLinClrLst/>
+    <dgm:txFillClrLst meth="repeat">
+      <a:schemeClr val="dk1"/>
+    </dgm:txFillClrLst>
+    <dgm:txEffectClrLst/>
+  </dgm:styleLbl>
+  <dgm:styleLbl name="alignAccFollowNode1">
+    <dgm:fillClrLst meth="repeat">
+      <a:schemeClr val="accent2">
+        <a:tint val="40000"/>
+        <a:alpha val="90000"/>
+      </a:schemeClr>
+      <a:schemeClr val="accent3">
+        <a:tint val="40000"/>
+        <a:alpha val="90000"/>
+      </a:schemeClr>
+      <a:schemeClr val="accent4">
+        <a:tint val="40000"/>
+        <a:alpha val="90000"/>
+      </a:schemeClr>
+      <a:schemeClr val="accent5">
+        <a:tint val="40000"/>
+        <a:alpha val="90000"/>
+      </a:schemeClr>
+      <a:schemeClr val="accent6">
+        <a:tint val="40000"/>
+        <a:alpha val="90000"/>
+      </a:schemeClr>
+    </dgm:fillClrLst>
+    <dgm:linClrLst meth="repeat">
+      <a:schemeClr val="accent2">
+        <a:tint val="40000"/>
+        <a:alpha val="90000"/>
+      </a:schemeClr>
+      <a:schemeClr val="accent3">
+        <a:tint val="40000"/>
+        <a:alpha val="90000"/>
+      </a:schemeClr>
+      <a:schemeClr val="accent4">
+        <a:tint val="40000"/>
+        <a:alpha val="90000"/>
+      </a:schemeClr>
+      <a:schemeClr val="accent5">
+        <a:tint val="40000"/>
+        <a:alpha val="90000"/>
+      </a:schemeClr>
+      <a:schemeClr val="accent6">
+        <a:tint val="40000"/>
+        <a:alpha val="90000"/>
+      </a:schemeClr>
+    </dgm:linClrLst>
+    <dgm:effectClrLst/>
+    <dgm:txLinClrLst/>
+    <dgm:txFillClrLst meth="repeat">
+      <a:schemeClr val="dk1"/>
+    </dgm:txFillClrLst>
+    <dgm:txEffectClrLst/>
+  </dgm:styleLbl>
+  <dgm:styleLbl name="bgAccFollowNode1">
+    <dgm:fillClrLst meth="repeat">
+      <a:schemeClr val="accent2">
+        <a:tint val="40000"/>
+        <a:alpha val="90000"/>
+      </a:schemeClr>
+      <a:schemeClr val="accent3">
+        <a:tint val="40000"/>
+        <a:alpha val="90000"/>
+      </a:schemeClr>
+      <a:schemeClr val="accent4">
+        <a:tint val="40000"/>
+        <a:alpha val="90000"/>
+      </a:schemeClr>
+      <a:schemeClr val="accent5">
+        <a:tint val="40000"/>
+        <a:alpha val="90000"/>
+      </a:schemeClr>
+      <a:schemeClr val="accent6">
+        <a:tint val="40000"/>
+        <a:alpha val="90000"/>
+      </a:schemeClr>
+    </dgm:fillClrLst>
+    <dgm:linClrLst meth="repeat">
+      <a:schemeClr val="accent2">
+        <a:tint val="40000"/>
+        <a:alpha val="90000"/>
+      </a:schemeClr>
+      <a:schemeClr val="accent3">
+        <a:tint val="40000"/>
+        <a:alpha val="90000"/>
+      </a:schemeClr>
+      <a:schemeClr val="accent4">
+        <a:tint val="40000"/>
+        <a:alpha val="90000"/>
+      </a:schemeClr>
+      <a:schemeClr val="accent5">
+        <a:tint val="40000"/>
+        <a:alpha val="90000"/>
+      </a:schemeClr>
+      <a:schemeClr val="accent6">
+        <a:tint val="40000"/>
+        <a:alpha val="90000"/>
+      </a:schemeClr>
+    </dgm:linClrLst>
+    <dgm:effectClrLst/>
+    <dgm:txLinClrLst/>
+    <dgm:txFillClrLst meth="repeat">
+      <a:schemeClr val="dk1"/>
+    </dgm:txFillClrLst>
+    <dgm:txEffectClrLst/>
+  </dgm:styleLbl>
+  <dgm:styleLbl name="fgAcc0">
+    <dgm:fillClrLst meth="repeat">
+      <a:schemeClr val="lt1">
+        <a:alpha val="90000"/>
+      </a:schemeClr>
+    </dgm:fillClrLst>
+    <dgm:linClrLst>
+      <a:schemeClr val="accent1"/>
+    </dgm:linClrLst>
+    <dgm:effectClrLst/>
+    <dgm:txLinClrLst/>
+    <dgm:txFillClrLst meth="repeat">
+      <a:schemeClr val="dk1"/>
+    </dgm:txFillClrLst>
+    <dgm:txEffectClrLst/>
+  </dgm:styleLbl>
+  <dgm:styleLbl name="fgAcc2">
+    <dgm:fillClrLst meth="repeat">
+      <a:schemeClr val="lt1">
+        <a:alpha val="90000"/>
+      </a:schemeClr>
+    </dgm:fillClrLst>
+    <dgm:linClrLst>
+      <a:schemeClr val="accent2"/>
+    </dgm:linClrLst>
+    <dgm:effectClrLst/>
+    <dgm:txLinClrLst/>
+    <dgm:txFillClrLst meth="repeat">
+      <a:schemeClr val="dk1"/>
+    </dgm:txFillClrLst>
+    <dgm:txEffectClrLst/>
+  </dgm:styleLbl>
+  <dgm:styleLbl name="fgAcc3">
+    <dgm:fillClrLst meth="repeat">
+      <a:schemeClr val="lt1">
+        <a:alpha val="90000"/>
+      </a:schemeClr>
+    </dgm:fillClrLst>
+    <dgm:linClrLst>
+      <a:schemeClr val="accent3"/>
+    </dgm:linClrLst>
+    <dgm:effectClrLst/>
+    <dgm:txLinClrLst/>
+    <dgm:txFillClrLst meth="repeat">
+      <a:schemeClr val="dk1"/>
+    </dgm:txFillClrLst>
+    <dgm:txEffectClrLst/>
+  </dgm:styleLbl>
+  <dgm:styleLbl name="fgAcc4">
+    <dgm:fillClrLst meth="repeat">
+      <a:schemeClr val="lt1">
+        <a:alpha val="90000"/>
+      </a:schemeClr>
+    </dgm:fillClrLst>
+    <dgm:linClrLst>
+      <a:schemeClr val="accent4"/>
+    </dgm:linClrLst>
+    <dgm:effectClrLst/>
+    <dgm:txLinClrLst/>
+    <dgm:txFillClrLst meth="repeat">
+      <a:schemeClr val="dk1"/>
+    </dgm:txFillClrLst>
+    <dgm:txEffectClrLst/>
+  </dgm:styleLbl>
+  <dgm:styleLbl name="bgShp">
+    <dgm:fillClrLst meth="repeat">
+      <a:schemeClr val="accent2"/>
+      <a:schemeClr val="accent3"/>
+      <a:schemeClr val="accent4"/>
+      <a:schemeClr val="accent5"/>
+      <a:schemeClr val="accent6"/>
+    </dgm:fillClrLst>
+    <dgm:linClrLst meth="repeat">
+      <a:schemeClr val="lt1">
+        <a:alpha val="0"/>
+      </a:schemeClr>
+    </dgm:linClrLst>
+    <dgm:effectClrLst/>
+    <dgm:txLinClrLst/>
+    <dgm:txFillClrLst/>
+    <dgm:txEffectClrLst/>
+  </dgm:styleLbl>
+  <dgm:styleLbl name="dkBgShp">
+    <dgm:fillClrLst meth="repeat">
+      <a:schemeClr val="accent2">
+        <a:shade val="90000"/>
+      </a:schemeClr>
+    </dgm:fillClrLst>
+    <dgm:linClrLst meth="repeat">
+      <a:schemeClr val="dk1"/>
+    </dgm:linClrLst>
+    <dgm:effectClrLst/>
+    <dgm:txLinClrLst/>
+    <dgm:txFillClrLst meth="repeat">
+      <a:schemeClr val="lt1"/>
+    </dgm:txFillClrLst>
+    <dgm:txEffectClrLst/>
+  </dgm:styleLbl>
+  <dgm:styleLbl name="trBgShp">
+    <dgm:fillClrLst meth="repeat">
+      <a:schemeClr val="accent1">
+        <a:tint val="50000"/>
+        <a:alpha val="40000"/>
+      </a:schemeClr>
+    </dgm:fillClrLst>
+    <dgm:linClrLst meth="repeat">
+      <a:schemeClr val="accent2"/>
+    </dgm:linClrLst>
+    <dgm:effectClrLst/>
+    <dgm:txLinClrLst/>
+    <dgm:txFillClrLst meth="repeat">
+      <a:schemeClr val="lt1"/>
+    </dgm:txFillClrLst>
+    <dgm:txEffectClrLst/>
+  </dgm:styleLbl>
+  <dgm:styleLbl name="fgShp">
+    <dgm:fillClrLst meth="repeat">
+      <a:schemeClr val="accent2">
+        <a:tint val="40000"/>
+      </a:schemeClr>
+    </dgm:fillClrLst>
+    <dgm:linClrLst meth="repeat">
+      <a:schemeClr val="lt1"/>
+    </dgm:linClrLst>
+    <dgm:effectClrLst/>
+    <dgm:txLinClrLst/>
+    <dgm:txFillClrLst meth="repeat">
+      <a:schemeClr val="dk1"/>
+    </dgm:txFillClrLst>
+    <dgm:txEffectClrLst/>
+  </dgm:styleLbl>
+  <dgm:styleLbl name="revTx">
+    <dgm:fillClrLst meth="repeat">
+      <a:schemeClr val="lt1">
+        <a:alpha val="0"/>
+      </a:schemeClr>
+    </dgm:fillClrLst>
+    <dgm:linClrLst meth="repeat">
+      <a:schemeClr val="dk1">
+        <a:alpha val="0"/>
+      </a:schemeClr>
+    </dgm:linClrLst>
+    <dgm:effectClrLst/>
+    <dgm:txLinClrLst/>
+    <dgm:txFillClrLst meth="repeat">
+      <a:schemeClr val="bg1"/>
+    </dgm:txFillClrLst>
+    <dgm:txEffectClrLst/>
+  </dgm:styleLbl>
+</dgm:colorsDef>
+</file>
+
+<file path=ppt/diagrams/data1.xml><?xml version="1.0" encoding="utf-8"?>
+<dgm:dataModel xmlns:dgm="http://schemas.openxmlformats.org/drawingml/2006/diagram" xmlns:a="http://schemas.openxmlformats.org/drawingml/2006/main">
+  <dgm:ptLst>
+    <dgm:pt modelId="{BB22BC61-36F9-4002-9538-5067AD8FDF21}" type="doc">
+      <dgm:prSet loTypeId="urn:microsoft.com/office/officeart/2018/2/layout/IconVerticalSolidList" loCatId="icon" qsTypeId="urn:microsoft.com/office/officeart/2005/8/quickstyle/simple1" qsCatId="simple" csTypeId="urn:microsoft.com/office/officeart/2018/5/colors/Iconchunking_neutralicontext_colorful1" csCatId="colorful" phldr="1"/>
+      <dgm:spPr/>
+      <dgm:t>
+        <a:bodyPr/>
+        <a:lstStyle/>
+        <a:p>
+          <a:endParaRPr lang="en-US"/>
+        </a:p>
+      </dgm:t>
+    </dgm:pt>
+    <dgm:pt modelId="{3F7F3E76-8E03-4E0D-9C3A-5E0B45CED783}">
+      <dgm:prSet/>
+      <dgm:spPr/>
+      <dgm:t>
+        <a:bodyPr/>
+        <a:lstStyle/>
+        <a:p>
+          <a:r>
+            <a:rPr lang="it-IT"/>
+            <a:t>Alta reattività:</a:t>
+          </a:r>
+          <a:endParaRPr lang="en-US"/>
+        </a:p>
+      </dgm:t>
+    </dgm:pt>
+    <dgm:pt modelId="{7D7A6DCD-DC31-4620-8446-6384915BEB48}" type="parTrans" cxnId="{5C2E53BB-67DD-44DF-8A47-634050BA8A35}">
+      <dgm:prSet/>
+      <dgm:spPr/>
+      <dgm:t>
+        <a:bodyPr/>
+        <a:lstStyle/>
+        <a:p>
+          <a:endParaRPr lang="en-US"/>
+        </a:p>
+      </dgm:t>
+    </dgm:pt>
+    <dgm:pt modelId="{2C6DD7C6-81F4-4F0E-B433-E8D4ADF0F4F4}" type="sibTrans" cxnId="{5C2E53BB-67DD-44DF-8A47-634050BA8A35}">
+      <dgm:prSet/>
+      <dgm:spPr/>
+      <dgm:t>
+        <a:bodyPr/>
+        <a:lstStyle/>
+        <a:p>
+          <a:endParaRPr lang="en-US"/>
+        </a:p>
+      </dgm:t>
+    </dgm:pt>
+    <dgm:pt modelId="{4B719ED0-E664-4E84-BCB1-FE55255BB283}">
+      <dgm:prSet/>
+      <dgm:spPr/>
+      <dgm:t>
+        <a:bodyPr/>
+        <a:lstStyle/>
+        <a:p>
+          <a:r>
+            <a:rPr lang="it-IT"/>
+            <a:t>gestione efficiente degli algoritmi di ricerca</a:t>
+          </a:r>
+          <a:endParaRPr lang="en-US"/>
+        </a:p>
+      </dgm:t>
+    </dgm:pt>
+    <dgm:pt modelId="{640C341C-788B-4F1A-AE61-D7CBEE54442A}" type="parTrans" cxnId="{AC729768-8620-4A1C-9EA5-6A8705BB4AED}">
+      <dgm:prSet/>
+      <dgm:spPr/>
+      <dgm:t>
+        <a:bodyPr/>
+        <a:lstStyle/>
+        <a:p>
+          <a:endParaRPr lang="en-US"/>
+        </a:p>
+      </dgm:t>
+    </dgm:pt>
+    <dgm:pt modelId="{9974BF0E-CD8C-475A-BD11-F7AA292813C0}" type="sibTrans" cxnId="{AC729768-8620-4A1C-9EA5-6A8705BB4AED}">
+      <dgm:prSet/>
+      <dgm:spPr/>
+      <dgm:t>
+        <a:bodyPr/>
+        <a:lstStyle/>
+        <a:p>
+          <a:endParaRPr lang="en-US"/>
+        </a:p>
+      </dgm:t>
+    </dgm:pt>
+    <dgm:pt modelId="{031B6AB3-31D9-46EB-BFA8-ACD11C618922}">
+      <dgm:prSet/>
+      <dgm:spPr/>
+      <dgm:t>
+        <a:bodyPr/>
+        <a:lstStyle/>
+        <a:p>
+          <a:r>
+            <a:rPr lang="it-IT"/>
+            <a:t>interazione efficace con il database</a:t>
+          </a:r>
+          <a:endParaRPr lang="en-US"/>
+        </a:p>
+      </dgm:t>
+    </dgm:pt>
+    <dgm:pt modelId="{ADA7A6D0-39B0-4E8B-B8BB-24732D716610}" type="parTrans" cxnId="{283A7267-4AAF-4EAB-A427-78397891A659}">
+      <dgm:prSet/>
+      <dgm:spPr/>
+      <dgm:t>
+        <a:bodyPr/>
+        <a:lstStyle/>
+        <a:p>
+          <a:endParaRPr lang="en-US"/>
+        </a:p>
+      </dgm:t>
+    </dgm:pt>
+    <dgm:pt modelId="{BD659F32-74C0-47F5-B421-3344807D27CD}" type="sibTrans" cxnId="{283A7267-4AAF-4EAB-A427-78397891A659}">
+      <dgm:prSet/>
+      <dgm:spPr/>
+      <dgm:t>
+        <a:bodyPr/>
+        <a:lstStyle/>
+        <a:p>
+          <a:endParaRPr lang="en-US"/>
+        </a:p>
+      </dgm:t>
+    </dgm:pt>
+    <dgm:pt modelId="{FDD7E09F-E77F-489E-B608-14450556091D}">
+      <dgm:prSet/>
+      <dgm:spPr/>
+      <dgm:t>
+        <a:bodyPr/>
+        <a:lstStyle/>
+        <a:p>
+          <a:r>
+            <a:rPr lang="it-IT"/>
+            <a:t>Interfaccia semplice e intuitiva</a:t>
+          </a:r>
+          <a:endParaRPr lang="en-US"/>
+        </a:p>
+      </dgm:t>
+    </dgm:pt>
+    <dgm:pt modelId="{5228C5D3-1852-4494-8DA2-B33B3EE544D8}" type="parTrans" cxnId="{1D65101B-91FA-4E42-BB2B-AAE94F1A1BBE}">
+      <dgm:prSet/>
+      <dgm:spPr/>
+      <dgm:t>
+        <a:bodyPr/>
+        <a:lstStyle/>
+        <a:p>
+          <a:endParaRPr lang="en-US"/>
+        </a:p>
+      </dgm:t>
+    </dgm:pt>
+    <dgm:pt modelId="{5D967168-9F91-4D17-970F-EBC1EC013AF8}" type="sibTrans" cxnId="{1D65101B-91FA-4E42-BB2B-AAE94F1A1BBE}">
+      <dgm:prSet/>
+      <dgm:spPr/>
+      <dgm:t>
+        <a:bodyPr/>
+        <a:lstStyle/>
+        <a:p>
+          <a:endParaRPr lang="en-US"/>
+        </a:p>
+      </dgm:t>
+    </dgm:pt>
+    <dgm:pt modelId="{CB1A77CE-9120-417E-A213-F485BF46BFF4}">
+      <dgm:prSet/>
+      <dgm:spPr/>
+      <dgm:t>
+        <a:bodyPr/>
+        <a:lstStyle/>
+        <a:p>
+          <a:r>
+            <a:rPr lang="it-IT"/>
+            <a:t>Necessità di integrare dati aggiornati</a:t>
+          </a:r>
+          <a:endParaRPr lang="en-US"/>
+        </a:p>
+      </dgm:t>
+    </dgm:pt>
+    <dgm:pt modelId="{F6035E91-B4C8-4A82-9349-8C78504A6F07}" type="parTrans" cxnId="{684DC2D5-52BD-418C-9B11-B178D6998E5D}">
+      <dgm:prSet/>
+      <dgm:spPr/>
+      <dgm:t>
+        <a:bodyPr/>
+        <a:lstStyle/>
+        <a:p>
+          <a:endParaRPr lang="en-US"/>
+        </a:p>
+      </dgm:t>
+    </dgm:pt>
+    <dgm:pt modelId="{BD5550B0-D421-4D6F-A254-D1E29772F6D2}" type="sibTrans" cxnId="{684DC2D5-52BD-418C-9B11-B178D6998E5D}">
+      <dgm:prSet/>
+      <dgm:spPr/>
+      <dgm:t>
+        <a:bodyPr/>
+        <a:lstStyle/>
+        <a:p>
+          <a:endParaRPr lang="en-US"/>
+        </a:p>
+      </dgm:t>
+    </dgm:pt>
+    <dgm:pt modelId="{B4D01DF8-158E-4495-B7E5-B21B8ECF2254}">
+      <dgm:prSet/>
+      <dgm:spPr/>
+      <dgm:t>
+        <a:bodyPr/>
+        <a:lstStyle/>
+        <a:p>
+          <a:r>
+            <a:rPr lang="it-IT"/>
+            <a:t>Necessità di gestione account</a:t>
+          </a:r>
+          <a:endParaRPr lang="en-US"/>
+        </a:p>
+      </dgm:t>
+    </dgm:pt>
+    <dgm:pt modelId="{F4CC556F-0959-42E3-9F62-2522E25D4ABD}" type="parTrans" cxnId="{4C98C497-965C-47B2-B0DC-B8E4AAFA6737}">
+      <dgm:prSet/>
+      <dgm:spPr/>
+      <dgm:t>
+        <a:bodyPr/>
+        <a:lstStyle/>
+        <a:p>
+          <a:endParaRPr lang="en-US"/>
+        </a:p>
+      </dgm:t>
+    </dgm:pt>
+    <dgm:pt modelId="{86A72344-4590-4DDF-80AC-470239B9732B}" type="sibTrans" cxnId="{4C98C497-965C-47B2-B0DC-B8E4AAFA6737}">
+      <dgm:prSet/>
+      <dgm:spPr/>
+      <dgm:t>
+        <a:bodyPr/>
+        <a:lstStyle/>
+        <a:p>
+          <a:endParaRPr lang="en-US"/>
+        </a:p>
+      </dgm:t>
+    </dgm:pt>
+    <dgm:pt modelId="{9FE575E1-72E9-45E8-BAAB-FAB78166B841}">
+      <dgm:prSet/>
+      <dgm:spPr/>
+      <dgm:t>
+        <a:bodyPr/>
+        <a:lstStyle/>
+        <a:p>
+          <a:r>
+            <a:rPr lang="it-IT"/>
+            <a:t>Impedire sovraccarico profili</a:t>
+          </a:r>
+          <a:endParaRPr lang="en-US"/>
+        </a:p>
+      </dgm:t>
+    </dgm:pt>
+    <dgm:pt modelId="{84FA4392-38D2-45E2-B45C-9B46144572C8}" type="parTrans" cxnId="{F8C1FBF3-C9C3-4BFF-BB1F-6CA09378B0AC}">
+      <dgm:prSet/>
+      <dgm:spPr/>
+      <dgm:t>
+        <a:bodyPr/>
+        <a:lstStyle/>
+        <a:p>
+          <a:endParaRPr lang="en-US"/>
+        </a:p>
+      </dgm:t>
+    </dgm:pt>
+    <dgm:pt modelId="{9AB1A5A1-EBF9-498B-8511-F4D12E8B982F}" type="sibTrans" cxnId="{F8C1FBF3-C9C3-4BFF-BB1F-6CA09378B0AC}">
+      <dgm:prSet/>
+      <dgm:spPr/>
+      <dgm:t>
+        <a:bodyPr/>
+        <a:lstStyle/>
+        <a:p>
+          <a:endParaRPr lang="en-US"/>
+        </a:p>
+      </dgm:t>
+    </dgm:pt>
+    <dgm:pt modelId="{0D80B354-E475-4C98-B296-2AF2A114EC17}">
+      <dgm:prSet/>
+      <dgm:spPr/>
+      <dgm:t>
+        <a:bodyPr/>
+        <a:lstStyle/>
+        <a:p>
+          <a:r>
+            <a:rPr lang="it-IT"/>
+            <a:t>Cancellare account inattivi</a:t>
+          </a:r>
+          <a:endParaRPr lang="en-US"/>
+        </a:p>
+      </dgm:t>
+    </dgm:pt>
+    <dgm:pt modelId="{54E0491A-AAE9-47E0-813D-BE5F38A5FF40}" type="parTrans" cxnId="{A35E118F-3BAE-42FF-9D73-B44514C90D8E}">
+      <dgm:prSet/>
+      <dgm:spPr/>
+      <dgm:t>
+        <a:bodyPr/>
+        <a:lstStyle/>
+        <a:p>
+          <a:endParaRPr lang="en-US"/>
+        </a:p>
+      </dgm:t>
+    </dgm:pt>
+    <dgm:pt modelId="{BFF90300-66B3-43B1-B832-04A204B10309}" type="sibTrans" cxnId="{A35E118F-3BAE-42FF-9D73-B44514C90D8E}">
+      <dgm:prSet/>
+      <dgm:spPr/>
+      <dgm:t>
+        <a:bodyPr/>
+        <a:lstStyle/>
+        <a:p>
+          <a:endParaRPr lang="en-US"/>
+        </a:p>
+      </dgm:t>
+    </dgm:pt>
+    <dgm:pt modelId="{24F9FAA0-59CB-4F2D-96B0-D726804B983F}" type="pres">
+      <dgm:prSet presAssocID="{BB22BC61-36F9-4002-9538-5067AD8FDF21}" presName="root" presStyleCnt="0">
+        <dgm:presLayoutVars>
+          <dgm:dir/>
+          <dgm:resizeHandles val="exact"/>
+        </dgm:presLayoutVars>
+      </dgm:prSet>
+      <dgm:spPr/>
+    </dgm:pt>
+    <dgm:pt modelId="{EE5673DB-44D1-4B69-9FF1-9AAB56C2F178}" type="pres">
+      <dgm:prSet presAssocID="{3F7F3E76-8E03-4E0D-9C3A-5E0B45CED783}" presName="compNode" presStyleCnt="0"/>
+      <dgm:spPr/>
+    </dgm:pt>
+    <dgm:pt modelId="{0FB4868B-68C2-4D50-96F9-AD8167B78248}" type="pres">
+      <dgm:prSet presAssocID="{3F7F3E76-8E03-4E0D-9C3A-5E0B45CED783}" presName="bgRect" presStyleLbl="bgShp" presStyleIdx="0" presStyleCnt="4"/>
+      <dgm:spPr/>
+    </dgm:pt>
+    <dgm:pt modelId="{EE6DC079-799E-4C05-8C0E-43CA10FCEF26}" type="pres">
+      <dgm:prSet presAssocID="{3F7F3E76-8E03-4E0D-9C3A-5E0B45CED783}" presName="iconRect" presStyleLbl="node1" presStyleIdx="0" presStyleCnt="4"/>
+      <dgm:spPr>
+        <a:blipFill>
+          <a:blip xmlns:r="http://schemas.openxmlformats.org/officeDocument/2006/relationships" r:embed="rId1">
+            <a:extLst>
+              <a:ext uri="{28A0092B-C50C-407E-A947-70E740481C1C}">
+                <a14:useLocalDpi xmlns:a14="http://schemas.microsoft.com/office/drawing/2010/main" val="0"/>
+              </a:ext>
+              <a:ext uri="{96DAC541-7B7A-43D3-8B79-37D633B846F1}">
+                <asvg:svgBlip xmlns:asvg="http://schemas.microsoft.com/office/drawing/2016/SVG/main" r:embed="rId2"/>
+              </a:ext>
+            </a:extLst>
+          </a:blip>
+          <a:stretch>
+            <a:fillRect/>
+          </a:stretch>
+        </a:blipFill>
+        <a:ln>
+          <a:noFill/>
+        </a:ln>
+      </dgm:spPr>
+      <dgm:extLst>
+        <a:ext uri="{E40237B7-FDA0-4F09-8148-C483321AD2D9}">
+          <dgm14:cNvPr xmlns:dgm14="http://schemas.microsoft.com/office/drawing/2010/diagram" id="0" name="" descr="Magnifying glass"/>
+        </a:ext>
+      </dgm:extLst>
+    </dgm:pt>
+    <dgm:pt modelId="{BE7FC246-0394-4BA9-A166-0D8A394F1E85}" type="pres">
+      <dgm:prSet presAssocID="{3F7F3E76-8E03-4E0D-9C3A-5E0B45CED783}" presName="spaceRect" presStyleCnt="0"/>
+      <dgm:spPr/>
+    </dgm:pt>
+    <dgm:pt modelId="{FAC5E2E4-7E7E-42D8-884B-7C46265A2CCB}" type="pres">
+      <dgm:prSet presAssocID="{3F7F3E76-8E03-4E0D-9C3A-5E0B45CED783}" presName="parTx" presStyleLbl="revTx" presStyleIdx="0" presStyleCnt="6">
+        <dgm:presLayoutVars>
+          <dgm:chMax val="0"/>
+          <dgm:chPref val="0"/>
+        </dgm:presLayoutVars>
+      </dgm:prSet>
+      <dgm:spPr/>
+    </dgm:pt>
+    <dgm:pt modelId="{8F7265C9-1769-4396-83E1-A720C8ACAFA0}" type="pres">
+      <dgm:prSet presAssocID="{3F7F3E76-8E03-4E0D-9C3A-5E0B45CED783}" presName="desTx" presStyleLbl="revTx" presStyleIdx="1" presStyleCnt="6">
+        <dgm:presLayoutVars/>
+      </dgm:prSet>
+      <dgm:spPr/>
+    </dgm:pt>
+    <dgm:pt modelId="{0B6BFA52-90E1-42C3-A390-387BF3C48C7B}" type="pres">
+      <dgm:prSet presAssocID="{2C6DD7C6-81F4-4F0E-B433-E8D4ADF0F4F4}" presName="sibTrans" presStyleCnt="0"/>
+      <dgm:spPr/>
+    </dgm:pt>
+    <dgm:pt modelId="{9E2C07A9-8E0A-411E-8FF0-FF780CBFDC77}" type="pres">
+      <dgm:prSet presAssocID="{FDD7E09F-E77F-489E-B608-14450556091D}" presName="compNode" presStyleCnt="0"/>
+      <dgm:spPr/>
+    </dgm:pt>
+    <dgm:pt modelId="{30CC0AA0-286B-4161-B0AE-1E0150753201}" type="pres">
+      <dgm:prSet presAssocID="{FDD7E09F-E77F-489E-B608-14450556091D}" presName="bgRect" presStyleLbl="bgShp" presStyleIdx="1" presStyleCnt="4"/>
+      <dgm:spPr/>
+    </dgm:pt>
+    <dgm:pt modelId="{38406F51-7DA0-42C5-A695-AD1C0096A599}" type="pres">
+      <dgm:prSet presAssocID="{FDD7E09F-E77F-489E-B608-14450556091D}" presName="iconRect" presStyleLbl="node1" presStyleIdx="1" presStyleCnt="4"/>
+      <dgm:spPr>
+        <a:blipFill>
+          <a:blip xmlns:r="http://schemas.openxmlformats.org/officeDocument/2006/relationships" r:embed="rId3">
+            <a:extLst>
+              <a:ext uri="{28A0092B-C50C-407E-A947-70E740481C1C}">
+                <a14:useLocalDpi xmlns:a14="http://schemas.microsoft.com/office/drawing/2010/main" val="0"/>
+              </a:ext>
+              <a:ext uri="{96DAC541-7B7A-43D3-8B79-37D633B846F1}">
+                <asvg:svgBlip xmlns:asvg="http://schemas.microsoft.com/office/drawing/2016/SVG/main" r:embed="rId4"/>
+              </a:ext>
+            </a:extLst>
+          </a:blip>
+          <a:stretch>
+            <a:fillRect/>
+          </a:stretch>
+        </a:blipFill>
+        <a:ln>
+          <a:noFill/>
+        </a:ln>
+      </dgm:spPr>
+      <dgm:extLst>
+        <a:ext uri="{E40237B7-FDA0-4F09-8148-C483321AD2D9}">
+          <dgm14:cNvPr xmlns:dgm14="http://schemas.microsoft.com/office/drawing/2010/diagram" id="0" name="" descr="Web Design"/>
+        </a:ext>
+      </dgm:extLst>
+    </dgm:pt>
+    <dgm:pt modelId="{1FF94973-0708-4B69-9B5C-888BCEF7463A}" type="pres">
+      <dgm:prSet presAssocID="{FDD7E09F-E77F-489E-B608-14450556091D}" presName="spaceRect" presStyleCnt="0"/>
+      <dgm:spPr/>
+    </dgm:pt>
+    <dgm:pt modelId="{A3BA8F70-91B7-4245-974D-24492BD8D277}" type="pres">
+      <dgm:prSet presAssocID="{FDD7E09F-E77F-489E-B608-14450556091D}" presName="parTx" presStyleLbl="revTx" presStyleIdx="2" presStyleCnt="6">
+        <dgm:presLayoutVars>
+          <dgm:chMax val="0"/>
+          <dgm:chPref val="0"/>
+        </dgm:presLayoutVars>
+      </dgm:prSet>
+      <dgm:spPr/>
+    </dgm:pt>
+    <dgm:pt modelId="{390C67E5-F7FF-498B-AF15-7061AF447389}" type="pres">
+      <dgm:prSet presAssocID="{5D967168-9F91-4D17-970F-EBC1EC013AF8}" presName="sibTrans" presStyleCnt="0"/>
+      <dgm:spPr/>
+    </dgm:pt>
+    <dgm:pt modelId="{A72FCC19-7952-433F-9D72-B2B4464C6F4B}" type="pres">
+      <dgm:prSet presAssocID="{CB1A77CE-9120-417E-A213-F485BF46BFF4}" presName="compNode" presStyleCnt="0"/>
+      <dgm:spPr/>
+    </dgm:pt>
+    <dgm:pt modelId="{47C5FE82-41FC-41EE-99F1-5E9797534AD2}" type="pres">
+      <dgm:prSet presAssocID="{CB1A77CE-9120-417E-A213-F485BF46BFF4}" presName="bgRect" presStyleLbl="bgShp" presStyleIdx="2" presStyleCnt="4"/>
+      <dgm:spPr/>
+    </dgm:pt>
+    <dgm:pt modelId="{A9AC02F6-AFF6-4A43-BBBB-A14B118368A9}" type="pres">
+      <dgm:prSet presAssocID="{CB1A77CE-9120-417E-A213-F485BF46BFF4}" presName="iconRect" presStyleLbl="node1" presStyleIdx="2" presStyleCnt="4"/>
+      <dgm:spPr>
+        <a:blipFill>
+          <a:blip xmlns:r="http://schemas.openxmlformats.org/officeDocument/2006/relationships" r:embed="rId5">
+            <a:extLst>
+              <a:ext uri="{28A0092B-C50C-407E-A947-70E740481C1C}">
+                <a14:useLocalDpi xmlns:a14="http://schemas.microsoft.com/office/drawing/2010/main" val="0"/>
+              </a:ext>
+              <a:ext uri="{96DAC541-7B7A-43D3-8B79-37D633B846F1}">
+                <asvg:svgBlip xmlns:asvg="http://schemas.microsoft.com/office/drawing/2016/SVG/main" r:embed="rId6"/>
+              </a:ext>
+            </a:extLst>
+          </a:blip>
+          <a:stretch>
+            <a:fillRect/>
+          </a:stretch>
+        </a:blipFill>
+        <a:ln>
+          <a:noFill/>
+        </a:ln>
+      </dgm:spPr>
+      <dgm:extLst>
+        <a:ext uri="{E40237B7-FDA0-4F09-8148-C483321AD2D9}">
+          <dgm14:cNvPr xmlns:dgm14="http://schemas.microsoft.com/office/drawing/2010/diagram" id="0" name="" descr="Gears"/>
+        </a:ext>
+      </dgm:extLst>
+    </dgm:pt>
+    <dgm:pt modelId="{F84BF5E0-FA72-4700-8FE2-6E0ACE0138E8}" type="pres">
+      <dgm:prSet presAssocID="{CB1A77CE-9120-417E-A213-F485BF46BFF4}" presName="spaceRect" presStyleCnt="0"/>
+      <dgm:spPr/>
+    </dgm:pt>
+    <dgm:pt modelId="{3B98BDC6-143C-45A3-BE75-9B578458B622}" type="pres">
+      <dgm:prSet presAssocID="{CB1A77CE-9120-417E-A213-F485BF46BFF4}" presName="parTx" presStyleLbl="revTx" presStyleIdx="3" presStyleCnt="6">
+        <dgm:presLayoutVars>
+          <dgm:chMax val="0"/>
+          <dgm:chPref val="0"/>
+        </dgm:presLayoutVars>
+      </dgm:prSet>
+      <dgm:spPr/>
+    </dgm:pt>
+    <dgm:pt modelId="{81CB9048-4FB5-4A22-9B3F-F7FAEA10F357}" type="pres">
+      <dgm:prSet presAssocID="{BD5550B0-D421-4D6F-A254-D1E29772F6D2}" presName="sibTrans" presStyleCnt="0"/>
+      <dgm:spPr/>
+    </dgm:pt>
+    <dgm:pt modelId="{63FEDB6E-14B2-495B-8A36-F70017C48CF1}" type="pres">
+      <dgm:prSet presAssocID="{B4D01DF8-158E-4495-B7E5-B21B8ECF2254}" presName="compNode" presStyleCnt="0"/>
+      <dgm:spPr/>
+    </dgm:pt>
+    <dgm:pt modelId="{656810EA-BFAC-454C-9AF6-57DB0453AB7E}" type="pres">
+      <dgm:prSet presAssocID="{B4D01DF8-158E-4495-B7E5-B21B8ECF2254}" presName="bgRect" presStyleLbl="bgShp" presStyleIdx="3" presStyleCnt="4"/>
+      <dgm:spPr/>
+    </dgm:pt>
+    <dgm:pt modelId="{EABF5AD4-194F-472F-8613-5B934BE52857}" type="pres">
+      <dgm:prSet presAssocID="{B4D01DF8-158E-4495-B7E5-B21B8ECF2254}" presName="iconRect" presStyleLbl="node1" presStyleIdx="3" presStyleCnt="4"/>
+      <dgm:spPr>
+        <a:blipFill>
+          <a:blip xmlns:r="http://schemas.openxmlformats.org/officeDocument/2006/relationships" r:embed="rId7">
+            <a:extLst>
+              <a:ext uri="{28A0092B-C50C-407E-A947-70E740481C1C}">
+                <a14:useLocalDpi xmlns:a14="http://schemas.microsoft.com/office/drawing/2010/main" val="0"/>
+              </a:ext>
+              <a:ext uri="{96DAC541-7B7A-43D3-8B79-37D633B846F1}">
+                <asvg:svgBlip xmlns:asvg="http://schemas.microsoft.com/office/drawing/2016/SVG/main" r:embed="rId8"/>
+              </a:ext>
+            </a:extLst>
+          </a:blip>
+          <a:stretch>
+            <a:fillRect/>
+          </a:stretch>
+        </a:blipFill>
+        <a:ln>
+          <a:noFill/>
+        </a:ln>
+      </dgm:spPr>
+      <dgm:extLst>
+        <a:ext uri="{E40237B7-FDA0-4F09-8148-C483321AD2D9}">
+          <dgm14:cNvPr xmlns:dgm14="http://schemas.microsoft.com/office/drawing/2010/diagram" id="0" name="" descr="Warning"/>
+        </a:ext>
+      </dgm:extLst>
+    </dgm:pt>
+    <dgm:pt modelId="{D47C93CF-8DC4-4372-8731-E106C8A90789}" type="pres">
+      <dgm:prSet presAssocID="{B4D01DF8-158E-4495-B7E5-B21B8ECF2254}" presName="spaceRect" presStyleCnt="0"/>
+      <dgm:spPr/>
+    </dgm:pt>
+    <dgm:pt modelId="{B455634F-8097-4ACF-87A4-99028224F2EA}" type="pres">
+      <dgm:prSet presAssocID="{B4D01DF8-158E-4495-B7E5-B21B8ECF2254}" presName="parTx" presStyleLbl="revTx" presStyleIdx="4" presStyleCnt="6">
+        <dgm:presLayoutVars>
+          <dgm:chMax val="0"/>
+          <dgm:chPref val="0"/>
+        </dgm:presLayoutVars>
+      </dgm:prSet>
+      <dgm:spPr/>
+    </dgm:pt>
+    <dgm:pt modelId="{9F4CADAA-D6ED-4F9B-B7B7-8226349046ED}" type="pres">
+      <dgm:prSet presAssocID="{B4D01DF8-158E-4495-B7E5-B21B8ECF2254}" presName="desTx" presStyleLbl="revTx" presStyleIdx="5" presStyleCnt="6">
+        <dgm:presLayoutVars/>
+      </dgm:prSet>
+      <dgm:spPr/>
+    </dgm:pt>
+  </dgm:ptLst>
+  <dgm:cxnLst>
+    <dgm:cxn modelId="{332EBC04-B263-4AF8-818C-6647649698BD}" type="presOf" srcId="{CB1A77CE-9120-417E-A213-F485BF46BFF4}" destId="{3B98BDC6-143C-45A3-BE75-9B578458B622}" srcOrd="0" destOrd="0" presId="urn:microsoft.com/office/officeart/2018/2/layout/IconVerticalSolidList"/>
+    <dgm:cxn modelId="{E1249010-2498-41B2-AF68-AD20F8747C96}" type="presOf" srcId="{4B719ED0-E664-4E84-BCB1-FE55255BB283}" destId="{8F7265C9-1769-4396-83E1-A720C8ACAFA0}" srcOrd="0" destOrd="0" presId="urn:microsoft.com/office/officeart/2018/2/layout/IconVerticalSolidList"/>
+    <dgm:cxn modelId="{0C39F614-BE5C-4F3E-849F-1658CD0B7F0D}" type="presOf" srcId="{031B6AB3-31D9-46EB-BFA8-ACD11C618922}" destId="{8F7265C9-1769-4396-83E1-A720C8ACAFA0}" srcOrd="0" destOrd="1" presId="urn:microsoft.com/office/officeart/2018/2/layout/IconVerticalSolidList"/>
+    <dgm:cxn modelId="{1D65101B-91FA-4E42-BB2B-AAE94F1A1BBE}" srcId="{BB22BC61-36F9-4002-9538-5067AD8FDF21}" destId="{FDD7E09F-E77F-489E-B608-14450556091D}" srcOrd="1" destOrd="0" parTransId="{5228C5D3-1852-4494-8DA2-B33B3EE544D8}" sibTransId="{5D967168-9F91-4D17-970F-EBC1EC013AF8}"/>
+    <dgm:cxn modelId="{F80C7C1D-6A3C-4164-B8A0-023F5DACC97A}" type="presOf" srcId="{FDD7E09F-E77F-489E-B608-14450556091D}" destId="{A3BA8F70-91B7-4245-974D-24492BD8D277}" srcOrd="0" destOrd="0" presId="urn:microsoft.com/office/officeart/2018/2/layout/IconVerticalSolidList"/>
+    <dgm:cxn modelId="{B5A57822-3E34-478F-A0BD-B153C0649D91}" type="presOf" srcId="{BB22BC61-36F9-4002-9538-5067AD8FDF21}" destId="{24F9FAA0-59CB-4F2D-96B0-D726804B983F}" srcOrd="0" destOrd="0" presId="urn:microsoft.com/office/officeart/2018/2/layout/IconVerticalSolidList"/>
+    <dgm:cxn modelId="{283A7267-4AAF-4EAB-A427-78397891A659}" srcId="{3F7F3E76-8E03-4E0D-9C3A-5E0B45CED783}" destId="{031B6AB3-31D9-46EB-BFA8-ACD11C618922}" srcOrd="1" destOrd="0" parTransId="{ADA7A6D0-39B0-4E8B-B8BB-24732D716610}" sibTransId="{BD659F32-74C0-47F5-B421-3344807D27CD}"/>
+    <dgm:cxn modelId="{AC729768-8620-4A1C-9EA5-6A8705BB4AED}" srcId="{3F7F3E76-8E03-4E0D-9C3A-5E0B45CED783}" destId="{4B719ED0-E664-4E84-BCB1-FE55255BB283}" srcOrd="0" destOrd="0" parTransId="{640C341C-788B-4F1A-AE61-D7CBEE54442A}" sibTransId="{9974BF0E-CD8C-475A-BD11-F7AA292813C0}"/>
+    <dgm:cxn modelId="{5557F668-9C1B-43CF-9A62-28B8F87E2555}" type="presOf" srcId="{B4D01DF8-158E-4495-B7E5-B21B8ECF2254}" destId="{B455634F-8097-4ACF-87A4-99028224F2EA}" srcOrd="0" destOrd="0" presId="urn:microsoft.com/office/officeart/2018/2/layout/IconVerticalSolidList"/>
+    <dgm:cxn modelId="{A35E118F-3BAE-42FF-9D73-B44514C90D8E}" srcId="{B4D01DF8-158E-4495-B7E5-B21B8ECF2254}" destId="{0D80B354-E475-4C98-B296-2AF2A114EC17}" srcOrd="1" destOrd="0" parTransId="{54E0491A-AAE9-47E0-813D-BE5F38A5FF40}" sibTransId="{BFF90300-66B3-43B1-B832-04A204B10309}"/>
+    <dgm:cxn modelId="{4C98C497-965C-47B2-B0DC-B8E4AAFA6737}" srcId="{BB22BC61-36F9-4002-9538-5067AD8FDF21}" destId="{B4D01DF8-158E-4495-B7E5-B21B8ECF2254}" srcOrd="3" destOrd="0" parTransId="{F4CC556F-0959-42E3-9F62-2522E25D4ABD}" sibTransId="{86A72344-4590-4DDF-80AC-470239B9732B}"/>
+    <dgm:cxn modelId="{F4EF86AF-8E29-4E2B-92A0-A2E707CFC0E9}" type="presOf" srcId="{3F7F3E76-8E03-4E0D-9C3A-5E0B45CED783}" destId="{FAC5E2E4-7E7E-42D8-884B-7C46265A2CCB}" srcOrd="0" destOrd="0" presId="urn:microsoft.com/office/officeart/2018/2/layout/IconVerticalSolidList"/>
+    <dgm:cxn modelId="{5C2E53BB-67DD-44DF-8A47-634050BA8A35}" srcId="{BB22BC61-36F9-4002-9538-5067AD8FDF21}" destId="{3F7F3E76-8E03-4E0D-9C3A-5E0B45CED783}" srcOrd="0" destOrd="0" parTransId="{7D7A6DCD-DC31-4620-8446-6384915BEB48}" sibTransId="{2C6DD7C6-81F4-4F0E-B433-E8D4ADF0F4F4}"/>
+    <dgm:cxn modelId="{A90CE5C8-7DB4-4F32-9D56-991367F59844}" type="presOf" srcId="{0D80B354-E475-4C98-B296-2AF2A114EC17}" destId="{9F4CADAA-D6ED-4F9B-B7B7-8226349046ED}" srcOrd="0" destOrd="1" presId="urn:microsoft.com/office/officeart/2018/2/layout/IconVerticalSolidList"/>
+    <dgm:cxn modelId="{684DC2D5-52BD-418C-9B11-B178D6998E5D}" srcId="{BB22BC61-36F9-4002-9538-5067AD8FDF21}" destId="{CB1A77CE-9120-417E-A213-F485BF46BFF4}" srcOrd="2" destOrd="0" parTransId="{F6035E91-B4C8-4A82-9349-8C78504A6F07}" sibTransId="{BD5550B0-D421-4D6F-A254-D1E29772F6D2}"/>
+    <dgm:cxn modelId="{1974CCEB-212E-4770-B3A7-99EF3A2EBB47}" type="presOf" srcId="{9FE575E1-72E9-45E8-BAAB-FAB78166B841}" destId="{9F4CADAA-D6ED-4F9B-B7B7-8226349046ED}" srcOrd="0" destOrd="0" presId="urn:microsoft.com/office/officeart/2018/2/layout/IconVerticalSolidList"/>
+    <dgm:cxn modelId="{F8C1FBF3-C9C3-4BFF-BB1F-6CA09378B0AC}" srcId="{B4D01DF8-158E-4495-B7E5-B21B8ECF2254}" destId="{9FE575E1-72E9-45E8-BAAB-FAB78166B841}" srcOrd="0" destOrd="0" parTransId="{84FA4392-38D2-45E2-B45C-9B46144572C8}" sibTransId="{9AB1A5A1-EBF9-498B-8511-F4D12E8B982F}"/>
+    <dgm:cxn modelId="{8B17DDA7-E0F1-4E77-9965-5A832198E024}" type="presParOf" srcId="{24F9FAA0-59CB-4F2D-96B0-D726804B983F}" destId="{EE5673DB-44D1-4B69-9FF1-9AAB56C2F178}" srcOrd="0" destOrd="0" presId="urn:microsoft.com/office/officeart/2018/2/layout/IconVerticalSolidList"/>
+    <dgm:cxn modelId="{74BEBAD3-BFC9-4D6D-B0BD-424765E04612}" type="presParOf" srcId="{EE5673DB-44D1-4B69-9FF1-9AAB56C2F178}" destId="{0FB4868B-68C2-4D50-96F9-AD8167B78248}" srcOrd="0" destOrd="0" presId="urn:microsoft.com/office/officeart/2018/2/layout/IconVerticalSolidList"/>
+    <dgm:cxn modelId="{A04F60B4-F0CA-448C-84E7-40BA63E6BAB4}" type="presParOf" srcId="{EE5673DB-44D1-4B69-9FF1-9AAB56C2F178}" destId="{EE6DC079-799E-4C05-8C0E-43CA10FCEF26}" srcOrd="1" destOrd="0" presId="urn:microsoft.com/office/officeart/2018/2/layout/IconVerticalSolidList"/>
+    <dgm:cxn modelId="{AF7437D3-AFDB-414A-9EBF-CEC8F0131484}" type="presParOf" srcId="{EE5673DB-44D1-4B69-9FF1-9AAB56C2F178}" destId="{BE7FC246-0394-4BA9-A166-0D8A394F1E85}" srcOrd="2" destOrd="0" presId="urn:microsoft.com/office/officeart/2018/2/layout/IconVerticalSolidList"/>
+    <dgm:cxn modelId="{69B6687D-BEBF-4EEB-B42E-B97B9B384D70}" type="presParOf" srcId="{EE5673DB-44D1-4B69-9FF1-9AAB56C2F178}" destId="{FAC5E2E4-7E7E-42D8-884B-7C46265A2CCB}" srcOrd="3" destOrd="0" presId="urn:microsoft.com/office/officeart/2018/2/layout/IconVerticalSolidList"/>
+    <dgm:cxn modelId="{F24DB098-803B-4ECB-AFBD-5C8D197C3C10}" type="presParOf" srcId="{EE5673DB-44D1-4B69-9FF1-9AAB56C2F178}" destId="{8F7265C9-1769-4396-83E1-A720C8ACAFA0}" srcOrd="4" destOrd="0" presId="urn:microsoft.com/office/officeart/2018/2/layout/IconVerticalSolidList"/>
+    <dgm:cxn modelId="{1876D82C-5C80-4F91-AF63-616B951D21A7}" type="presParOf" srcId="{24F9FAA0-59CB-4F2D-96B0-D726804B983F}" destId="{0B6BFA52-90E1-42C3-A390-387BF3C48C7B}" srcOrd="1" destOrd="0" presId="urn:microsoft.com/office/officeart/2018/2/layout/IconVerticalSolidList"/>
+    <dgm:cxn modelId="{FBF33CC8-80C4-430A-B209-C9E28743FB40}" type="presParOf" srcId="{24F9FAA0-59CB-4F2D-96B0-D726804B983F}" destId="{9E2C07A9-8E0A-411E-8FF0-FF780CBFDC77}" srcOrd="2" destOrd="0" presId="urn:microsoft.com/office/officeart/2018/2/layout/IconVerticalSolidList"/>
+    <dgm:cxn modelId="{AAD02942-2BBC-4B4A-8D3F-EEAD8C6B63B7}" type="presParOf" srcId="{9E2C07A9-8E0A-411E-8FF0-FF780CBFDC77}" destId="{30CC0AA0-286B-4161-B0AE-1E0150753201}" srcOrd="0" destOrd="0" presId="urn:microsoft.com/office/officeart/2018/2/layout/IconVerticalSolidList"/>
+    <dgm:cxn modelId="{EB0EF988-88A0-4E02-9E38-1D6A7E1B7F99}" type="presParOf" srcId="{9E2C07A9-8E0A-411E-8FF0-FF780CBFDC77}" destId="{38406F51-7DA0-42C5-A695-AD1C0096A599}" srcOrd="1" destOrd="0" presId="urn:microsoft.com/office/officeart/2018/2/layout/IconVerticalSolidList"/>
+    <dgm:cxn modelId="{AB3110E2-5033-4934-81CA-FD8D2BA73E97}" type="presParOf" srcId="{9E2C07A9-8E0A-411E-8FF0-FF780CBFDC77}" destId="{1FF94973-0708-4B69-9B5C-888BCEF7463A}" srcOrd="2" destOrd="0" presId="urn:microsoft.com/office/officeart/2018/2/layout/IconVerticalSolidList"/>
+    <dgm:cxn modelId="{3F819EF0-7ACE-490C-9025-9D73A1860447}" type="presParOf" srcId="{9E2C07A9-8E0A-411E-8FF0-FF780CBFDC77}" destId="{A3BA8F70-91B7-4245-974D-24492BD8D277}" srcOrd="3" destOrd="0" presId="urn:microsoft.com/office/officeart/2018/2/layout/IconVerticalSolidList"/>
+    <dgm:cxn modelId="{AA92AF78-3792-4640-B1F4-0CF0F8507447}" type="presParOf" srcId="{24F9FAA0-59CB-4F2D-96B0-D726804B983F}" destId="{390C67E5-F7FF-498B-AF15-7061AF447389}" srcOrd="3" destOrd="0" presId="urn:microsoft.com/office/officeart/2018/2/layout/IconVerticalSolidList"/>
+    <dgm:cxn modelId="{D54BC16B-AFCE-41FB-AD11-FD7601E50780}" type="presParOf" srcId="{24F9FAA0-59CB-4F2D-96B0-D726804B983F}" destId="{A72FCC19-7952-433F-9D72-B2B4464C6F4B}" srcOrd="4" destOrd="0" presId="urn:microsoft.com/office/officeart/2018/2/layout/IconVerticalSolidList"/>
+    <dgm:cxn modelId="{983B5B10-3FBD-4448-9FA9-E219F34347A7}" type="presParOf" srcId="{A72FCC19-7952-433F-9D72-B2B4464C6F4B}" destId="{47C5FE82-41FC-41EE-99F1-5E9797534AD2}" srcOrd="0" destOrd="0" presId="urn:microsoft.com/office/officeart/2018/2/layout/IconVerticalSolidList"/>
+    <dgm:cxn modelId="{B6E4B5B7-BC99-457E-A56E-DD870CB2D52F}" type="presParOf" srcId="{A72FCC19-7952-433F-9D72-B2B4464C6F4B}" destId="{A9AC02F6-AFF6-4A43-BBBB-A14B118368A9}" srcOrd="1" destOrd="0" presId="urn:microsoft.com/office/officeart/2018/2/layout/IconVerticalSolidList"/>
+    <dgm:cxn modelId="{CBE71BEC-CE44-40B3-BF88-12FD4CD41FF1}" type="presParOf" srcId="{A72FCC19-7952-433F-9D72-B2B4464C6F4B}" destId="{F84BF5E0-FA72-4700-8FE2-6E0ACE0138E8}" srcOrd="2" destOrd="0" presId="urn:microsoft.com/office/officeart/2018/2/layout/IconVerticalSolidList"/>
+    <dgm:cxn modelId="{24C01500-6830-4433-A846-16C4C7D7F38E}" type="presParOf" srcId="{A72FCC19-7952-433F-9D72-B2B4464C6F4B}" destId="{3B98BDC6-143C-45A3-BE75-9B578458B622}" srcOrd="3" destOrd="0" presId="urn:microsoft.com/office/officeart/2018/2/layout/IconVerticalSolidList"/>
+    <dgm:cxn modelId="{F41CDB92-17B1-4C66-9269-39842B6FA880}" type="presParOf" srcId="{24F9FAA0-59CB-4F2D-96B0-D726804B983F}" destId="{81CB9048-4FB5-4A22-9B3F-F7FAEA10F357}" srcOrd="5" destOrd="0" presId="urn:microsoft.com/office/officeart/2018/2/layout/IconVerticalSolidList"/>
+    <dgm:cxn modelId="{4F27098F-DA99-457C-9E2E-F3ABAB3F2CBD}" type="presParOf" srcId="{24F9FAA0-59CB-4F2D-96B0-D726804B983F}" destId="{63FEDB6E-14B2-495B-8A36-F70017C48CF1}" srcOrd="6" destOrd="0" presId="urn:microsoft.com/office/officeart/2018/2/layout/IconVerticalSolidList"/>
+    <dgm:cxn modelId="{E9F68419-CBED-4E8B-A372-29EE970A1B33}" type="presParOf" srcId="{63FEDB6E-14B2-495B-8A36-F70017C48CF1}" destId="{656810EA-BFAC-454C-9AF6-57DB0453AB7E}" srcOrd="0" destOrd="0" presId="urn:microsoft.com/office/officeart/2018/2/layout/IconVerticalSolidList"/>
+    <dgm:cxn modelId="{2B03DE51-5045-4C27-B445-E27449DC3E3E}" type="presParOf" srcId="{63FEDB6E-14B2-495B-8A36-F70017C48CF1}" destId="{EABF5AD4-194F-472F-8613-5B934BE52857}" srcOrd="1" destOrd="0" presId="urn:microsoft.com/office/officeart/2018/2/layout/IconVerticalSolidList"/>
+    <dgm:cxn modelId="{025C1FB9-F0D8-4D1A-8B1F-31A90BF7DCF7}" type="presParOf" srcId="{63FEDB6E-14B2-495B-8A36-F70017C48CF1}" destId="{D47C93CF-8DC4-4372-8731-E106C8A90789}" srcOrd="2" destOrd="0" presId="urn:microsoft.com/office/officeart/2018/2/layout/IconVerticalSolidList"/>
+    <dgm:cxn modelId="{AE60DA71-07E4-45C0-A892-719BF45070CE}" type="presParOf" srcId="{63FEDB6E-14B2-495B-8A36-F70017C48CF1}" destId="{B455634F-8097-4ACF-87A4-99028224F2EA}" srcOrd="3" destOrd="0" presId="urn:microsoft.com/office/officeart/2018/2/layout/IconVerticalSolidList"/>
+    <dgm:cxn modelId="{A5E9A215-61D2-480F-BE27-3549CA3F7717}" type="presParOf" srcId="{63FEDB6E-14B2-495B-8A36-F70017C48CF1}" destId="{9F4CADAA-D6ED-4F9B-B7B7-8226349046ED}" srcOrd="4" destOrd="0" presId="urn:microsoft.com/office/officeart/2018/2/layout/IconVerticalSolidList"/>
+  </dgm:cxnLst>
+  <dgm:bg/>
+  <dgm:whole/>
+  <dgm:extLst>
+    <a:ext uri="http://schemas.microsoft.com/office/drawing/2008/diagram">
+      <dsp:dataModelExt xmlns:dsp="http://schemas.microsoft.com/office/drawing/2008/diagram" relId="rId6" minVer="http://schemas.openxmlformats.org/drawingml/2006/diagram"/>
+    </a:ext>
+  </dgm:extLst>
+</dgm:dataModel>
+</file>
+
+<file path=ppt/diagrams/drawing1.xml><?xml version="1.0" encoding="utf-8"?>
+<dsp:drawing xmlns:dgm="http://schemas.openxmlformats.org/drawingml/2006/diagram" xmlns:dsp="http://schemas.microsoft.com/office/drawing/2008/diagram" xmlns:a="http://schemas.openxmlformats.org/drawingml/2006/main">
+  <dsp:spTree>
+    <dsp:nvGrpSpPr>
+      <dsp:cNvPr id="0" name=""/>
+      <dsp:cNvGrpSpPr/>
+    </dsp:nvGrpSpPr>
+    <dsp:grpSpPr/>
+    <dsp:sp modelId="{0FB4868B-68C2-4D50-96F9-AD8167B78248}">
+      <dsp:nvSpPr>
+        <dsp:cNvPr id="0" name=""/>
+        <dsp:cNvSpPr/>
+      </dsp:nvSpPr>
+      <dsp:spPr>
+        <a:xfrm>
+          <a:off x="0" y="2125"/>
+          <a:ext cx="6582555" cy="1077378"/>
+        </a:xfrm>
+        <a:prstGeom prst="roundRect">
+          <a:avLst>
+            <a:gd name="adj" fmla="val 10000"/>
+          </a:avLst>
+        </a:prstGeom>
+        <a:solidFill>
+          <a:schemeClr val="accent2">
+            <a:hueOff val="0"/>
+            <a:satOff val="0"/>
+            <a:lumOff val="0"/>
+            <a:alphaOff val="0"/>
+          </a:schemeClr>
+        </a:solidFill>
+        <a:ln>
+          <a:noFill/>
+        </a:ln>
+        <a:effectLst/>
+      </dsp:spPr>
+      <dsp:style>
+        <a:lnRef idx="0">
+          <a:scrgbClr r="0" g="0" b="0"/>
+        </a:lnRef>
+        <a:fillRef idx="1">
+          <a:scrgbClr r="0" g="0" b="0"/>
+        </a:fillRef>
+        <a:effectRef idx="0">
+          <a:scrgbClr r="0" g="0" b="0"/>
+        </a:effectRef>
+        <a:fontRef idx="minor"/>
+      </dsp:style>
+    </dsp:sp>
+    <dsp:sp modelId="{EE6DC079-799E-4C05-8C0E-43CA10FCEF26}">
+      <dsp:nvSpPr>
+        <dsp:cNvPr id="0" name=""/>
+        <dsp:cNvSpPr/>
+      </dsp:nvSpPr>
+      <dsp:spPr>
+        <a:xfrm>
+          <a:off x="325906" y="244535"/>
+          <a:ext cx="592558" cy="592558"/>
+        </a:xfrm>
+        <a:prstGeom prst="rect">
+          <a:avLst/>
+        </a:prstGeom>
+        <a:blipFill>
+          <a:blip xmlns:r="http://schemas.openxmlformats.org/officeDocument/2006/relationships" r:embed="rId1">
+            <a:extLst>
+              <a:ext uri="{28A0092B-C50C-407E-A947-70E740481C1C}">
+                <a14:useLocalDpi xmlns:a14="http://schemas.microsoft.com/office/drawing/2010/main" val="0"/>
+              </a:ext>
+              <a:ext uri="{96DAC541-7B7A-43D3-8B79-37D633B846F1}">
+                <asvg:svgBlip xmlns:asvg="http://schemas.microsoft.com/office/drawing/2016/SVG/main" r:embed="rId2"/>
+              </a:ext>
+            </a:extLst>
+          </a:blip>
+          <a:stretch>
+            <a:fillRect/>
+          </a:stretch>
+        </a:blipFill>
+        <a:ln w="15875" cap="flat" cmpd="sng" algn="ctr">
+          <a:noFill/>
+          <a:prstDash val="solid"/>
+        </a:ln>
+        <a:effectLst/>
+      </dsp:spPr>
+      <dsp:style>
+        <a:lnRef idx="2">
+          <a:scrgbClr r="0" g="0" b="0"/>
+        </a:lnRef>
+        <a:fillRef idx="1">
+          <a:scrgbClr r="0" g="0" b="0"/>
+        </a:fillRef>
+        <a:effectRef idx="0">
+          <a:scrgbClr r="0" g="0" b="0"/>
+        </a:effectRef>
+        <a:fontRef idx="minor">
+          <a:schemeClr val="lt1"/>
+        </a:fontRef>
+      </dsp:style>
+    </dsp:sp>
+    <dsp:sp modelId="{FAC5E2E4-7E7E-42D8-884B-7C46265A2CCB}">
+      <dsp:nvSpPr>
+        <dsp:cNvPr id="0" name=""/>
+        <dsp:cNvSpPr/>
+      </dsp:nvSpPr>
+      <dsp:spPr>
+        <a:xfrm>
+          <a:off x="1244371" y="2125"/>
+          <a:ext cx="2962149" cy="1077378"/>
+        </a:xfrm>
+        <a:prstGeom prst="rect">
+          <a:avLst/>
+        </a:prstGeom>
+        <a:noFill/>
+        <a:ln>
+          <a:noFill/>
+        </a:ln>
+        <a:effectLst/>
+      </dsp:spPr>
+      <dsp:style>
+        <a:lnRef idx="0">
+          <a:scrgbClr r="0" g="0" b="0"/>
+        </a:lnRef>
+        <a:fillRef idx="0">
+          <a:scrgbClr r="0" g="0" b="0"/>
+        </a:fillRef>
+        <a:effectRef idx="0">
+          <a:scrgbClr r="0" g="0" b="0"/>
+        </a:effectRef>
+        <a:fontRef idx="minor"/>
+      </dsp:style>
+      <dsp:txBody>
+        <a:bodyPr spcFirstLastPara="0" vert="horz" wrap="square" lIns="114023" tIns="114023" rIns="114023" bIns="114023" numCol="1" spcCol="1270" anchor="ctr" anchorCtr="0">
+          <a:noAutofit/>
+        </a:bodyPr>
+        <a:lstStyle/>
+        <a:p>
+          <a:pPr marL="0" lvl="0" indent="0" algn="l" defTabSz="977900">
+            <a:lnSpc>
+              <a:spcPct val="90000"/>
+            </a:lnSpc>
+            <a:spcBef>
+              <a:spcPct val="0"/>
+            </a:spcBef>
+            <a:spcAft>
+              <a:spcPct val="35000"/>
+            </a:spcAft>
+            <a:buNone/>
+          </a:pPr>
+          <a:r>
+            <a:rPr lang="it-IT" sz="2200" kern="1200"/>
+            <a:t>Alta reattività:</a:t>
+          </a:r>
+          <a:endParaRPr lang="en-US" sz="2200" kern="1200"/>
+        </a:p>
+      </dsp:txBody>
+      <dsp:txXfrm>
+        <a:off x="1244371" y="2125"/>
+        <a:ext cx="2962149" cy="1077378"/>
+      </dsp:txXfrm>
+    </dsp:sp>
+    <dsp:sp modelId="{8F7265C9-1769-4396-83E1-A720C8ACAFA0}">
+      <dsp:nvSpPr>
+        <dsp:cNvPr id="0" name=""/>
+        <dsp:cNvSpPr/>
+      </dsp:nvSpPr>
+      <dsp:spPr>
+        <a:xfrm>
+          <a:off x="4206521" y="2125"/>
+          <a:ext cx="2376033" cy="1077378"/>
+        </a:xfrm>
+        <a:prstGeom prst="rect">
+          <a:avLst/>
+        </a:prstGeom>
+        <a:noFill/>
+        <a:ln>
+          <a:noFill/>
+        </a:ln>
+        <a:effectLst/>
+      </dsp:spPr>
+      <dsp:style>
+        <a:lnRef idx="0">
+          <a:scrgbClr r="0" g="0" b="0"/>
+        </a:lnRef>
+        <a:fillRef idx="0">
+          <a:scrgbClr r="0" g="0" b="0"/>
+        </a:fillRef>
+        <a:effectRef idx="0">
+          <a:scrgbClr r="0" g="0" b="0"/>
+        </a:effectRef>
+        <a:fontRef idx="minor"/>
+      </dsp:style>
+      <dsp:txBody>
+        <a:bodyPr spcFirstLastPara="0" vert="horz" wrap="square" lIns="114023" tIns="114023" rIns="114023" bIns="114023" numCol="1" spcCol="1270" anchor="ctr" anchorCtr="0">
+          <a:noAutofit/>
+        </a:bodyPr>
+        <a:lstStyle/>
+        <a:p>
+          <a:pPr marL="0" lvl="0" indent="0" algn="l" defTabSz="577850">
+            <a:lnSpc>
+              <a:spcPct val="90000"/>
+            </a:lnSpc>
+            <a:spcBef>
+              <a:spcPct val="0"/>
+            </a:spcBef>
+            <a:spcAft>
+              <a:spcPct val="35000"/>
+            </a:spcAft>
+            <a:buNone/>
+          </a:pPr>
+          <a:r>
+            <a:rPr lang="it-IT" sz="1300" kern="1200"/>
+            <a:t>gestione efficiente degli algoritmi di ricerca</a:t>
+          </a:r>
+          <a:endParaRPr lang="en-US" sz="1300" kern="1200"/>
+        </a:p>
+        <a:p>
+          <a:pPr marL="0" lvl="0" indent="0" algn="l" defTabSz="577850">
+            <a:lnSpc>
+              <a:spcPct val="90000"/>
+            </a:lnSpc>
+            <a:spcBef>
+              <a:spcPct val="0"/>
+            </a:spcBef>
+            <a:spcAft>
+              <a:spcPct val="35000"/>
+            </a:spcAft>
+            <a:buNone/>
+          </a:pPr>
+          <a:r>
+            <a:rPr lang="it-IT" sz="1300" kern="1200"/>
+            <a:t>interazione efficace con il database</a:t>
+          </a:r>
+          <a:endParaRPr lang="en-US" sz="1300" kern="1200"/>
+        </a:p>
+      </dsp:txBody>
+      <dsp:txXfrm>
+        <a:off x="4206521" y="2125"/>
+        <a:ext cx="2376033" cy="1077378"/>
+      </dsp:txXfrm>
+    </dsp:sp>
+    <dsp:sp modelId="{30CC0AA0-286B-4161-B0AE-1E0150753201}">
+      <dsp:nvSpPr>
+        <dsp:cNvPr id="0" name=""/>
+        <dsp:cNvSpPr/>
+      </dsp:nvSpPr>
+      <dsp:spPr>
+        <a:xfrm>
+          <a:off x="0" y="1348848"/>
+          <a:ext cx="6582555" cy="1077378"/>
+        </a:xfrm>
+        <a:prstGeom prst="roundRect">
+          <a:avLst>
+            <a:gd name="adj" fmla="val 10000"/>
+          </a:avLst>
+        </a:prstGeom>
+        <a:solidFill>
+          <a:schemeClr val="accent3">
+            <a:hueOff val="0"/>
+            <a:satOff val="0"/>
+            <a:lumOff val="0"/>
+            <a:alphaOff val="0"/>
+          </a:schemeClr>
+        </a:solidFill>
+        <a:ln>
+          <a:noFill/>
+        </a:ln>
+        <a:effectLst/>
+      </dsp:spPr>
+      <dsp:style>
+        <a:lnRef idx="0">
+          <a:scrgbClr r="0" g="0" b="0"/>
+        </a:lnRef>
+        <a:fillRef idx="1">
+          <a:scrgbClr r="0" g="0" b="0"/>
+        </a:fillRef>
+        <a:effectRef idx="0">
+          <a:scrgbClr r="0" g="0" b="0"/>
+        </a:effectRef>
+        <a:fontRef idx="minor"/>
+      </dsp:style>
+    </dsp:sp>
+    <dsp:sp modelId="{38406F51-7DA0-42C5-A695-AD1C0096A599}">
+      <dsp:nvSpPr>
+        <dsp:cNvPr id="0" name=""/>
+        <dsp:cNvSpPr/>
+      </dsp:nvSpPr>
+      <dsp:spPr>
+        <a:xfrm>
+          <a:off x="325906" y="1591258"/>
+          <a:ext cx="592558" cy="592558"/>
+        </a:xfrm>
+        <a:prstGeom prst="rect">
+          <a:avLst/>
+        </a:prstGeom>
+        <a:blipFill>
+          <a:blip xmlns:r="http://schemas.openxmlformats.org/officeDocument/2006/relationships" r:embed="rId3">
+            <a:extLst>
+              <a:ext uri="{28A0092B-C50C-407E-A947-70E740481C1C}">
+                <a14:useLocalDpi xmlns:a14="http://schemas.microsoft.com/office/drawing/2010/main" val="0"/>
+              </a:ext>
+              <a:ext uri="{96DAC541-7B7A-43D3-8B79-37D633B846F1}">
+                <asvg:svgBlip xmlns:asvg="http://schemas.microsoft.com/office/drawing/2016/SVG/main" r:embed="rId4"/>
+              </a:ext>
+            </a:extLst>
+          </a:blip>
+          <a:stretch>
+            <a:fillRect/>
+          </a:stretch>
+        </a:blipFill>
+        <a:ln w="15875" cap="flat" cmpd="sng" algn="ctr">
+          <a:noFill/>
+          <a:prstDash val="solid"/>
+        </a:ln>
+        <a:effectLst/>
+      </dsp:spPr>
+      <dsp:style>
+        <a:lnRef idx="2">
+          <a:scrgbClr r="0" g="0" b="0"/>
+        </a:lnRef>
+        <a:fillRef idx="1">
+          <a:scrgbClr r="0" g="0" b="0"/>
+        </a:fillRef>
+        <a:effectRef idx="0">
+          <a:scrgbClr r="0" g="0" b="0"/>
+        </a:effectRef>
+        <a:fontRef idx="minor">
+          <a:schemeClr val="lt1"/>
+        </a:fontRef>
+      </dsp:style>
+    </dsp:sp>
+    <dsp:sp modelId="{A3BA8F70-91B7-4245-974D-24492BD8D277}">
+      <dsp:nvSpPr>
+        <dsp:cNvPr id="0" name=""/>
+        <dsp:cNvSpPr/>
+      </dsp:nvSpPr>
+      <dsp:spPr>
+        <a:xfrm>
+          <a:off x="1244371" y="1348848"/>
+          <a:ext cx="5338183" cy="1077378"/>
+        </a:xfrm>
+        <a:prstGeom prst="rect">
+          <a:avLst/>
+        </a:prstGeom>
+        <a:noFill/>
+        <a:ln>
+          <a:noFill/>
+        </a:ln>
+        <a:effectLst/>
+      </dsp:spPr>
+      <dsp:style>
+        <a:lnRef idx="0">
+          <a:scrgbClr r="0" g="0" b="0"/>
+        </a:lnRef>
+        <a:fillRef idx="0">
+          <a:scrgbClr r="0" g="0" b="0"/>
+        </a:fillRef>
+        <a:effectRef idx="0">
+          <a:scrgbClr r="0" g="0" b="0"/>
+        </a:effectRef>
+        <a:fontRef idx="minor"/>
+      </dsp:style>
+      <dsp:txBody>
+        <a:bodyPr spcFirstLastPara="0" vert="horz" wrap="square" lIns="114023" tIns="114023" rIns="114023" bIns="114023" numCol="1" spcCol="1270" anchor="ctr" anchorCtr="0">
+          <a:noAutofit/>
+        </a:bodyPr>
+        <a:lstStyle/>
+        <a:p>
+          <a:pPr marL="0" lvl="0" indent="0" algn="l" defTabSz="977900">
+            <a:lnSpc>
+              <a:spcPct val="90000"/>
+            </a:lnSpc>
+            <a:spcBef>
+              <a:spcPct val="0"/>
+            </a:spcBef>
+            <a:spcAft>
+              <a:spcPct val="35000"/>
+            </a:spcAft>
+            <a:buNone/>
+          </a:pPr>
+          <a:r>
+            <a:rPr lang="it-IT" sz="2200" kern="1200"/>
+            <a:t>Interfaccia semplice e intuitiva</a:t>
+          </a:r>
+          <a:endParaRPr lang="en-US" sz="2200" kern="1200"/>
+        </a:p>
+      </dsp:txBody>
+      <dsp:txXfrm>
+        <a:off x="1244371" y="1348848"/>
+        <a:ext cx="5338183" cy="1077378"/>
+      </dsp:txXfrm>
+    </dsp:sp>
+    <dsp:sp modelId="{47C5FE82-41FC-41EE-99F1-5E9797534AD2}">
+      <dsp:nvSpPr>
+        <dsp:cNvPr id="0" name=""/>
+        <dsp:cNvSpPr/>
+      </dsp:nvSpPr>
+      <dsp:spPr>
+        <a:xfrm>
+          <a:off x="0" y="2695571"/>
+          <a:ext cx="6582555" cy="1077378"/>
+        </a:xfrm>
+        <a:prstGeom prst="roundRect">
+          <a:avLst>
+            <a:gd name="adj" fmla="val 10000"/>
+          </a:avLst>
+        </a:prstGeom>
+        <a:solidFill>
+          <a:schemeClr val="accent4">
+            <a:hueOff val="0"/>
+            <a:satOff val="0"/>
+            <a:lumOff val="0"/>
+            <a:alphaOff val="0"/>
+          </a:schemeClr>
+        </a:solidFill>
+        <a:ln>
+          <a:noFill/>
+        </a:ln>
+        <a:effectLst/>
+      </dsp:spPr>
+      <dsp:style>
+        <a:lnRef idx="0">
+          <a:scrgbClr r="0" g="0" b="0"/>
+        </a:lnRef>
+        <a:fillRef idx="1">
+          <a:scrgbClr r="0" g="0" b="0"/>
+        </a:fillRef>
+        <a:effectRef idx="0">
+          <a:scrgbClr r="0" g="0" b="0"/>
+        </a:effectRef>
+        <a:fontRef idx="minor"/>
+      </dsp:style>
+    </dsp:sp>
+    <dsp:sp modelId="{A9AC02F6-AFF6-4A43-BBBB-A14B118368A9}">
+      <dsp:nvSpPr>
+        <dsp:cNvPr id="0" name=""/>
+        <dsp:cNvSpPr/>
+      </dsp:nvSpPr>
+      <dsp:spPr>
+        <a:xfrm>
+          <a:off x="325906" y="2937981"/>
+          <a:ext cx="592558" cy="592558"/>
+        </a:xfrm>
+        <a:prstGeom prst="rect">
+          <a:avLst/>
+        </a:prstGeom>
+        <a:blipFill>
+          <a:blip xmlns:r="http://schemas.openxmlformats.org/officeDocument/2006/relationships" r:embed="rId5">
+            <a:extLst>
+              <a:ext uri="{28A0092B-C50C-407E-A947-70E740481C1C}">
+                <a14:useLocalDpi xmlns:a14="http://schemas.microsoft.com/office/drawing/2010/main" val="0"/>
+              </a:ext>
+              <a:ext uri="{96DAC541-7B7A-43D3-8B79-37D633B846F1}">
+                <asvg:svgBlip xmlns:asvg="http://schemas.microsoft.com/office/drawing/2016/SVG/main" r:embed="rId6"/>
+              </a:ext>
+            </a:extLst>
+          </a:blip>
+          <a:stretch>
+            <a:fillRect/>
+          </a:stretch>
+        </a:blipFill>
+        <a:ln w="15875" cap="flat" cmpd="sng" algn="ctr">
+          <a:noFill/>
+          <a:prstDash val="solid"/>
+        </a:ln>
+        <a:effectLst/>
+      </dsp:spPr>
+      <dsp:style>
+        <a:lnRef idx="2">
+          <a:scrgbClr r="0" g="0" b="0"/>
+        </a:lnRef>
+        <a:fillRef idx="1">
+          <a:scrgbClr r="0" g="0" b="0"/>
+        </a:fillRef>
+        <a:effectRef idx="0">
+          <a:scrgbClr r="0" g="0" b="0"/>
+        </a:effectRef>
+        <a:fontRef idx="minor">
+          <a:schemeClr val="lt1"/>
+        </a:fontRef>
+      </dsp:style>
+    </dsp:sp>
+    <dsp:sp modelId="{3B98BDC6-143C-45A3-BE75-9B578458B622}">
+      <dsp:nvSpPr>
+        <dsp:cNvPr id="0" name=""/>
+        <dsp:cNvSpPr/>
+      </dsp:nvSpPr>
+      <dsp:spPr>
+        <a:xfrm>
+          <a:off x="1244371" y="2695571"/>
+          <a:ext cx="5338183" cy="1077378"/>
+        </a:xfrm>
+        <a:prstGeom prst="rect">
+          <a:avLst/>
+        </a:prstGeom>
+        <a:noFill/>
+        <a:ln>
+          <a:noFill/>
+        </a:ln>
+        <a:effectLst/>
+      </dsp:spPr>
+      <dsp:style>
+        <a:lnRef idx="0">
+          <a:scrgbClr r="0" g="0" b="0"/>
+        </a:lnRef>
+        <a:fillRef idx="0">
+          <a:scrgbClr r="0" g="0" b="0"/>
+        </a:fillRef>
+        <a:effectRef idx="0">
+          <a:scrgbClr r="0" g="0" b="0"/>
+        </a:effectRef>
+        <a:fontRef idx="minor"/>
+      </dsp:style>
+      <dsp:txBody>
+        <a:bodyPr spcFirstLastPara="0" vert="horz" wrap="square" lIns="114023" tIns="114023" rIns="114023" bIns="114023" numCol="1" spcCol="1270" anchor="ctr" anchorCtr="0">
+          <a:noAutofit/>
+        </a:bodyPr>
+        <a:lstStyle/>
+        <a:p>
+          <a:pPr marL="0" lvl="0" indent="0" algn="l" defTabSz="977900">
+            <a:lnSpc>
+              <a:spcPct val="90000"/>
+            </a:lnSpc>
+            <a:spcBef>
+              <a:spcPct val="0"/>
+            </a:spcBef>
+            <a:spcAft>
+              <a:spcPct val="35000"/>
+            </a:spcAft>
+            <a:buNone/>
+          </a:pPr>
+          <a:r>
+            <a:rPr lang="it-IT" sz="2200" kern="1200"/>
+            <a:t>Necessità di integrare dati aggiornati</a:t>
+          </a:r>
+          <a:endParaRPr lang="en-US" sz="2200" kern="1200"/>
+        </a:p>
+      </dsp:txBody>
+      <dsp:txXfrm>
+        <a:off x="1244371" y="2695571"/>
+        <a:ext cx="5338183" cy="1077378"/>
+      </dsp:txXfrm>
+    </dsp:sp>
+    <dsp:sp modelId="{656810EA-BFAC-454C-9AF6-57DB0453AB7E}">
+      <dsp:nvSpPr>
+        <dsp:cNvPr id="0" name=""/>
+        <dsp:cNvSpPr/>
+      </dsp:nvSpPr>
+      <dsp:spPr>
+        <a:xfrm>
+          <a:off x="0" y="4042294"/>
+          <a:ext cx="6582555" cy="1077378"/>
+        </a:xfrm>
+        <a:prstGeom prst="roundRect">
+          <a:avLst>
+            <a:gd name="adj" fmla="val 10000"/>
+          </a:avLst>
+        </a:prstGeom>
+        <a:solidFill>
+          <a:schemeClr val="accent5">
+            <a:hueOff val="0"/>
+            <a:satOff val="0"/>
+            <a:lumOff val="0"/>
+            <a:alphaOff val="0"/>
+          </a:schemeClr>
+        </a:solidFill>
+        <a:ln>
+          <a:noFill/>
+        </a:ln>
+        <a:effectLst/>
+      </dsp:spPr>
+      <dsp:style>
+        <a:lnRef idx="0">
+          <a:scrgbClr r="0" g="0" b="0"/>
+        </a:lnRef>
+        <a:fillRef idx="1">
+          <a:scrgbClr r="0" g="0" b="0"/>
+        </a:fillRef>
+        <a:effectRef idx="0">
+          <a:scrgbClr r="0" g="0" b="0"/>
+        </a:effectRef>
+        <a:fontRef idx="minor"/>
+      </dsp:style>
+    </dsp:sp>
+    <dsp:sp modelId="{EABF5AD4-194F-472F-8613-5B934BE52857}">
+      <dsp:nvSpPr>
+        <dsp:cNvPr id="0" name=""/>
+        <dsp:cNvSpPr/>
+      </dsp:nvSpPr>
+      <dsp:spPr>
+        <a:xfrm>
+          <a:off x="325906" y="4284704"/>
+          <a:ext cx="592558" cy="592558"/>
+        </a:xfrm>
+        <a:prstGeom prst="rect">
+          <a:avLst/>
+        </a:prstGeom>
+        <a:blipFill>
+          <a:blip xmlns:r="http://schemas.openxmlformats.org/officeDocument/2006/relationships" r:embed="rId7">
+            <a:extLst>
+              <a:ext uri="{28A0092B-C50C-407E-A947-70E740481C1C}">
+                <a14:useLocalDpi xmlns:a14="http://schemas.microsoft.com/office/drawing/2010/main" val="0"/>
+              </a:ext>
+              <a:ext uri="{96DAC541-7B7A-43D3-8B79-37D633B846F1}">
+                <asvg:svgBlip xmlns:asvg="http://schemas.microsoft.com/office/drawing/2016/SVG/main" r:embed="rId8"/>
+              </a:ext>
+            </a:extLst>
+          </a:blip>
+          <a:stretch>
+            <a:fillRect/>
+          </a:stretch>
+        </a:blipFill>
+        <a:ln w="15875" cap="flat" cmpd="sng" algn="ctr">
+          <a:noFill/>
+          <a:prstDash val="solid"/>
+        </a:ln>
+        <a:effectLst/>
+      </dsp:spPr>
+      <dsp:style>
+        <a:lnRef idx="2">
+          <a:scrgbClr r="0" g="0" b="0"/>
+        </a:lnRef>
+        <a:fillRef idx="1">
+          <a:scrgbClr r="0" g="0" b="0"/>
+        </a:fillRef>
+        <a:effectRef idx="0">
+          <a:scrgbClr r="0" g="0" b="0"/>
+        </a:effectRef>
+        <a:fontRef idx="minor">
+          <a:schemeClr val="lt1"/>
+        </a:fontRef>
+      </dsp:style>
+    </dsp:sp>
+    <dsp:sp modelId="{B455634F-8097-4ACF-87A4-99028224F2EA}">
+      <dsp:nvSpPr>
+        <dsp:cNvPr id="0" name=""/>
+        <dsp:cNvSpPr/>
+      </dsp:nvSpPr>
+      <dsp:spPr>
+        <a:xfrm>
+          <a:off x="1244371" y="4042294"/>
+          <a:ext cx="2962149" cy="1077378"/>
+        </a:xfrm>
+        <a:prstGeom prst="rect">
+          <a:avLst/>
+        </a:prstGeom>
+        <a:noFill/>
+        <a:ln>
+          <a:noFill/>
+        </a:ln>
+        <a:effectLst/>
+      </dsp:spPr>
+      <dsp:style>
+        <a:lnRef idx="0">
+          <a:scrgbClr r="0" g="0" b="0"/>
+        </a:lnRef>
+        <a:fillRef idx="0">
+          <a:scrgbClr r="0" g="0" b="0"/>
+        </a:fillRef>
+        <a:effectRef idx="0">
+          <a:scrgbClr r="0" g="0" b="0"/>
+        </a:effectRef>
+        <a:fontRef idx="minor"/>
+      </dsp:style>
+      <dsp:txBody>
+        <a:bodyPr spcFirstLastPara="0" vert="horz" wrap="square" lIns="114023" tIns="114023" rIns="114023" bIns="114023" numCol="1" spcCol="1270" anchor="ctr" anchorCtr="0">
+          <a:noAutofit/>
+        </a:bodyPr>
+        <a:lstStyle/>
+        <a:p>
+          <a:pPr marL="0" lvl="0" indent="0" algn="l" defTabSz="977900">
+            <a:lnSpc>
+              <a:spcPct val="90000"/>
+            </a:lnSpc>
+            <a:spcBef>
+              <a:spcPct val="0"/>
+            </a:spcBef>
+            <a:spcAft>
+              <a:spcPct val="35000"/>
+            </a:spcAft>
+            <a:buNone/>
+          </a:pPr>
+          <a:r>
+            <a:rPr lang="it-IT" sz="2200" kern="1200"/>
+            <a:t>Necessità di gestione account</a:t>
+          </a:r>
+          <a:endParaRPr lang="en-US" sz="2200" kern="1200"/>
+        </a:p>
+      </dsp:txBody>
+      <dsp:txXfrm>
+        <a:off x="1244371" y="4042294"/>
+        <a:ext cx="2962149" cy="1077378"/>
+      </dsp:txXfrm>
+    </dsp:sp>
+    <dsp:sp modelId="{9F4CADAA-D6ED-4F9B-B7B7-8226349046ED}">
+      <dsp:nvSpPr>
+        <dsp:cNvPr id="0" name=""/>
+        <dsp:cNvSpPr/>
+      </dsp:nvSpPr>
+      <dsp:spPr>
+        <a:xfrm>
+          <a:off x="4206521" y="4042294"/>
+          <a:ext cx="2376033" cy="1077378"/>
+        </a:xfrm>
+        <a:prstGeom prst="rect">
+          <a:avLst/>
+        </a:prstGeom>
+        <a:noFill/>
+        <a:ln>
+          <a:noFill/>
+        </a:ln>
+        <a:effectLst/>
+      </dsp:spPr>
+      <dsp:style>
+        <a:lnRef idx="0">
+          <a:scrgbClr r="0" g="0" b="0"/>
+        </a:lnRef>
+        <a:fillRef idx="0">
+          <a:scrgbClr r="0" g="0" b="0"/>
+        </a:fillRef>
+        <a:effectRef idx="0">
+          <a:scrgbClr r="0" g="0" b="0"/>
+        </a:effectRef>
+        <a:fontRef idx="minor"/>
+      </dsp:style>
+      <dsp:txBody>
+        <a:bodyPr spcFirstLastPara="0" vert="horz" wrap="square" lIns="114023" tIns="114023" rIns="114023" bIns="114023" numCol="1" spcCol="1270" anchor="ctr" anchorCtr="0">
+          <a:noAutofit/>
+        </a:bodyPr>
+        <a:lstStyle/>
+        <a:p>
+          <a:pPr marL="0" lvl="0" indent="0" algn="l" defTabSz="577850">
+            <a:lnSpc>
+              <a:spcPct val="90000"/>
+            </a:lnSpc>
+            <a:spcBef>
+              <a:spcPct val="0"/>
+            </a:spcBef>
+            <a:spcAft>
+              <a:spcPct val="35000"/>
+            </a:spcAft>
+            <a:buNone/>
+          </a:pPr>
+          <a:r>
+            <a:rPr lang="it-IT" sz="1300" kern="1200"/>
+            <a:t>Impedire sovraccarico profili</a:t>
+          </a:r>
+          <a:endParaRPr lang="en-US" sz="1300" kern="1200"/>
+        </a:p>
+        <a:p>
+          <a:pPr marL="0" lvl="0" indent="0" algn="l" defTabSz="577850">
+            <a:lnSpc>
+              <a:spcPct val="90000"/>
+            </a:lnSpc>
+            <a:spcBef>
+              <a:spcPct val="0"/>
+            </a:spcBef>
+            <a:spcAft>
+              <a:spcPct val="35000"/>
+            </a:spcAft>
+            <a:buNone/>
+          </a:pPr>
+          <a:r>
+            <a:rPr lang="it-IT" sz="1300" kern="1200"/>
+            <a:t>Cancellare account inattivi</a:t>
+          </a:r>
+          <a:endParaRPr lang="en-US" sz="1300" kern="1200"/>
+        </a:p>
+      </dsp:txBody>
+      <dsp:txXfrm>
+        <a:off x="4206521" y="4042294"/>
+        <a:ext cx="2376033" cy="1077378"/>
+      </dsp:txXfrm>
+    </dsp:sp>
+  </dsp:spTree>
+</dsp:drawing>
+</file>
+
+<file path=ppt/diagrams/layout1.xml><?xml version="1.0" encoding="utf-8"?>
+<dgm:layoutDef xmlns:dgm="http://schemas.openxmlformats.org/drawingml/2006/diagram" xmlns:a="http://schemas.openxmlformats.org/drawingml/2006/main" uniqueId="urn:microsoft.com/office/officeart/2018/2/layout/IconVerticalSolidList">
+  <dgm:title val="Icon Vertical Solid List"/>
+  <dgm:desc val="Use to show a series of visuals from top to bottom with Level 1 or Level 1 and Level 2 text grouped in a shape. Works best with icons or small pictures with lengthier descriptions."/>
+  <dgm:catLst>
+    <dgm:cat type="icon" pri="500"/>
+  </dgm:catLst>
+  <dgm:sampData useDef="1">
+    <dgm:dataModel>
+      <dgm:ptLst/>
+      <dgm:bg/>
+      <dgm:whole/>
+    </dgm:dataModel>
+  </dgm:sampData>
+  <dgm:styleData useDef="1">
+    <dgm:dataModel>
+      <dgm:ptLst/>
+      <dgm:bg/>
+      <dgm:whole/>
+    </dgm:dataModel>
+  </dgm:styleData>
+  <dgm:clrData useDef="1">
+    <dgm:dataModel>
+      <dgm:ptLst/>
+      <dgm:bg/>
+      <dgm:whole/>
+    </dgm:dataModel>
+  </dgm:clrData>
+  <dgm:layoutNode name="root">
+    <dgm:varLst>
+      <dgm:dir/>
+      <dgm:resizeHandles val="exact"/>
+    </dgm:varLst>
+    <dgm:choose name="Name0">
+      <dgm:if name="Name1" axis="self" func="var" arg="dir" op="equ" val="norm">
+        <dgm:alg type="lin">
+          <dgm:param type="linDir" val="fromT"/>
+          <dgm:param type="nodeHorzAlign" val="l"/>
+        </dgm:alg>
+      </dgm:if>
+      <dgm:else name="Name2">
+        <dgm:alg type="lin">
+          <dgm:param type="linDir" val="fromT"/>
+          <dgm:param type="nodeHorzAlign" val="r"/>
+        </dgm:alg>
+      </dgm:else>
+    </dgm:choose>
+    <dgm:shape xmlns:r="http://schemas.openxmlformats.org/officeDocument/2006/relationships" r:blip="">
+      <dgm:adjLst/>
+    </dgm:shape>
+    <dgm:presOf/>
+    <dgm:choose name="Name3">
+      <dgm:if name="Name4" axis="ch" ptType="node" func="cnt" op="lte" val="3">
+        <dgm:constrLst>
+          <dgm:constr type="h" for="ch" forName="compNode" refType="h" fact="0.3"/>
+          <dgm:constr type="w" for="ch" forName="compNode" refType="w"/>
+          <dgm:constr type="h" for="ch" forName="sibTrans" refType="h" refFor="ch" refForName="compNode" fact="0.25"/>
+          <dgm:constr type="primFontSz" for="des" forName="parTx" val="25"/>
+          <dgm:constr type="primFontSz" for="des" forName="desTx" refType="primFontSz" refFor="des" refForName="parTx" op="lte" fact="0.75"/>
+          <dgm:constr type="h" for="des" forName="compNode" op="equ"/>
+          <dgm:constr type="h" for="des" forName="bgRect" op="equ"/>
+          <dgm:constr type="h" for="des" forName="iconRect" op="equ"/>
+          <dgm:constr type="w" for="des" forName="iconRect" op="equ"/>
+          <dgm:constr type="h" for="des" forName="spaceRect" op="equ"/>
+          <dgm:constr type="h" for="des" forName="parTx" op="equ"/>
+          <dgm:constr type="h" for="des" forName="desTx" op="equ"/>
+        </dgm:constrLst>
+      </dgm:if>
+      <dgm:if name="Name5" axis="ch" ptType="node" func="cnt" op="lte" val="4">
+        <dgm:constrLst>
+          <dgm:constr type="h" for="ch" forName="compNode" refType="h" fact="0.3"/>
+          <dgm:constr type="w" for="ch" forName="compNode" refType="w"/>
+          <dgm:constr type="h" for="ch" forName="sibTrans" refType="h" refFor="ch" refForName="compNode" fact="0.25"/>
+          <dgm:constr type="primFontSz" for="des" forName="parTx" val="22"/>
+          <dgm:constr type="primFontSz" for="des" forName="desTx" refType="primFontSz" refFor="des" refForName="parTx" op="lte" fact="0.75"/>
+          <dgm:constr type="h" for="des" forName="compNode" op="equ"/>
+          <dgm:constr type="h" for="des" forName="bgRect" op="equ"/>
+          <dgm:constr type="h" for="des" forName="iconRect" op="equ"/>
+          <dgm:constr type="w" for="des" forName="iconRect" op="equ"/>
+          <dgm:constr type="h" for="des" forName="spaceRect" op="equ"/>
+          <dgm:constr type="h" for="des" forName="parTx" op="equ"/>
+          <dgm:constr type="h" for="des" forName="desTx" op="equ"/>
+        </dgm:constrLst>
+      </dgm:if>
+      <dgm:if name="Name6" axis="ch" ptType="node" func="cnt" op="lte" val="6">
+        <dgm:constrLst>
+          <dgm:constr type="h" for="ch" forName="compNode" refType="h" fact="0.3"/>
+          <dgm:constr type="w" for="ch" forName="compNode" refType="w"/>
+          <dgm:constr type="h" for="ch" forName="sibTrans" refType="h" refFor="ch" refForName="compNode" fact="0.25"/>
+          <dgm:constr type="primFontSz" for="des" forName="parTx" val="19"/>
+          <dgm:constr type="primFontSz" for="des" forName="desTx" refType="primFontSz" refFor="des" refForName="parTx" op="lte" fact="0.75"/>
+          <dgm:constr type="h" for="des" forName="compNode" op="equ"/>
+          <dgm:constr type="h" for="des" forName="bgRect" op="equ"/>
+          <dgm:constr type="h" for="des" forName="iconRect" op="equ"/>
+          <dgm:constr type="w" for="des" forName="iconRect" op="equ"/>
+          <dgm:constr type="h" for="des" forName="spaceRect" op="equ"/>
+          <dgm:constr type="h" for="des" forName="parTx" op="equ"/>
+          <dgm:constr type="h" for="des" forName="desTx" op="equ"/>
+        </dgm:constrLst>
+      </dgm:if>
+      <dgm:else name="Name7">
+        <dgm:constrLst>
+          <dgm:constr type="h" for="ch" forName="compNode" refType="h" fact="0.3"/>
+          <dgm:constr type="w" for="ch" forName="compNode" refType="w"/>
+          <dgm:constr type="h" for="ch" forName="sibTrans" refType="h" refFor="ch" refForName="compNode" fact="0.25"/>
+          <dgm:constr type="primFontSz" for="des" forName="parTx" val="16"/>
+          <dgm:constr type="primFontSz" for="des" forName="desTx" refType="primFontSz" refFor="des" refForName="parTx" op="lte" fact="0.75"/>
+          <dgm:constr type="h" for="des" forName="compNode" op="equ"/>
+          <dgm:constr type="h" for="des" forName="bgRect" op="equ"/>
+          <dgm:constr type="h" for="des" forName="iconRect" op="equ"/>
+          <dgm:constr type="w" for="des" forName="iconRect" op="equ"/>
+          <dgm:constr type="h" for="des" forName="spaceRect" op="equ"/>
+          <dgm:constr type="h" for="des" forName="parTx" op="equ"/>
+          <dgm:constr type="h" for="des" forName="desTx" op="equ"/>
+        </dgm:constrLst>
+      </dgm:else>
+    </dgm:choose>
+    <dgm:ruleLst>
+      <dgm:rule type="h" for="ch" forName="compNode" val="0" fact="NaN" max="NaN"/>
+    </dgm:ruleLst>
+    <dgm:forEach name="Name8" axis="ch" ptType="node">
+      <dgm:layoutNode name="compNode">
+        <dgm:alg type="composite"/>
+        <dgm:shape xmlns:r="http://schemas.openxmlformats.org/officeDocument/2006/relationships" r:blip="">
+          <dgm:adjLst/>
+        </dgm:shape>
+        <dgm:presOf axis="self"/>
+        <dgm:choose name="Name9">
+          <dgm:if name="Name10" axis="ch" ptType="node" func="cnt" op="gte" val="1">
+            <dgm:constrLst>
+              <dgm:constr type="w" for="ch" forName="bgRect" refType="w"/>
+              <dgm:constr type="h" for="ch" forName="bgRect" refType="h"/>
+              <dgm:constr type="l" for="ch" forName="bgRect"/>
+              <dgm:constr type="t" for="ch" forName="bgRect"/>
+              <dgm:constr type="h" for="ch" forName="iconRect" refType="h" fact="0.55"/>
+              <dgm:constr type="w" for="ch" forName="iconRect" refType="h" refFor="ch" refForName="iconRect"/>
+              <dgm:constr type="l" for="ch" forName="iconRect" refType="h" refFor="ch" refForName="iconRect" fact="0.55"/>
+              <dgm:constr type="ctrY" for="ch" forName="iconRect" refType="ctrY" refFor="ch" refForName="bgRect"/>
+              <dgm:constr type="w" for="ch" forName="spaceRect" refType="l" refFor="ch" refForName="iconRect"/>
+              <dgm:constr type="h" for="ch" forName="spaceRect" refType="h"/>
+              <dgm:constr type="l" for="ch" forName="spaceRect" refType="r" refFor="ch" refForName="iconRect"/>
+              <dgm:constr type="t" for="ch" forName="spaceRect"/>
+              <dgm:constr type="w" for="ch" forName="parTx" refType="w" fact="0.45"/>
+              <dgm:constr type="h" for="ch" forName="parTx" refType="h"/>
+              <dgm:constr type="l" for="ch" forName="parTx" refType="r" refFor="ch" refForName="spaceRect"/>
+              <dgm:constr type="t" for="ch" forName="parTx"/>
+              <dgm:constr type="h" for="ch" forName="desTx" refType="h"/>
+              <dgm:constr type="l" for="ch" forName="desTx" refType="r" refFor="ch" refForName="parTx"/>
+              <dgm:constr type="t" for="ch" forName="desTx"/>
+            </dgm:constrLst>
+          </dgm:if>
+          <dgm:else name="Name11">
+            <dgm:constrLst>
+              <dgm:constr type="w" for="ch" forName="bgRect" refType="w"/>
+              <dgm:constr type="h" for="ch" forName="bgRect" refType="h"/>
+              <dgm:constr type="l" for="ch" forName="bgRect"/>
+              <dgm:constr type="t" for="ch" forName="bgRect"/>
+              <dgm:constr type="h" for="ch" forName="iconRect" refType="h" fact="0.55"/>
+              <dgm:constr type="w" for="ch" forName="iconRect" refType="h" refFor="ch" refForName="iconRect"/>
+              <dgm:constr type="l" for="ch" forName="iconRect" refType="h" refFor="ch" refForName="iconRect" fact="0.55"/>
+              <dgm:constr type="ctrY" for="ch" forName="iconRect" refType="ctrY" refFor="ch" refForName="bgRect"/>
+              <dgm:constr type="w" for="ch" forName="spaceRect" refType="l" refFor="ch" refForName="iconRect"/>
+              <dgm:constr type="h" for="ch" forName="spaceRect" refType="h"/>
+              <dgm:constr type="l" for="ch" forName="spaceRect" refType="r" refFor="ch" refForName="iconRect"/>
+              <dgm:constr type="t" for="ch" forName="spaceRect"/>
+              <dgm:constr type="h" for="ch" forName="parTx" refType="h"/>
+              <dgm:constr type="l" for="ch" forName="parTx" refType="r" refFor="ch" refForName="spaceRect"/>
+              <dgm:constr type="t" for="ch" forName="parTx"/>
+            </dgm:constrLst>
+          </dgm:else>
+        </dgm:choose>
+        <dgm:ruleLst>
+          <dgm:rule type="h" val="INF" fact="NaN" max="NaN"/>
+        </dgm:ruleLst>
+        <dgm:layoutNode name="bgRect" styleLbl="bgShp">
+          <dgm:alg type="sp"/>
+          <dgm:shape xmlns:r="http://schemas.openxmlformats.org/officeDocument/2006/relationships" type="roundRect" r:blip="">
+            <dgm:adjLst>
+              <dgm:adj idx="1" val="0.1"/>
+            </dgm:adjLst>
+          </dgm:shape>
+          <dgm:presOf/>
+          <dgm:constrLst/>
+          <dgm:ruleLst/>
+        </dgm:layoutNode>
+        <dgm:layoutNode name="iconRect" styleLbl="node1">
+          <dgm:alg type="sp"/>
+          <dgm:shape xmlns:r="http://schemas.openxmlformats.org/officeDocument/2006/relationships" type="rect" r:blip="" blipPhldr="1">
+            <dgm:adjLst/>
+          </dgm:shape>
+          <dgm:presOf/>
+          <dgm:constrLst/>
+          <dgm:ruleLst/>
+        </dgm:layoutNode>
+        <dgm:layoutNode name="spaceRect">
+          <dgm:alg type="sp"/>
+          <dgm:shape xmlns:r="http://schemas.openxmlformats.org/officeDocument/2006/relationships" r:blip="">
+            <dgm:adjLst/>
+          </dgm:shape>
+          <dgm:presOf/>
+          <dgm:constrLst/>
+          <dgm:ruleLst/>
+        </dgm:layoutNode>
+        <dgm:layoutNode name="parTx" styleLbl="revTx">
+          <dgm:varLst>
+            <dgm:chMax val="0"/>
+            <dgm:chPref val="0"/>
+          </dgm:varLst>
+          <dgm:alg type="tx">
+            <dgm:param type="txAnchorVert" val="mid"/>
+            <dgm:param type="parTxLTRAlign" val="l"/>
+            <dgm:param type="shpTxLTRAlignCh" val="l"/>
+            <dgm:param type="parTxRTLAlign" val="r"/>
+            <dgm:param type="shpTxRTLAlignCh" val="r"/>
+          </dgm:alg>
+          <dgm:shape xmlns:r="http://schemas.openxmlformats.org/officeDocument/2006/relationships" type="rect" r:blip="">
+            <dgm:adjLst/>
+          </dgm:shape>
+          <dgm:presOf axis="self" ptType="node"/>
+          <dgm:constrLst>
+            <dgm:constr type="lMarg" refType="h" fact="0.3"/>
+            <dgm:constr type="rMarg" refType="h" fact="0.3"/>
+            <dgm:constr type="tMarg" refType="h" fact="0.3"/>
+            <dgm:constr type="bMarg" refType="h" fact="0.3"/>
+          </dgm:constrLst>
+          <dgm:ruleLst>
+            <dgm:rule type="primFontSz" val="14" fact="NaN" max="NaN"/>
+            <dgm:rule type="h" val="INF" fact="NaN" max="NaN"/>
+          </dgm:ruleLst>
+        </dgm:layoutNode>
+        <dgm:choose name="Name12">
+          <dgm:if name="Name13" axis="ch" ptType="node" func="cnt" op="gte" val="1">
+            <dgm:layoutNode name="desTx" styleLbl="revTx">
+              <dgm:varLst/>
+              <dgm:alg type="tx">
+                <dgm:param type="txAnchorVertCh" val="mid"/>
+                <dgm:param type="parTxLTRAlign" val="l"/>
+                <dgm:param type="shpTxLTRAlignCh" val="l"/>
+                <dgm:param type="parTxRTLAlign" val="r"/>
+                <dgm:param type="shpTxRTLAlignCh" val="r"/>
+                <dgm:param type="stBulletLvl" val="0"/>
+              </dgm:alg>
+              <dgm:shape xmlns:r="http://schemas.openxmlformats.org/officeDocument/2006/relationships" type="rect" r:blip="">
+                <dgm:adjLst/>
+              </dgm:shape>
+              <dgm:presOf axis="des" ptType="node"/>
+              <dgm:constrLst>
+                <dgm:constr type="primFontSz" val="18"/>
+                <dgm:constr type="secFontSz" refType="primFontSz"/>
+                <dgm:constr type="lMarg" refType="h" fact="0.3"/>
+                <dgm:constr type="rMarg" refType="h" fact="0.3"/>
+                <dgm:constr type="tMarg" refType="h" fact="0.3"/>
+                <dgm:constr type="bMarg" refType="h" fact="0.3"/>
+              </dgm:constrLst>
+              <dgm:ruleLst>
+                <dgm:rule type="primFontSz" val="11" fact="NaN" max="NaN"/>
+              </dgm:ruleLst>
+            </dgm:layoutNode>
+          </dgm:if>
+          <dgm:else name="Name14"/>
+        </dgm:choose>
+      </dgm:layoutNode>
+      <dgm:forEach name="Name15" axis="followSib" ptType="sibTrans" cnt="1">
+        <dgm:layoutNode name="sibTrans">
+          <dgm:alg type="sp"/>
+          <dgm:shape xmlns:r="http://schemas.openxmlformats.org/officeDocument/2006/relationships" r:blip="">
+            <dgm:adjLst/>
+          </dgm:shape>
+          <dgm:presOf axis="self"/>
+          <dgm:constrLst/>
+          <dgm:ruleLst/>
+        </dgm:layoutNode>
+      </dgm:forEach>
+    </dgm:forEach>
+  </dgm:layoutNode>
+  <dgm:extLst>
+    <a:ext uri="{68A01E43-0DF5-4B5B-8FA6-DAF915123BFB}">
+      <dgm1612:lstStyle xmlns:dgm1612="http://schemas.microsoft.com/office/drawing/2016/12/diagram">
+        <a:lvl1pPr>
+          <a:lnSpc>
+            <a:spcPct val="100000"/>
+          </a:lnSpc>
+        </a:lvl1pPr>
+        <a:lvl2pPr>
+          <a:lnSpc>
+            <a:spcPct val="100000"/>
+          </a:lnSpc>
+        </a:lvl2pPr>
+      </dgm1612:lstStyle>
+    </a:ext>
+  </dgm:extLst>
+</dgm:layoutDef>
+</file>
+
+<file path=ppt/diagrams/quickStyle1.xml><?xml version="1.0" encoding="utf-8"?>
+<dgm:styleDef xmlns:dgm="http://schemas.openxmlformats.org/drawingml/2006/diagram" xmlns:a="http://schemas.openxmlformats.org/drawingml/2006/main" uniqueId="urn:microsoft.com/office/officeart/2005/8/quickstyle/simple1">
+  <dgm:title val=""/>
+  <dgm:desc val=""/>
+  <dgm:catLst>
+    <dgm:cat type="simple" pri="10100"/>
+  </dgm:catLst>
+  <dgm:scene3d>
+    <a:camera prst="orthographicFront"/>
+    <a:lightRig rig="threePt" dir="t"/>
+  </dgm:scene3d>
+  <dgm:styleLbl name="node0">
+    <dgm:scene3d>
+      <a:camera prst="orthographicFront"/>
+      <a:lightRig rig="threePt" dir="t"/>
+    </dgm:scene3d>
+    <dgm:sp3d/>
+    <dgm:txPr/>
+    <dgm:style>
+      <a:lnRef idx="2">
+        <a:scrgbClr r="0" g="0" b="0"/>
+      </a:lnRef>
+      <a:fillRef idx="1">
+        <a:scrgbClr r="0" g="0" b="0"/>
+      </a:fillRef>
+      <a:effectRef idx="0">
+        <a:scrgbClr r="0" g="0" b="0"/>
+      </a:effectRef>
+      <a:fontRef idx="minor">
+        <a:schemeClr val="lt1"/>
+      </a:fontRef>
+    </dgm:style>
+  </dgm:styleLbl>
+  <dgm:styleLbl name="lnNode1">
+    <dgm:scene3d>
+      <a:camera prst="orthographicFront"/>
+      <a:lightRig rig="threePt" dir="t"/>
+    </dgm:scene3d>
+    <dgm:sp3d/>
+    <dgm:txPr/>
+    <dgm:style>
+      <a:lnRef idx="2">
+        <a:scrgbClr r="0" g="0" b="0"/>
+      </a:lnRef>
+      <a:fillRef idx="1">
+        <a:scrgbClr r="0" g="0" b="0"/>
+      </a:fillRef>
+      <a:effectRef idx="0">
+        <a:scrgbClr r="0" g="0" b="0"/>
+      </a:effectRef>
+      <a:fontRef idx="minor">
+        <a:schemeClr val="lt1"/>
+      </a:fontRef>
+    </dgm:style>
+  </dgm:styleLbl>
+  <dgm:styleLbl name="vennNode1">
+    <dgm:scene3d>
+      <a:camera prst="orthographicFront"/>
+      <a:lightRig rig="threePt" dir="t"/>
+    </dgm:scene3d>
+    <dgm:sp3d/>
+    <dgm:txPr/>
+    <dgm:style>
+      <a:lnRef idx="2">
+        <a:scrgbClr r="0" g="0" b="0"/>
+      </a:lnRef>
+      <a:fillRef idx="1">
+        <a:scrgbClr r="0" g="0" b="0"/>
+      </a:fillRef>
+      <a:effectRef idx="0">
+        <a:scrgbClr r="0" g="0" b="0"/>
+      </a:effectRef>
+      <a:fontRef idx="minor">
+        <a:schemeClr val="tx1"/>
+      </a:fontRef>
+    </dgm:style>
+  </dgm:styleLbl>
+  <dgm:styleLbl name="alignNode1">
+    <dgm:scene3d>
+      <a:camera prst="orthographicFront"/>
+      <a:lightRig rig="threePt" dir="t"/>
+    </dgm:scene3d>
+    <dgm:sp3d/>
+    <dgm:txPr/>
+    <dgm:style>
+      <a:lnRef idx="2">
+        <a:scrgbClr r="0" g="0" b="0"/>
+      </a:lnRef>
+      <a:fillRef idx="1">
+        <a:scrgbClr r="0" g="0" b="0"/>
+      </a:fillRef>
+      <a:effectRef idx="0">
+        <a:scrgbClr r="0" g="0" b="0"/>
+      </a:effectRef>
+      <a:fontRef idx="minor">
+        <a:schemeClr val="lt1"/>
+      </a:fontRef>
+    </dgm:style>
+  </dgm:styleLbl>
+  <dgm:styleLbl name="node1">
+    <dgm:scene3d>
+      <a:camera prst="orthographicFront"/>
+      <a:lightRig rig="threePt" dir="t"/>
+    </dgm:scene3d>
+    <dgm:sp3d/>
+    <dgm:txPr/>
+    <dgm:style>
+      <a:lnRef idx="2">
+        <a:scrgbClr r="0" g="0" b="0"/>
+      </a:lnRef>
+      <a:fillRef idx="1">
+        <a:scrgbClr r="0" g="0" b="0"/>
+      </a:fillRef>
+      <a:effectRef idx="0">
+        <a:scrgbClr r="0" g="0" b="0"/>
+      </a:effectRef>
+      <a:fontRef idx="minor">
+        <a:schemeClr val="lt1"/>
+      </a:fontRef>
+    </dgm:style>
+  </dgm:styleLbl>
+  <dgm:styleLbl name="node2">
+    <dgm:scene3d>
+      <a:camera prst="orthographicFront"/>
+      <a:lightRig rig="threePt" dir="t"/>
+    </dgm:scene3d>
+    <dgm:sp3d/>
+    <dgm:txPr/>
+    <dgm:style>
+      <a:lnRef idx="2">
+        <a:scrgbClr r="0" g="0" b="0"/>
+      </a:lnRef>
+      <a:fillRef idx="1">
+        <a:scrgbClr r="0" g="0" b="0"/>
+      </a:fillRef>
+      <a:effectRef idx="0">
+        <a:scrgbClr r="0" g="0" b="0"/>
+      </a:effectRef>
+      <a:fontRef idx="minor">
+        <a:schemeClr val="lt1"/>
+      </a:fontRef>
+    </dgm:style>
+  </dgm:styleLbl>
+  <dgm:styleLbl name="node3">
+    <dgm:scene3d>
+      <a:camera prst="orthographicFront"/>
+      <a:lightRig rig="threePt" dir="t"/>
+    </dgm:scene3d>
+    <dgm:sp3d/>
+    <dgm:txPr/>
+    <dgm:style>
+      <a:lnRef idx="2">
+        <a:scrgbClr r="0" g="0" b="0"/>
+      </a:lnRef>
+      <a:fillRef idx="1">
+        <a:scrgbClr r="0" g="0" b="0"/>
+      </a:fillRef>
+      <a:effectRef idx="0">
+        <a:scrgbClr r="0" g="0" b="0"/>
+      </a:effectRef>
+      <a:fontRef idx="minor">
+        <a:schemeClr val="lt1"/>
+      </a:fontRef>
+    </dgm:style>
+  </dgm:styleLbl>
+  <dgm:styleLbl name="node4">
+    <dgm:scene3d>
+      <a:camera prst="orthographicFront"/>
+      <a:lightRig rig="threePt" dir="t"/>
+    </dgm:scene3d>
+    <dgm:sp3d/>
+    <dgm:txPr/>
+    <dgm:style>
+      <a:lnRef idx="2">
+        <a:scrgbClr r="0" g="0" b="0"/>
+      </a:lnRef>
+      <a:fillRef idx="1">
+        <a:scrgbClr r="0" g="0" b="0"/>
+      </a:fillRef>
+      <a:effectRef idx="0">
+        <a:scrgbClr r="0" g="0" b="0"/>
+      </a:effectRef>
+      <a:fontRef idx="minor">
+        <a:schemeClr val="lt1"/>
+      </a:fontRef>
+    </dgm:style>
+  </dgm:styleLbl>
+  <dgm:styleLbl name="fgImgPlace1">
+    <dgm:scene3d>
+      <a:camera prst="orthographicFront"/>
+      <a:lightRig rig="threePt" dir="t"/>
+    </dgm:scene3d>
+    <dgm:sp3d/>
+    <dgm:txPr/>
+    <dgm:style>
+      <a:lnRef idx="2">
+        <a:scrgbClr r="0" g="0" b="0"/>
+      </a:lnRef>
+      <a:fillRef idx="1">
+        <a:scrgbClr r="0" g="0" b="0"/>
+      </a:fillRef>
+      <a:effectRef idx="0">
+        <a:scrgbClr r="0" g="0" b="0"/>
+      </a:effectRef>
+      <a:fontRef idx="minor"/>
+    </dgm:style>
+  </dgm:styleLbl>
+  <dgm:styleLbl name="alignImgPlace1">
+    <dgm:scene3d>
+      <a:camera prst="orthographicFront"/>
+      <a:lightRig rig="threePt" dir="t"/>
+    </dgm:scene3d>
+    <dgm:sp3d/>
+    <dgm:txPr/>
+    <dgm:style>
+      <a:lnRef idx="2">
+        <a:scrgbClr r="0" g="0" b="0"/>
+      </a:lnRef>
+      <a:fillRef idx="1">
+        <a:scrgbClr r="0" g="0" b="0"/>
+      </a:fillRef>
+      <a:effectRef idx="0">
+        <a:scrgbClr r="0" g="0" b="0"/>
+      </a:effectRef>
+      <a:fontRef idx="minor"/>
+    </dgm:style>
+  </dgm:styleLbl>
+  <dgm:styleLbl name="bgImgPlace1">
+    <dgm:scene3d>
+      <a:camera prst="orthographicFront"/>
+      <a:lightRig rig="threePt" dir="t"/>
+    </dgm:scene3d>
+    <dgm:sp3d/>
+    <dgm:txPr/>
+    <dgm:style>
+      <a:lnRef idx="2">
+        <a:scrgbClr r="0" g="0" b="0"/>
+      </a:lnRef>
+      <a:fillRef idx="1">
+        <a:scrgbClr r="0" g="0" b="0"/>
+      </a:fillRef>
+      <a:effectRef idx="0">
+        <a:scrgbClr r="0" g="0" b="0"/>
+      </a:effectRef>
+      <a:fontRef idx="minor"/>
+    </dgm:style>
+  </dgm:styleLbl>
+  <dgm:styleLbl name="sibTrans2D1">
+    <dgm:scene3d>
+      <a:camera prst="orthographicFront"/>
+      <a:lightRig rig="threePt" dir="t"/>
+    </dgm:scene3d>
+    <dgm:sp3d/>
+    <dgm:txPr/>
+    <dgm:style>
+      <a:lnRef idx="0">
+        <a:scrgbClr r="0" g="0" b="0"/>
+      </a:lnRef>
+      <a:fillRef idx="1">
+        <a:scrgbClr r="0" g="0" b="0"/>
+      </a:fillRef>
+      <a:effectRef idx="0">
+        <a:scrgbClr r="0" g="0" b="0"/>
+      </a:effectRef>
+      <a:fontRef idx="minor">
+        <a:schemeClr val="lt1"/>
+      </a:fontRef>
+    </dgm:style>
+  </dgm:styleLbl>
+  <dgm:styleLbl name="fgSibTrans2D1">
+    <dgm:scene3d>
+      <a:camera prst="orthographicFront"/>
+      <a:lightRig rig="threePt" dir="t"/>
+    </dgm:scene3d>
+    <dgm:sp3d/>
+    <dgm:txPr/>
+    <dgm:style>
+      <a:lnRef idx="0">
+        <a:scrgbClr r="0" g="0" b="0"/>
+      </a:lnRef>
+      <a:fillRef idx="1">
+        <a:scrgbClr r="0" g="0" b="0"/>
+      </a:fillRef>
+      <a:effectRef idx="0">
+        <a:scrgbClr r="0" g="0" b="0"/>
+      </a:effectRef>
+      <a:fontRef idx="minor">
+        <a:schemeClr val="lt1"/>
+      </a:fontRef>
+    </dgm:style>
+  </dgm:styleLbl>
+  <dgm:styleLbl name="bgSibTrans2D1">
+    <dgm:scene3d>
+      <a:camera prst="orthographicFront"/>
+      <a:lightRig rig="threePt" dir="t"/>
+    </dgm:scene3d>
+    <dgm:sp3d/>
+    <dgm:txPr/>
+    <dgm:style>
+      <a:lnRef idx="0">
+        <a:scrgbClr r="0" g="0" b="0"/>
+      </a:lnRef>
+      <a:fillRef idx="1">
+        <a:scrgbClr r="0" g="0" b="0"/>
+      </a:fillRef>
+      <a:effectRef idx="0">
+        <a:scrgbClr r="0" g="0" b="0"/>
+      </a:effectRef>
+      <a:fontRef idx="minor">
+        <a:schemeClr val="lt1"/>
+      </a:fontRef>
+    </dgm:style>
+  </dgm:styleLbl>
+  <dgm:styleLbl name="sibTrans1D1">
+    <dgm:scene3d>
+      <a:camera prst="orthographicFront"/>
+      <a:lightRig rig="threePt" dir="t"/>
+    </dgm:scene3d>
+    <dgm:sp3d/>
+    <dgm:txPr/>
+    <dgm:style>
+      <a:lnRef idx="1">
+        <a:scrgbClr r="0" g="0" b="0"/>
+      </a:lnRef>
+      <a:fillRef idx="0">
+        <a:scrgbClr r="0" g="0" b="0"/>
+      </a:fillRef>
+      <a:effectRef idx="0">
+        <a:scrgbClr r="0" g="0" b="0"/>
+      </a:effectRef>
+      <a:fontRef idx="minor"/>
+    </dgm:style>
+  </dgm:styleLbl>
+  <dgm:styleLbl name="callout">
+    <dgm:scene3d>
+      <a:camera prst="orthographicFront"/>
+      <a:lightRig rig="threePt" dir="t"/>
+    </dgm:scene3d>
+    <dgm:sp3d/>
+    <dgm:txPr/>
+    <dgm:style>
+      <a:lnRef idx="2">
+        <a:scrgbClr r="0" g="0" b="0"/>
+      </a:lnRef>
+      <a:fillRef idx="1">
+        <a:scrgbClr r="0" g="0" b="0"/>
+      </a:fillRef>
+      <a:effectRef idx="0">
+        <a:scrgbClr r="0" g="0" b="0"/>
+      </a:effectRef>
+      <a:fontRef idx="minor"/>
+    </dgm:style>
+  </dgm:styleLbl>
+  <dgm:styleLbl name="asst0">
+    <dgm:scene3d>
+      <a:camera prst="orthographicFront"/>
+      <a:lightRig rig="threePt" dir="t"/>
+    </dgm:scene3d>
+    <dgm:sp3d/>
+    <dgm:txPr/>
+    <dgm:style>
+      <a:lnRef idx="2">
+        <a:scrgbClr r="0" g="0" b="0"/>
+      </a:lnRef>
+      <a:fillRef idx="1">
+        <a:scrgbClr r="0" g="0" b="0"/>
+      </a:fillRef>
+      <a:effectRef idx="0">
+        <a:scrgbClr r="0" g="0" b="0"/>
+      </a:effectRef>
+      <a:fontRef idx="minor">
+        <a:schemeClr val="lt1"/>
+      </a:fontRef>
+    </dgm:style>
+  </dgm:styleLbl>
+  <dgm:styleLbl name="asst1">
+    <dgm:scene3d>
+      <a:camera prst="orthographicFront"/>
+      <a:lightRig rig="threePt" dir="t"/>
+    </dgm:scene3d>
+    <dgm:sp3d/>
+    <dgm:txPr/>
+    <dgm:style>
+      <a:lnRef idx="2">
+        <a:scrgbClr r="0" g="0" b="0"/>
+      </a:lnRef>
+      <a:fillRef idx="1">
+        <a:scrgbClr r="0" g="0" b="0"/>
+      </a:fillRef>
+      <a:effectRef idx="0">
+        <a:scrgbClr r="0" g="0" b="0"/>
+      </a:effectRef>
+      <a:fontRef idx="minor">
+        <a:schemeClr val="lt1"/>
+      </a:fontRef>
+    </dgm:style>
+  </dgm:styleLbl>
+  <dgm:styleLbl name="asst2">
+    <dgm:scene3d>
+      <a:camera prst="orthographicFront"/>
+      <a:lightRig rig="threePt" dir="t"/>
+    </dgm:scene3d>
+    <dgm:sp3d/>
+    <dgm:txPr/>
+    <dgm:style>
+      <a:lnRef idx="2">
+        <a:scrgbClr r="0" g="0" b="0"/>
+      </a:lnRef>
+      <a:fillRef idx="1">
+        <a:scrgbClr r="0" g="0" b="0"/>
+      </a:fillRef>
+      <a:effectRef idx="0">
+        <a:scrgbClr r="0" g="0" b="0"/>
+      </a:effectRef>
+      <a:fontRef idx="minor">
+        <a:schemeClr val="lt1"/>
+      </a:fontRef>
+    </dgm:style>
+  </dgm:styleLbl>
+  <dgm:styleLbl name="asst3">
+    <dgm:scene3d>
+      <a:camera prst="orthographicFront"/>
+      <a:lightRig rig="threePt" dir="t"/>
+    </dgm:scene3d>
+    <dgm:sp3d/>
+    <dgm:txPr/>
+    <dgm:style>
+      <a:lnRef idx="2">
+        <a:scrgbClr r="0" g="0" b="0"/>
+      </a:lnRef>
+      <a:fillRef idx="1">
+        <a:scrgbClr r="0" g="0" b="0"/>
+      </a:fillRef>
+      <a:effectRef idx="0">
+        <a:scrgbClr r="0" g="0" b="0"/>
+      </a:effectRef>
+      <a:fontRef idx="minor">
+        <a:schemeClr val="lt1"/>
+      </a:fontRef>
+    </dgm:style>
+  </dgm:styleLbl>
+  <dgm:styleLbl name="asst4">
+    <dgm:scene3d>
+      <a:camera prst="orthographicFront"/>
+      <a:lightRig rig="threePt" dir="t"/>
+    </dgm:scene3d>
+    <dgm:sp3d/>
+    <dgm:txPr/>
+    <dgm:style>
+      <a:lnRef idx="2">
+        <a:scrgbClr r="0" g="0" b="0"/>
+      </a:lnRef>
+      <a:fillRef idx="1">
+        <a:scrgbClr r="0" g="0" b="0"/>
+      </a:fillRef>
+      <a:effectRef idx="0">
+        <a:scrgbClr r="0" g="0" b="0"/>
+      </a:effectRef>
+      <a:fontRef idx="minor">
+        <a:schemeClr val="lt1"/>
+      </a:fontRef>
+    </dgm:style>
+  </dgm:styleLbl>
+  <dgm:styleLbl name="parChTrans2D1">
+    <dgm:scene3d>
+      <a:camera prst="orthographicFront"/>
+      <a:lightRig rig="threePt" dir="t"/>
+    </dgm:scene3d>
+    <dgm:sp3d/>
+    <dgm:txPr/>
+    <dgm:style>
+      <a:lnRef idx="2">
+        <a:scrgbClr r="0" g="0" b="0"/>
+      </a:lnRef>
+      <a:fillRef idx="1">
+        <a:scrgbClr r="0" g="0" b="0"/>
+      </a:fillRef>
+      <a:effectRef idx="0">
+        <a:scrgbClr r="0" g="0" b="0"/>
+      </a:effectRef>
+      <a:fontRef idx="minor">
+        <a:schemeClr val="lt1"/>
+      </a:fontRef>
+    </dgm:style>
+  </dgm:styleLbl>
+  <dgm:styleLbl name="parChTrans2D2">
+    <dgm:scene3d>
+      <a:camera prst="orthographicFront"/>
+      <a:lightRig rig="threePt" dir="t"/>
+    </dgm:scene3d>
+    <dgm:sp3d/>
+    <dgm:txPr/>
+    <dgm:style>
+      <a:lnRef idx="2">
+        <a:scrgbClr r="0" g="0" b="0"/>
+      </a:lnRef>
+      <a:fillRef idx="1">
+        <a:scrgbClr r="0" g="0" b="0"/>
+      </a:fillRef>
+      <a:effectRef idx="0">
+        <a:scrgbClr r="0" g="0" b="0"/>
+      </a:effectRef>
+      <a:fontRef idx="minor">
+        <a:schemeClr val="lt1"/>
+      </a:fontRef>
+    </dgm:style>
+  </dgm:styleLbl>
+  <dgm:styleLbl name="parChTrans2D3">
+    <dgm:scene3d>
+      <a:camera prst="orthographicFront"/>
+      <a:lightRig rig="threePt" dir="t"/>
+    </dgm:scene3d>
+    <dgm:sp3d/>
+    <dgm:txPr/>
+    <dgm:style>
+      <a:lnRef idx="2">
+        <a:scrgbClr r="0" g="0" b="0"/>
+      </a:lnRef>
+      <a:fillRef idx="1">
+        <a:scrgbClr r="0" g="0" b="0"/>
+      </a:fillRef>
+      <a:effectRef idx="0">
+        <a:scrgbClr r="0" g="0" b="0"/>
+      </a:effectRef>
+      <a:fontRef idx="minor">
+        <a:schemeClr val="lt1"/>
+      </a:fontRef>
+    </dgm:style>
+  </dgm:styleLbl>
+  <dgm:styleLbl name="parChTrans2D4">
+    <dgm:scene3d>
+      <a:camera prst="orthographicFront"/>
+      <a:lightRig rig="threePt" dir="t"/>
+    </dgm:scene3d>
+    <dgm:sp3d/>
+    <dgm:txPr/>
+    <dgm:style>
+      <a:lnRef idx="2">
+        <a:scrgbClr r="0" g="0" b="0"/>
+      </a:lnRef>
+      <a:fillRef idx="1">
+        <a:scrgbClr r="0" g="0" b="0"/>
+      </a:fillRef>
+      <a:effectRef idx="0">
+        <a:scrgbClr r="0" g="0" b="0"/>
+      </a:effectRef>
+      <a:fontRef idx="minor">
+        <a:schemeClr val="lt1"/>
+      </a:fontRef>
+    </dgm:style>
+  </dgm:styleLbl>
+  <dgm:styleLbl name="parChTrans1D1">
+    <dgm:scene3d>
+      <a:camera prst="orthographicFront"/>
+      <a:lightRig rig="threePt" dir="t"/>
+    </dgm:scene3d>
+    <dgm:sp3d/>
+    <dgm:txPr/>
+    <dgm:style>
+      <a:lnRef idx="2">
+        <a:scrgbClr r="0" g="0" b="0"/>
+      </a:lnRef>
+      <a:fillRef idx="0">
+        <a:scrgbClr r="0" g="0" b="0"/>
+      </a:fillRef>
+      <a:effectRef idx="0">
+        <a:scrgbClr r="0" g="0" b="0"/>
+      </a:effectRef>
+      <a:fontRef idx="minor"/>
+    </dgm:style>
+  </dgm:styleLbl>
+  <dgm:styleLbl name="parChTrans1D2">
+    <dgm:scene3d>
+      <a:camera prst="orthographicFront"/>
+      <a:lightRig rig="threePt" dir="t"/>
+    </dgm:scene3d>
+    <dgm:sp3d/>
+    <dgm:txPr/>
+    <dgm:style>
+      <a:lnRef idx="2">
+        <a:scrgbClr r="0" g="0" b="0"/>
+      </a:lnRef>
+      <a:fillRef idx="0">
+        <a:scrgbClr r="0" g="0" b="0"/>
+      </a:fillRef>
+      <a:effectRef idx="0">
+        <a:scrgbClr r="0" g="0" b="0"/>
+      </a:effectRef>
+      <a:fontRef idx="minor"/>
+    </dgm:style>
+  </dgm:styleLbl>
+  <dgm:styleLbl name="parChTrans1D3">
+    <dgm:scene3d>
+      <a:camera prst="orthographicFront"/>
+      <a:lightRig rig="threePt" dir="t"/>
+    </dgm:scene3d>
+    <dgm:sp3d/>
+    <dgm:txPr/>
+    <dgm:style>
+      <a:lnRef idx="2">
+        <a:scrgbClr r="0" g="0" b="0"/>
+      </a:lnRef>
+      <a:fillRef idx="0">
+        <a:scrgbClr r="0" g="0" b="0"/>
+      </a:fillRef>
+      <a:effectRef idx="0">
+        <a:scrgbClr r="0" g="0" b="0"/>
+      </a:effectRef>
+      <a:fontRef idx="minor"/>
+    </dgm:style>
+  </dgm:styleLbl>
+  <dgm:styleLbl name="parChTrans1D4">
+    <dgm:scene3d>
+      <a:camera prst="orthographicFront"/>
+      <a:lightRig rig="threePt" dir="t"/>
+    </dgm:scene3d>
+    <dgm:sp3d/>
+    <dgm:txPr/>
+    <dgm:style>
+      <a:lnRef idx="2">
+        <a:scrgbClr r="0" g="0" b="0"/>
+      </a:lnRef>
+      <a:fillRef idx="0">
+        <a:scrgbClr r="0" g="0" b="0"/>
+      </a:fillRef>
+      <a:effectRef idx="0">
+        <a:scrgbClr r="0" g="0" b="0"/>
+      </a:effectRef>
+      <a:fontRef idx="minor"/>
+    </dgm:style>
+  </dgm:styleLbl>
+  <dgm:styleLbl name="fgAcc1">
+    <dgm:scene3d>
+      <a:camera prst="orthographicFront"/>
+      <a:lightRig rig="threePt" dir="t"/>
+    </dgm:scene3d>
+    <dgm:sp3d/>
+    <dgm:txPr/>
+    <dgm:style>
+      <a:lnRef idx="2">
+        <a:scrgbClr r="0" g="0" b="0"/>
+      </a:lnRef>
+      <a:fillRef idx="1">
+        <a:scrgbClr r="0" g="0" b="0"/>
+      </a:fillRef>
+      <a:effectRef idx="0">
+        <a:scrgbClr r="0" g="0" b="0"/>
+      </a:effectRef>
+      <a:fontRef idx="minor"/>
+    </dgm:style>
+  </dgm:styleLbl>
+  <dgm:styleLbl name="conFgAcc1">
+    <dgm:scene3d>
+      <a:camera prst="orthographicFront"/>
+      <a:lightRig rig="threePt" dir="t"/>
+    </dgm:scene3d>
+    <dgm:sp3d/>
+    <dgm:txPr/>
+    <dgm:style>
+      <a:lnRef idx="2">
+        <a:scrgbClr r="0" g="0" b="0"/>
+      </a:lnRef>
+      <a:fillRef idx="1">
+        <a:scrgbClr r="0" g="0" b="0"/>
+      </a:fillRef>
+      <a:effectRef idx="0">
+        <a:scrgbClr r="0" g="0" b="0"/>
+      </a:effectRef>
+      <a:fontRef idx="minor"/>
+    </dgm:style>
+  </dgm:styleLbl>
+  <dgm:styleLbl name="alignAcc1">
+    <dgm:scene3d>
+      <a:camera prst="orthographicFront"/>
+      <a:lightRig rig="threePt" dir="t"/>
+    </dgm:scene3d>
+    <dgm:sp3d/>
+    <dgm:txPr/>
+    <dgm:style>
+      <a:lnRef idx="2">
+        <a:scrgbClr r="0" g="0" b="0"/>
+      </a:lnRef>
+      <a:fillRef idx="1">
+        <a:scrgbClr r="0" g="0" b="0"/>
+      </a:fillRef>
+      <a:effectRef idx="0">
+        <a:scrgbClr r="0" g="0" b="0"/>
+      </a:effectRef>
+      <a:fontRef idx="minor"/>
+    </dgm:style>
+  </dgm:styleLbl>
+  <dgm:styleLbl name="trAlignAcc1">
+    <dgm:scene3d>
+      <a:camera prst="orthographicFront"/>
+      <a:lightRig rig="threePt" dir="t"/>
+    </dgm:scene3d>
+    <dgm:sp3d/>
+    <dgm:txPr/>
+    <dgm:style>
+      <a:lnRef idx="1">
+        <a:scrgbClr r="0" g="0" b="0"/>
+      </a:lnRef>
+      <a:fillRef idx="1">
+        <a:scrgbClr r="0" g="0" b="0"/>
+      </a:fillRef>
+      <a:effectRef idx="0">
+        <a:scrgbClr r="0" g="0" b="0"/>
+      </a:effectRef>
+      <a:fontRef idx="minor"/>
+    </dgm:style>
+  </dgm:styleLbl>
+  <dgm:styleLbl name="bgAcc1">
+    <dgm:scene3d>
+      <a:camera prst="orthographicFront"/>
+      <a:lightRig rig="threePt" dir="t"/>
+    </dgm:scene3d>
+    <dgm:sp3d/>
+    <dgm:txPr/>
+    <dgm:style>
+      <a:lnRef idx="2">
+        <a:scrgbClr r="0" g="0" b="0"/>
+      </a:lnRef>
+      <a:fillRef idx="1">
+        <a:scrgbClr r="0" g="0" b="0"/>
+      </a:fillRef>
+      <a:effectRef idx="0">
+        <a:scrgbClr r="0" g="0" b="0"/>
+      </a:effectRef>
+      <a:fontRef idx="minor"/>
+    </dgm:style>
+  </dgm:styleLbl>
+  <dgm:styleLbl name="solidFgAcc1">
+    <dgm:scene3d>
+      <a:camera prst="orthographicFront"/>
+      <a:lightRig rig="threePt" dir="t"/>
+    </dgm:scene3d>
+    <dgm:sp3d/>
+    <dgm:txPr/>
+    <dgm:style>
+      <a:lnRef idx="2">
+        <a:scrgbClr r="0" g="0" b="0"/>
+      </a:lnRef>
+      <a:fillRef idx="1">
+        <a:scrgbClr r="0" g="0" b="0"/>
+      </a:fillRef>
+      <a:effectRef idx="0">
+        <a:scrgbClr r="0" g="0" b="0"/>
+      </a:effectRef>
+      <a:fontRef idx="minor"/>
+    </dgm:style>
+  </dgm:styleLbl>
+  <dgm:styleLbl name="solidAlignAcc1">
+    <dgm:scene3d>
+      <a:camera prst="orthographicFront"/>
+      <a:lightRig rig="threePt" dir="t"/>
+    </dgm:scene3d>
+    <dgm:sp3d/>
+    <dgm:txPr/>
+    <dgm:style>
+      <a:lnRef idx="2">
+        <a:scrgbClr r="0" g="0" b="0"/>
+      </a:lnRef>
+      <a:fillRef idx="1">
+        <a:scrgbClr r="0" g="0" b="0"/>
+      </a:fillRef>
+      <a:effectRef idx="0">
+        <a:scrgbClr r="0" g="0" b="0"/>
+      </a:effectRef>
+      <a:fontRef idx="minor"/>
+    </dgm:style>
+  </dgm:styleLbl>
+  <dgm:styleLbl name="solidBgAcc1">
+    <dgm:scene3d>
+      <a:camera prst="orthographicFront"/>
+      <a:lightRig rig="threePt" dir="t"/>
+    </dgm:scene3d>
+    <dgm:sp3d/>
+    <dgm:txPr/>
+    <dgm:style>
+      <a:lnRef idx="2">
+        <a:scrgbClr r="0" g="0" b="0"/>
+      </a:lnRef>
+      <a:fillRef idx="1">
+        <a:scrgbClr r="0" g="0" b="0"/>
+      </a:fillRef>
+      <a:effectRef idx="0">
+        <a:scrgbClr r="0" g="0" b="0"/>
+      </a:effectRef>
+      <a:fontRef idx="minor"/>
+    </dgm:style>
+  </dgm:styleLbl>
+  <dgm:styleLbl name="fgAccFollowNode1">
+    <dgm:scene3d>
+      <a:camera prst="orthographicFront"/>
+      <a:lightRig rig="threePt" dir="t"/>
+    </dgm:scene3d>
+    <dgm:sp3d/>
+    <dgm:txPr/>
+    <dgm:style>
+      <a:lnRef idx="2">
+        <a:scrgbClr r="0" g="0" b="0"/>
+      </a:lnRef>
+      <a:fillRef idx="1">
+        <a:scrgbClr r="0" g="0" b="0"/>
+      </a:fillRef>
+      <a:effectRef idx="0">
+        <a:scrgbClr r="0" g="0" b="0"/>
+      </a:effectRef>
+      <a:fontRef idx="minor"/>
+    </dgm:style>
+  </dgm:styleLbl>
+  <dgm:styleLbl name="alignAccFollowNode1">
+    <dgm:scene3d>
+      <a:camera prst="orthographicFront"/>
+      <a:lightRig rig="threePt" dir="t"/>
+    </dgm:scene3d>
+    <dgm:sp3d/>
+    <dgm:txPr/>
+    <dgm:style>
+      <a:lnRef idx="2">
+        <a:scrgbClr r="0" g="0" b="0"/>
+      </a:lnRef>
+      <a:fillRef idx="1">
+        <a:scrgbClr r="0" g="0" b="0"/>
+      </a:fillRef>
+      <a:effectRef idx="0">
+        <a:scrgbClr r="0" g="0" b="0"/>
+      </a:effectRef>
+      <a:fontRef idx="minor"/>
+    </dgm:style>
+  </dgm:styleLbl>
+  <dgm:styleLbl name="bgAccFollowNode1">
+    <dgm:scene3d>
+      <a:camera prst="orthographicFront"/>
+      <a:lightRig rig="threePt" dir="t"/>
+    </dgm:scene3d>
+    <dgm:sp3d/>
+    <dgm:txPr/>
+    <dgm:style>
+      <a:lnRef idx="2">
+        <a:scrgbClr r="0" g="0" b="0"/>
+      </a:lnRef>
+      <a:fillRef idx="1">
+        <a:scrgbClr r="0" g="0" b="0"/>
+      </a:fillRef>
+      <a:effectRef idx="0">
+        <a:scrgbClr r="0" g="0" b="0"/>
+      </a:effectRef>
+      <a:fontRef idx="minor"/>
+    </dgm:style>
+  </dgm:styleLbl>
+  <dgm:styleLbl name="fgAcc0">
+    <dgm:scene3d>
+      <a:camera prst="orthographicFront"/>
+      <a:lightRig rig="threePt" dir="t"/>
+    </dgm:scene3d>
+    <dgm:sp3d/>
+    <dgm:txPr/>
+    <dgm:style>
+      <a:lnRef idx="2">
+        <a:scrgbClr r="0" g="0" b="0"/>
+      </a:lnRef>
+      <a:fillRef idx="1">
+        <a:scrgbClr r="0" g="0" b="0"/>
+      </a:fillRef>
+      <a:effectRef idx="0">
+        <a:scrgbClr r="0" g="0" b="0"/>
+      </a:effectRef>
+      <a:fontRef idx="minor"/>
+    </dgm:style>
+  </dgm:styleLbl>
+  <dgm:styleLbl name="fgAcc2">
+    <dgm:scene3d>
+      <a:camera prst="orthographicFront"/>
+      <a:lightRig rig="threePt" dir="t"/>
+    </dgm:scene3d>
+    <dgm:sp3d/>
+    <dgm:txPr/>
+    <dgm:style>
+      <a:lnRef idx="2">
+        <a:scrgbClr r="0" g="0" b="0"/>
+      </a:lnRef>
+      <a:fillRef idx="1">
+        <a:scrgbClr r="0" g="0" b="0"/>
+      </a:fillRef>
+      <a:effectRef idx="0">
+        <a:scrgbClr r="0" g="0" b="0"/>
+      </a:effectRef>
+      <a:fontRef idx="minor"/>
+    </dgm:style>
+  </dgm:styleLbl>
+  <dgm:styleLbl name="fgAcc3">
+    <dgm:scene3d>
+      <a:camera prst="orthographicFront"/>
+      <a:lightRig rig="threePt" dir="t"/>
+    </dgm:scene3d>
+    <dgm:sp3d/>
+    <dgm:txPr/>
+    <dgm:style>
+      <a:lnRef idx="2">
+        <a:scrgbClr r="0" g="0" b="0"/>
+      </a:lnRef>
+      <a:fillRef idx="1">
+        <a:scrgbClr r="0" g="0" b="0"/>
+      </a:fillRef>
+      <a:effectRef idx="0">
+        <a:scrgbClr r="0" g="0" b="0"/>
+      </a:effectRef>
+      <a:fontRef idx="minor"/>
+    </dgm:style>
+  </dgm:styleLbl>
+  <dgm:styleLbl name="fgAcc4">
+    <dgm:scene3d>
+      <a:camera prst="orthographicFront"/>
+      <a:lightRig rig="threePt" dir="t"/>
+    </dgm:scene3d>
+    <dgm:sp3d/>
+    <dgm:txPr/>
+    <dgm:style>
+      <a:lnRef idx="2">
+        <a:scrgbClr r="0" g="0" b="0"/>
+      </a:lnRef>
+      <a:fillRef idx="1">
+        <a:scrgbClr r="0" g="0" b="0"/>
+      </a:fillRef>
+      <a:effectRef idx="0">
+        <a:scrgbClr r="0" g="0" b="0"/>
+      </a:effectRef>
+      <a:fontRef idx="minor"/>
+    </dgm:style>
+  </dgm:styleLbl>
+  <dgm:styleLbl name="bgShp">
+    <dgm:scene3d>
+      <a:camera prst="orthographicFront"/>
+      <a:lightRig rig="threePt" dir="t"/>
+    </dgm:scene3d>
+    <dgm:sp3d/>
+    <dgm:txPr/>
+    <dgm:style>
+      <a:lnRef idx="0">
+        <a:scrgbClr r="0" g="0" b="0"/>
+      </a:lnRef>
+      <a:fillRef idx="1">
+        <a:scrgbClr r="0" g="0" b="0"/>
+      </a:fillRef>
+      <a:effectRef idx="0">
+        <a:scrgbClr r="0" g="0" b="0"/>
+      </a:effectRef>
+      <a:fontRef idx="minor"/>
+    </dgm:style>
+  </dgm:styleLbl>
+  <dgm:styleLbl name="dkBgShp">
+    <dgm:scene3d>
+      <a:camera prst="orthographicFront"/>
+      <a:lightRig rig="threePt" dir="t"/>
+    </dgm:scene3d>
+    <dgm:sp3d/>
+    <dgm:txPr/>
+    <dgm:style>
+      <a:lnRef idx="0">
+        <a:scrgbClr r="0" g="0" b="0"/>
+      </a:lnRef>
+      <a:fillRef idx="1">
+        <a:scrgbClr r="0" g="0" b="0"/>
+      </a:fillRef>
+      <a:effectRef idx="0">
+        <a:scrgbClr r="0" g="0" b="0"/>
+      </a:effectRef>
+      <a:fontRef idx="minor"/>
+    </dgm:style>
+  </dgm:styleLbl>
+  <dgm:styleLbl name="trBgShp">
+    <dgm:scene3d>
+      <a:camera prst="orthographicFront"/>
+      <a:lightRig rig="threePt" dir="t"/>
+    </dgm:scene3d>
+    <dgm:sp3d/>
+    <dgm:txPr/>
+    <dgm:style>
+      <a:lnRef idx="0">
+        <a:scrgbClr r="0" g="0" b="0"/>
+      </a:lnRef>
+      <a:fillRef idx="1">
+        <a:scrgbClr r="0" g="0" b="0"/>
+      </a:fillRef>
+      <a:effectRef idx="0">
+        <a:scrgbClr r="0" g="0" b="0"/>
+      </a:effectRef>
+      <a:fontRef idx="minor"/>
+    </dgm:style>
+  </dgm:styleLbl>
+  <dgm:styleLbl name="fgShp">
+    <dgm:scene3d>
+      <a:camera prst="orthographicFront"/>
+      <a:lightRig rig="threePt" dir="t"/>
+    </dgm:scene3d>
+    <dgm:sp3d/>
+    <dgm:txPr/>
+    <dgm:style>
+      <a:lnRef idx="2">
+        <a:scrgbClr r="0" g="0" b="0"/>
+      </a:lnRef>
+      <a:fillRef idx="1">
+        <a:scrgbClr r="0" g="0" b="0"/>
+      </a:fillRef>
+      <a:effectRef idx="0">
+        <a:scrgbClr r="0" g="0" b="0"/>
+      </a:effectRef>
+      <a:fontRef idx="minor"/>
+    </dgm:style>
+  </dgm:styleLbl>
+  <dgm:styleLbl name="revTx">
+    <dgm:scene3d>
+      <a:camera prst="orthographicFront"/>
+      <a:lightRig rig="threePt" dir="t"/>
+    </dgm:scene3d>
+    <dgm:sp3d/>
+    <dgm:txPr/>
+    <dgm:style>
+      <a:lnRef idx="0">
+        <a:scrgbClr r="0" g="0" b="0"/>
+      </a:lnRef>
+      <a:fillRef idx="0">
+        <a:scrgbClr r="0" g="0" b="0"/>
+      </a:fillRef>
+      <a:effectRef idx="0">
+        <a:scrgbClr r="0" g="0" b="0"/>
+      </a:effectRef>
+      <a:fontRef idx="minor"/>
+    </dgm:style>
+  </dgm:styleLbl>
+</dgm:styleDef>
+</file>
+
 <file path=ppt/slideLayouts/slideLayout1.xml><?xml version="1.0" encoding="utf-8"?>
 <p:sldLayout xmlns:a="http://schemas.openxmlformats.org/drawingml/2006/main" xmlns:r="http://schemas.openxmlformats.org/officeDocument/2006/relationships" xmlns:p="http://schemas.openxmlformats.org/presentationml/2006/main" showMasterSp="0" type="title" preserve="1">
   <p:cSld name="Title Slide">
@@ -361,7 +3982,7 @@
           <a:p>
             <a:fld id="{9184DA70-C731-4C70-880D-CCD4705E623C}" type="datetime1">
               <a:rPr lang="en-US" smtClean="0"/>
-              <a:t>5/15/2020</a:t>
+              <a:t>5/18/2020</a:t>
             </a:fld>
             <a:endParaRPr lang="en-US" dirty="0"/>
           </a:p>
@@ -549,7 +4170,7 @@
           <a:p>
             <a:fld id="{B612A279-0833-481D-8C56-F67FD0AC6C50}" type="datetime1">
               <a:rPr lang="en-US" smtClean="0"/>
-              <a:t>5/15/2020</a:t>
+              <a:t>5/18/2020</a:t>
             </a:fld>
             <a:endParaRPr lang="en-US" dirty="0"/>
           </a:p>
@@ -791,7 +4412,7 @@
           <a:p>
             <a:fld id="{6587DA83-5663-4C9C-B9AA-0B40A3DAFF81}" type="datetime1">
               <a:rPr lang="en-US" smtClean="0"/>
-              <a:t>5/15/2020</a:t>
+              <a:t>5/18/2020</a:t>
             </a:fld>
             <a:endParaRPr lang="en-US" dirty="0"/>
           </a:p>
@@ -979,7 +4600,7 @@
           <a:p>
             <a:fld id="{4BE1D723-8F53-4F53-90B0-1982A396982E}" type="datetime1">
               <a:rPr lang="en-US" smtClean="0"/>
-              <a:t>5/15/2020</a:t>
+              <a:t>5/18/2020</a:t>
             </a:fld>
             <a:endParaRPr lang="en-US" dirty="0"/>
           </a:p>
@@ -1352,7 +4973,7 @@
           <a:p>
             <a:fld id="{97669AF7-7BEB-44E4-9852-375E34362B5B}" type="datetime1">
               <a:rPr lang="en-US" smtClean="0"/>
-              <a:t>5/15/2020</a:t>
+              <a:t>5/18/2020</a:t>
             </a:fld>
             <a:endParaRPr lang="en-US" dirty="0"/>
           </a:p>
@@ -1607,7 +5228,7 @@
           <a:p>
             <a:fld id="{BAAAC38D-0552-4C82-B593-E6124DFADBE2}" type="datetime1">
               <a:rPr lang="en-US" smtClean="0"/>
-              <a:t>5/15/2020</a:t>
+              <a:t>5/18/2020</a:t>
             </a:fld>
             <a:endParaRPr lang="en-US" dirty="0"/>
           </a:p>
@@ -2004,7 +5625,7 @@
           <a:p>
             <a:fld id="{D9DF0F1C-5577-4ACB-BB62-DF8F3C494C7E}" type="datetime1">
               <a:rPr lang="en-US" smtClean="0"/>
-              <a:t>5/15/2020</a:t>
+              <a:t>5/18/2020</a:t>
             </a:fld>
             <a:endParaRPr lang="en-US" dirty="0"/>
           </a:p>
@@ -2140,7 +5761,7 @@
           <a:p>
             <a:fld id="{1775B394-D9F9-4F0C-B15D-605F45CB9E9F}" type="datetime1">
               <a:rPr lang="en-US" smtClean="0"/>
-              <a:t>5/15/2020</a:t>
+              <a:t>5/18/2020</a:t>
             </a:fld>
             <a:endParaRPr lang="en-US" dirty="0"/>
           </a:p>
@@ -2297,7 +5918,7 @@
           <a:p>
             <a:fld id="{39667345-2558-425A-8533-9BFDBCE15005}" type="datetime1">
               <a:rPr lang="en-US" smtClean="0"/>
-              <a:t>5/15/2020</a:t>
+              <a:t>5/18/2020</a:t>
             </a:fld>
             <a:endParaRPr lang="en-US" dirty="0"/>
           </a:p>
@@ -2626,7 +6247,7 @@
           <a:p>
             <a:fld id="{92BEA474-078D-4E9B-9B14-09A87B19DC46}" type="datetime1">
               <a:rPr lang="en-US" smtClean="0"/>
-              <a:t>5/15/2020</a:t>
+              <a:t>5/18/2020</a:t>
             </a:fld>
             <a:endParaRPr lang="en-US" dirty="0"/>
           </a:p>
@@ -2976,7 +6597,7 @@
           <a:p>
             <a:fld id="{4907D986-8816-4272-A432-0437A28A9828}" type="datetime1">
               <a:rPr lang="en-US" smtClean="0"/>
-              <a:t>5/15/2020</a:t>
+              <a:t>5/18/2020</a:t>
             </a:fld>
             <a:endParaRPr lang="en-US" dirty="0"/>
           </a:p>
@@ -3237,7 +6858,7 @@
           <a:p>
             <a:fld id="{62D6E202-B606-4609-B914-27C9371A1F6D}" type="datetime1">
               <a:rPr lang="en-US" smtClean="0"/>
-              <a:t>5/15/2020</a:t>
+              <a:t>5/18/2020</a:t>
             </a:fld>
             <a:endParaRPr lang="en-US" dirty="0"/>
           </a:p>
@@ -4360,10 +7981,10 @@
       </p:cxnSp>
       <p:pic>
         <p:nvPicPr>
-          <p:cNvPr id="9" name="Immagine 8">
+          <p:cNvPr id="4" name="Immagine 3">
             <a:extLst>
               <a:ext uri="{FF2B5EF4-FFF2-40B4-BE49-F238E27FC236}">
-                <a16:creationId xmlns:a16="http://schemas.microsoft.com/office/drawing/2014/main" id="{1C54A33D-C933-4674-8AF5-D2D073FA0E01}"/>
+                <a16:creationId xmlns:a16="http://schemas.microsoft.com/office/drawing/2014/main" id="{EA981818-2B83-4FF3-86B1-5E61AA342F77}"/>
               </a:ext>
             </a:extLst>
           </p:cNvPr>
@@ -4380,31 +8001,13 @@
         </p:blipFill>
         <p:spPr>
           <a:xfrm>
-            <a:off x="4536342" y="134191"/>
-            <a:ext cx="7455276" cy="6589617"/>
+            <a:off x="4405646" y="0"/>
+            <a:ext cx="7786339" cy="6858000"/>
           </a:xfrm>
           <a:prstGeom prst="rect">
             <a:avLst/>
           </a:prstGeom>
-          <a:noFill/>
-          <a:ln>
-            <a:noFill/>
-          </a:ln>
         </p:spPr>
-        <p:style>
-          <a:lnRef idx="2">
-            <a:schemeClr val="dk1"/>
-          </a:lnRef>
-          <a:fillRef idx="1">
-            <a:schemeClr val="lt1"/>
-          </a:fillRef>
-          <a:effectRef idx="0">
-            <a:schemeClr val="dk1"/>
-          </a:effectRef>
-          <a:fontRef idx="minor">
-            <a:schemeClr val="dk1"/>
-          </a:fontRef>
-        </p:style>
       </p:pic>
     </p:spTree>
     <p:extLst>
@@ -5044,6 +8647,16 @@
             </a:pPr>
             <a:r>
               <a:rPr lang="it-IT" sz="2400" dirty="0"/>
+              <a:t> Implementare interazione tra account</a:t>
+            </a:r>
+          </a:p>
+          <a:p>
+            <a:pPr>
+              <a:buFont typeface="Courier New" panose="02070309020205020404" pitchFamily="49" charset="0"/>
+              <a:buChar char="o"/>
+            </a:pPr>
+            <a:r>
+              <a:rPr lang="it-IT" sz="2400" dirty="0"/>
               <a:t> Tema scuro</a:t>
             </a:r>
           </a:p>
@@ -5285,7 +8898,7 @@
         <p:spPr>
           <a:xfrm>
             <a:off x="5231958" y="605896"/>
-            <a:ext cx="5923721" cy="5646208"/>
+            <a:ext cx="6680642" cy="5646208"/>
           </a:xfrm>
         </p:spPr>
         <p:txBody>
@@ -5351,6 +8964,16 @@
             <a:r>
               <a:rPr lang="it-IT" sz="2400" dirty="0"/>
               <a:t> con possibilità di creare più playlists</a:t>
+            </a:r>
+          </a:p>
+          <a:p>
+            <a:pPr lvl="1">
+              <a:buFont typeface="Courier New" panose="02070309020205020404" pitchFamily="49" charset="0"/>
+              <a:buChar char="o"/>
+            </a:pPr>
+            <a:r>
+              <a:rPr lang="it-IT" sz="2400" dirty="0"/>
+              <a:t> con possibilità di interazione tra account</a:t>
             </a:r>
           </a:p>
         </p:txBody>
@@ -5439,10 +9062,10 @@
       </p:grpSpPr>
       <p:sp useBgFill="1">
         <p:nvSpPr>
-          <p:cNvPr id="8" name="Rectangle 7">
+          <p:cNvPr id="28" name="Rectangle 27">
             <a:extLst>
               <a:ext uri="{FF2B5EF4-FFF2-40B4-BE49-F238E27FC236}">
-                <a16:creationId xmlns:a16="http://schemas.microsoft.com/office/drawing/2014/main" id="{3741B58E-3B65-4A01-A276-975AB2CF8A08}"/>
+                <a16:creationId xmlns:a16="http://schemas.microsoft.com/office/drawing/2014/main" id="{68BDBE5C-BBE9-4E89-BEE5-DEB6EAB8702D}"/>
               </a:ext>
               <a:ext uri="{C183D7F6-B498-43B3-948B-1728B52AA6E4}">
                 <adec:decorative xmlns:adec="http://schemas.microsoft.com/office/drawing/2017/decorative" val="1"/>
@@ -5463,7 +9086,7 @@
         <p:spPr>
           <a:xfrm>
             <a:off x="0" y="0"/>
-            <a:ext cx="12186315" cy="6858000"/>
+            <a:ext cx="12192000" cy="6858000"/>
           </a:xfrm>
           <a:prstGeom prst="rect">
             <a:avLst/>
@@ -5474,15 +9097,15 @@
         </p:spPr>
         <p:style>
           <a:lnRef idx="2">
-            <a:schemeClr val="accent6">
+            <a:schemeClr val="accent1">
               <a:shade val="50000"/>
             </a:schemeClr>
           </a:lnRef>
-          <a:fillRef idx="1001">
-            <a:schemeClr val="lt1"/>
+          <a:fillRef idx="1">
+            <a:schemeClr val="accent1"/>
           </a:fillRef>
           <a:effectRef idx="0">
-            <a:schemeClr val="accent6"/>
+            <a:schemeClr val="accent1"/>
           </a:effectRef>
           <a:fontRef idx="minor">
             <a:schemeClr val="lt1"/>
@@ -5499,10 +9122,101 @@
       </p:sp>
       <p:sp>
         <p:nvSpPr>
-          <p:cNvPr id="10" name="Rectangle 9">
+          <p:cNvPr id="2" name="Titolo 1">
             <a:extLst>
               <a:ext uri="{FF2B5EF4-FFF2-40B4-BE49-F238E27FC236}">
-                <a16:creationId xmlns:a16="http://schemas.microsoft.com/office/drawing/2014/main" id="{7AAC67C3-831B-4AB1-A259-DFB839CAFAFC}"/>
+                <a16:creationId xmlns:a16="http://schemas.microsoft.com/office/drawing/2014/main" id="{15EBAE22-2721-4510-A214-F84D4F6DF0C0}"/>
+              </a:ext>
+            </a:extLst>
+          </p:cNvPr>
+          <p:cNvSpPr>
+            <a:spLocks noGrp="1"/>
+          </p:cNvSpPr>
+          <p:nvPr>
+            <p:ph type="title"/>
+          </p:nvPr>
+        </p:nvSpPr>
+        <p:spPr>
+          <a:xfrm>
+            <a:off x="643467" y="634946"/>
+            <a:ext cx="3689094" cy="5055904"/>
+          </a:xfrm>
+        </p:spPr>
+        <p:txBody>
+          <a:bodyPr anchor="ctr">
+            <a:normAutofit/>
+          </a:bodyPr>
+          <a:lstStyle/>
+          <a:p>
+            <a:pPr algn="r"/>
+            <a:r>
+              <a:rPr lang="it-IT"/>
+              <a:t>CRITICITA’</a:t>
+            </a:r>
+          </a:p>
+        </p:txBody>
+      </p:sp>
+      <p:cxnSp>
+        <p:nvCxnSpPr>
+          <p:cNvPr id="30" name="Straight Connector 29">
+            <a:extLst>
+              <a:ext uri="{FF2B5EF4-FFF2-40B4-BE49-F238E27FC236}">
+                <a16:creationId xmlns:a16="http://schemas.microsoft.com/office/drawing/2014/main" id="{2752F38C-F560-47AA-90AD-209F39C04150}"/>
+              </a:ext>
+              <a:ext uri="{C183D7F6-B498-43B3-948B-1728B52AA6E4}">
+                <adec:decorative xmlns:adec="http://schemas.microsoft.com/office/drawing/2017/decorative" val="1"/>
+              </a:ext>
+            </a:extLst>
+          </p:cNvPr>
+          <p:cNvCxnSpPr>
+            <a:cxnSpLocks noGrp="1" noRot="1" noChangeAspect="1" noMove="1" noResize="1" noEditPoints="1" noAdjustHandles="1" noChangeArrowheads="1" noChangeShapeType="1"/>
+          </p:cNvCxnSpPr>
+          <p:nvPr>
+            <p:extLst>
+              <p:ext uri="{386F3935-93C4-4BCD-93E2-E3B085C9AB24}">
+                <p16:designElem xmlns:p16="http://schemas.microsoft.com/office/powerpoint/2015/main" val="1"/>
+              </p:ext>
+            </p:extLst>
+          </p:nvPr>
+        </p:nvCxnSpPr>
+        <p:spPr>
+          <a:xfrm>
+            <a:off x="4654296" y="1791298"/>
+            <a:ext cx="0" cy="2743200"/>
+          </a:xfrm>
+          <a:prstGeom prst="line">
+            <a:avLst/>
+          </a:prstGeom>
+          <a:ln w="12700">
+            <a:solidFill>
+              <a:schemeClr val="tx1">
+                <a:lumMod val="50000"/>
+                <a:lumOff val="50000"/>
+              </a:schemeClr>
+            </a:solidFill>
+          </a:ln>
+        </p:spPr>
+        <p:style>
+          <a:lnRef idx="1">
+            <a:schemeClr val="accent1"/>
+          </a:lnRef>
+          <a:fillRef idx="0">
+            <a:schemeClr val="accent1"/>
+          </a:fillRef>
+          <a:effectRef idx="0">
+            <a:schemeClr val="accent1"/>
+          </a:effectRef>
+          <a:fontRef idx="minor">
+            <a:schemeClr val="tx1"/>
+          </a:fontRef>
+        </p:style>
+      </p:cxnSp>
+      <p:sp>
+        <p:nvSpPr>
+          <p:cNvPr id="32" name="Rectangle 31">
+            <a:extLst>
+              <a:ext uri="{FF2B5EF4-FFF2-40B4-BE49-F238E27FC236}">
+                <a16:creationId xmlns:a16="http://schemas.microsoft.com/office/drawing/2014/main" id="{DFC4168B-AA75-4715-9B96-CF84B170A68B}"/>
               </a:ext>
               <a:ext uri="{C183D7F6-B498-43B3-948B-1728B52AA6E4}">
                 <adec:decorative xmlns:adec="http://schemas.microsoft.com/office/drawing/2017/decorative" val="1"/>
@@ -5522,8 +9236,8 @@
         </p:nvSpPr>
         <p:spPr>
           <a:xfrm>
-            <a:off x="16" y="0"/>
-            <a:ext cx="4648593" cy="6858000"/>
+            <a:off x="0" y="6400800"/>
+            <a:ext cx="12192000" cy="457200"/>
           </a:xfrm>
           <a:prstGeom prst="rect">
             <a:avLst/>
@@ -5552,12 +9266,274 @@
           </a:fontRef>
         </p:style>
       </p:sp>
+      <p:graphicFrame>
+        <p:nvGraphicFramePr>
+          <p:cNvPr id="24" name="Segnaposto contenuto 2">
+            <a:extLst>
+              <a:ext uri="{FF2B5EF4-FFF2-40B4-BE49-F238E27FC236}">
+                <a16:creationId xmlns:a16="http://schemas.microsoft.com/office/drawing/2014/main" id="{2CD246EE-7747-4EF1-9CA4-B0B685755EEC}"/>
+              </a:ext>
+            </a:extLst>
+          </p:cNvPr>
+          <p:cNvGraphicFramePr>
+            <a:graphicFrameLocks noGrp="1"/>
+          </p:cNvGraphicFramePr>
+          <p:nvPr>
+            <p:ph idx="1"/>
+            <p:extLst>
+              <p:ext uri="{D42A27DB-BD31-4B8C-83A1-F6EECF244321}">
+                <p14:modId xmlns:p14="http://schemas.microsoft.com/office/powerpoint/2010/main" val="2033075240"/>
+              </p:ext>
+            </p:extLst>
+          </p:nvPr>
+        </p:nvGraphicFramePr>
+        <p:xfrm>
+          <a:off x="4976031" y="634947"/>
+          <a:ext cx="6582555" cy="5121798"/>
+        </p:xfrm>
+        <a:graphic>
+          <a:graphicData uri="http://schemas.openxmlformats.org/drawingml/2006/diagram">
+            <dgm:relIds xmlns:dgm="http://schemas.openxmlformats.org/drawingml/2006/diagram" xmlns:r="http://schemas.openxmlformats.org/officeDocument/2006/relationships" r:dm="rId2" r:lo="rId3" r:qs="rId4" r:cs="rId5"/>
+          </a:graphicData>
+        </a:graphic>
+      </p:graphicFrame>
+    </p:spTree>
+    <p:extLst>
+      <p:ext uri="{BB962C8B-B14F-4D97-AF65-F5344CB8AC3E}">
+        <p14:creationId xmlns:p14="http://schemas.microsoft.com/office/powerpoint/2010/main" val="4225200906"/>
+      </p:ext>
+    </p:extLst>
+  </p:cSld>
+  <p:clrMapOvr>
+    <a:masterClrMapping/>
+  </p:clrMapOvr>
+</p:sld>
+</file>
+
+<file path=ppt/slides/slide7.xml><?xml version="1.0" encoding="utf-8"?>
+<p:sld xmlns:a="http://schemas.openxmlformats.org/drawingml/2006/main" xmlns:r="http://schemas.openxmlformats.org/officeDocument/2006/relationships" xmlns:p="http://schemas.openxmlformats.org/presentationml/2006/main">
+  <p:cSld>
+    <p:bg>
+      <p:bgPr>
+        <a:gradFill rotWithShape="1">
+          <a:gsLst>
+            <a:gs pos="0">
+              <a:schemeClr val="bg1">
+                <a:tint val="96000"/>
+                <a:shade val="99000"/>
+                <a:satMod val="140000"/>
+              </a:schemeClr>
+            </a:gs>
+            <a:gs pos="65000">
+              <a:schemeClr val="bg1">
+                <a:tint val="100000"/>
+                <a:shade val="80000"/>
+                <a:satMod val="130000"/>
+              </a:schemeClr>
+            </a:gs>
+            <a:gs pos="100000">
+              <a:schemeClr val="bg1">
+                <a:tint val="100000"/>
+                <a:shade val="48000"/>
+                <a:satMod val="120000"/>
+              </a:schemeClr>
+            </a:gs>
+          </a:gsLst>
+          <a:lin ang="16200000" scaled="0"/>
+        </a:gradFill>
+        <a:effectLst/>
+      </p:bgPr>
+    </p:bg>
+    <p:spTree>
+      <p:nvGrpSpPr>
+        <p:cNvPr id="1" name=""/>
+        <p:cNvGrpSpPr/>
+        <p:nvPr/>
+      </p:nvGrpSpPr>
+      <p:grpSpPr>
+        <a:xfrm>
+          <a:off x="0" y="0"/>
+          <a:ext cx="0" cy="0"/>
+          <a:chOff x="0" y="0"/>
+          <a:chExt cx="0" cy="0"/>
+        </a:xfrm>
+      </p:grpSpPr>
+      <p:sp>
+        <p:nvSpPr>
+          <p:cNvPr id="8" name="Rectangle 7">
+            <a:extLst>
+              <a:ext uri="{FF2B5EF4-FFF2-40B4-BE49-F238E27FC236}">
+                <a16:creationId xmlns:a16="http://schemas.microsoft.com/office/drawing/2014/main" id="{39E3965E-AC41-4711-9D10-E25ABB132D86}"/>
+              </a:ext>
+              <a:ext uri="{C183D7F6-B498-43B3-948B-1728B52AA6E4}">
+                <adec:decorative xmlns:adec="http://schemas.microsoft.com/office/drawing/2017/decorative" val="1"/>
+              </a:ext>
+            </a:extLst>
+          </p:cNvPr>
+          <p:cNvSpPr>
+            <a:spLocks noGrp="1" noRot="1" noChangeAspect="1" noMove="1" noResize="1" noEditPoints="1" noAdjustHandles="1" noChangeArrowheads="1" noChangeShapeType="1" noTextEdit="1"/>
+          </p:cNvSpPr>
+          <p:nvPr>
+            <p:extLst>
+              <p:ext uri="{386F3935-93C4-4BCD-93E2-E3B085C9AB24}">
+                <p16:designElem xmlns:p16="http://schemas.microsoft.com/office/powerpoint/2015/main" val="1"/>
+              </p:ext>
+            </p:extLst>
+          </p:nvPr>
+        </p:nvSpPr>
+        <p:spPr>
+          <a:xfrm>
+            <a:off x="3175" y="6400800"/>
+            <a:ext cx="12188825" cy="457200"/>
+          </a:xfrm>
+          <a:prstGeom prst="rect">
+            <a:avLst/>
+          </a:prstGeom>
+          <a:solidFill>
+            <a:srgbClr val="262626"/>
+          </a:solidFill>
+          <a:ln>
+            <a:noFill/>
+          </a:ln>
+        </p:spPr>
+        <p:style>
+          <a:lnRef idx="2">
+            <a:schemeClr val="accent1">
+              <a:shade val="50000"/>
+            </a:schemeClr>
+          </a:lnRef>
+          <a:fillRef idx="1">
+            <a:schemeClr val="accent1"/>
+          </a:fillRef>
+          <a:effectRef idx="0">
+            <a:schemeClr val="accent1"/>
+          </a:effectRef>
+          <a:fontRef idx="minor">
+            <a:schemeClr val="lt1"/>
+          </a:fontRef>
+        </p:style>
+      </p:sp>
+      <p:cxnSp>
+        <p:nvCxnSpPr>
+          <p:cNvPr id="10" name="Straight Connector 9">
+            <a:extLst>
+              <a:ext uri="{FF2B5EF4-FFF2-40B4-BE49-F238E27FC236}">
+                <a16:creationId xmlns:a16="http://schemas.microsoft.com/office/drawing/2014/main" id="{1F5DC8C3-BA5F-4EED-BB9A-A14272BD82A1}"/>
+              </a:ext>
+              <a:ext uri="{C183D7F6-B498-43B3-948B-1728B52AA6E4}">
+                <adec:decorative xmlns:adec="http://schemas.microsoft.com/office/drawing/2017/decorative" val="1"/>
+              </a:ext>
+            </a:extLst>
+          </p:cNvPr>
+          <p:cNvCxnSpPr>
+            <a:cxnSpLocks noGrp="1" noRot="1" noChangeAspect="1" noMove="1" noResize="1" noEditPoints="1" noAdjustHandles="1" noChangeArrowheads="1" noChangeShapeType="1"/>
+          </p:cNvCxnSpPr>
+          <p:nvPr>
+            <p:extLst>
+              <p:ext uri="{386F3935-93C4-4BCD-93E2-E3B085C9AB24}">
+                <p16:designElem xmlns:p16="http://schemas.microsoft.com/office/powerpoint/2015/main" val="1"/>
+              </p:ext>
+            </p:extLst>
+          </p:nvPr>
+        </p:nvCxnSpPr>
+        <p:spPr>
+          <a:xfrm>
+            <a:off x="1207658" y="4474741"/>
+            <a:ext cx="9875520" cy="0"/>
+          </a:xfrm>
+          <a:prstGeom prst="line">
+            <a:avLst/>
+          </a:prstGeom>
+          <a:ln w="12700">
+            <a:solidFill>
+              <a:schemeClr val="tx1">
+                <a:lumMod val="75000"/>
+                <a:lumOff val="25000"/>
+              </a:schemeClr>
+            </a:solidFill>
+          </a:ln>
+        </p:spPr>
+        <p:style>
+          <a:lnRef idx="1">
+            <a:schemeClr val="accent1"/>
+          </a:lnRef>
+          <a:fillRef idx="0">
+            <a:schemeClr val="accent1"/>
+          </a:fillRef>
+          <a:effectRef idx="0">
+            <a:schemeClr val="accent1"/>
+          </a:effectRef>
+          <a:fontRef idx="minor">
+            <a:schemeClr val="tx1"/>
+          </a:fontRef>
+        </p:style>
+      </p:cxnSp>
+      <p:sp useBgFill="1">
+        <p:nvSpPr>
+          <p:cNvPr id="12" name="Rectangle 11">
+            <a:extLst>
+              <a:ext uri="{FF2B5EF4-FFF2-40B4-BE49-F238E27FC236}">
+                <a16:creationId xmlns:a16="http://schemas.microsoft.com/office/drawing/2014/main" id="{8C6E698C-8155-4B8B-BDC9-B7299772B509}"/>
+              </a:ext>
+              <a:ext uri="{C183D7F6-B498-43B3-948B-1728B52AA6E4}">
+                <adec:decorative xmlns:adec="http://schemas.microsoft.com/office/drawing/2017/decorative" val="1"/>
+              </a:ext>
+            </a:extLst>
+          </p:cNvPr>
+          <p:cNvSpPr>
+            <a:spLocks noGrp="1" noRot="1" noChangeAspect="1" noMove="1" noResize="1" noEditPoints="1" noAdjustHandles="1" noChangeArrowheads="1" noChangeShapeType="1" noTextEdit="1"/>
+          </p:cNvSpPr>
+          <p:nvPr>
+            <p:extLst>
+              <p:ext uri="{386F3935-93C4-4BCD-93E2-E3B085C9AB24}">
+                <p16:designElem xmlns:p16="http://schemas.microsoft.com/office/powerpoint/2015/main" val="1"/>
+              </p:ext>
+            </p:extLst>
+          </p:nvPr>
+        </p:nvSpPr>
+        <p:spPr>
+          <a:xfrm>
+            <a:off x="0" y="0"/>
+            <a:ext cx="12188952" cy="6858000"/>
+          </a:xfrm>
+          <a:prstGeom prst="rect">
+            <a:avLst/>
+          </a:prstGeom>
+          <a:ln>
+            <a:noFill/>
+          </a:ln>
+        </p:spPr>
+        <p:style>
+          <a:lnRef idx="2">
+            <a:schemeClr val="accent1">
+              <a:shade val="50000"/>
+            </a:schemeClr>
+          </a:lnRef>
+          <a:fillRef idx="1">
+            <a:schemeClr val="accent1"/>
+          </a:fillRef>
+          <a:effectRef idx="0">
+            <a:schemeClr val="accent1"/>
+          </a:effectRef>
+          <a:fontRef idx="minor">
+            <a:schemeClr val="lt1"/>
+          </a:fontRef>
+        </p:style>
+        <p:txBody>
+          <a:bodyPr rtlCol="0" anchor="ctr"/>
+          <a:lstStyle/>
+          <a:p>
+            <a:pPr algn="ctr"/>
+            <a:endParaRPr lang="en-US"/>
+          </a:p>
+        </p:txBody>
+      </p:sp>
       <p:sp>
         <p:nvSpPr>
           <p:cNvPr id="2" name="Titolo 1">
             <a:extLst>
               <a:ext uri="{FF2B5EF4-FFF2-40B4-BE49-F238E27FC236}">
-                <a16:creationId xmlns:a16="http://schemas.microsoft.com/office/drawing/2014/main" id="{15EBAE22-2721-4510-A214-F84D4F6DF0C0}"/>
+                <a16:creationId xmlns:a16="http://schemas.microsoft.com/office/drawing/2014/main" id="{139986AA-69FB-42B1-8A0F-1FE4214EDAD3}"/>
               </a:ext>
             </a:extLst>
           </p:cNvPr>
@@ -5570,24 +9546,193 @@
         </p:nvSpPr>
         <p:spPr>
           <a:xfrm>
-            <a:off x="492369" y="605896"/>
-            <a:ext cx="3642309" cy="5646208"/>
+            <a:off x="965201" y="643467"/>
+            <a:ext cx="6255026" cy="5054008"/>
           </a:xfrm>
         </p:spPr>
         <p:txBody>
-          <a:bodyPr anchor="ctr">
+          <a:bodyPr vert="horz" lIns="91440" tIns="45720" rIns="91440" bIns="45720" rtlCol="0" anchor="ctr">
             <a:normAutofit/>
           </a:bodyPr>
           <a:lstStyle/>
           <a:p>
+            <a:pPr algn="r"/>
             <a:r>
-              <a:rPr lang="it-IT" sz="4400" dirty="0">
+              <a:rPr lang="en-US" sz="8000">
                 <a:solidFill>
-                  <a:srgbClr val="FFFFFF"/>
+                  <a:schemeClr val="tx1">
+                    <a:lumMod val="85000"/>
+                    <a:lumOff val="15000"/>
+                  </a:schemeClr>
                 </a:solidFill>
               </a:rPr>
-              <a:t>CRITICITA’</a:t>
+              <a:t>Parte 2</a:t>
             </a:r>
+          </a:p>
+        </p:txBody>
+      </p:sp>
+      <p:cxnSp>
+        <p:nvCxnSpPr>
+          <p:cNvPr id="14" name="Straight Connector 13">
+            <a:extLst>
+              <a:ext uri="{FF2B5EF4-FFF2-40B4-BE49-F238E27FC236}">
+                <a16:creationId xmlns:a16="http://schemas.microsoft.com/office/drawing/2014/main" id="{09525C9A-1972-4836-BA7A-706C946EF4DA}"/>
+              </a:ext>
+              <a:ext uri="{C183D7F6-B498-43B3-948B-1728B52AA6E4}">
+                <adec:decorative xmlns:adec="http://schemas.microsoft.com/office/drawing/2017/decorative" val="1"/>
+              </a:ext>
+            </a:extLst>
+          </p:cNvPr>
+          <p:cNvCxnSpPr>
+            <a:cxnSpLocks noGrp="1" noRot="1" noChangeAspect="1" noMove="1" noResize="1" noEditPoints="1" noAdjustHandles="1" noChangeArrowheads="1" noChangeShapeType="1"/>
+          </p:cNvCxnSpPr>
+          <p:nvPr>
+            <p:extLst>
+              <p:ext uri="{386F3935-93C4-4BCD-93E2-E3B085C9AB24}">
+                <p16:designElem xmlns:p16="http://schemas.microsoft.com/office/powerpoint/2015/main" val="1"/>
+              </p:ext>
+            </p:extLst>
+          </p:nvPr>
+        </p:nvCxnSpPr>
+        <p:spPr>
+          <a:xfrm>
+            <a:off x="7534656" y="1391367"/>
+            <a:ext cx="0" cy="3558208"/>
+          </a:xfrm>
+          <a:prstGeom prst="line">
+            <a:avLst/>
+          </a:prstGeom>
+          <a:ln>
+            <a:solidFill>
+              <a:schemeClr val="tx1">
+                <a:lumMod val="75000"/>
+                <a:lumOff val="25000"/>
+              </a:schemeClr>
+            </a:solidFill>
+          </a:ln>
+        </p:spPr>
+        <p:style>
+          <a:lnRef idx="1">
+            <a:schemeClr val="accent1"/>
+          </a:lnRef>
+          <a:fillRef idx="0">
+            <a:schemeClr val="accent1"/>
+          </a:fillRef>
+          <a:effectRef idx="0">
+            <a:schemeClr val="accent1"/>
+          </a:effectRef>
+          <a:fontRef idx="minor">
+            <a:schemeClr val="tx1"/>
+          </a:fontRef>
+        </p:style>
+      </p:cxnSp>
+      <p:sp>
+        <p:nvSpPr>
+          <p:cNvPr id="16" name="Rectangle 15">
+            <a:extLst>
+              <a:ext uri="{FF2B5EF4-FFF2-40B4-BE49-F238E27FC236}">
+                <a16:creationId xmlns:a16="http://schemas.microsoft.com/office/drawing/2014/main" id="{B624C8D3-B9AD-4F4F-8554-4EAF3724DBCE}"/>
+              </a:ext>
+              <a:ext uri="{C183D7F6-B498-43B3-948B-1728B52AA6E4}">
+                <adec:decorative xmlns:adec="http://schemas.microsoft.com/office/drawing/2017/decorative" val="1"/>
+              </a:ext>
+            </a:extLst>
+          </p:cNvPr>
+          <p:cNvSpPr>
+            <a:spLocks noGrp="1" noRot="1" noChangeAspect="1" noMove="1" noResize="1" noEditPoints="1" noAdjustHandles="1" noChangeArrowheads="1" noChangeShapeType="1" noTextEdit="1"/>
+          </p:cNvSpPr>
+          <p:nvPr>
+            <p:extLst>
+              <p:ext uri="{386F3935-93C4-4BCD-93E2-E3B085C9AB24}">
+                <p16:designElem xmlns:p16="http://schemas.microsoft.com/office/powerpoint/2015/main" val="1"/>
+              </p:ext>
+            </p:extLst>
+          </p:nvPr>
+        </p:nvSpPr>
+        <p:spPr>
+          <a:xfrm>
+            <a:off x="3175" y="6400800"/>
+            <a:ext cx="12188825" cy="457200"/>
+          </a:xfrm>
+          <a:prstGeom prst="rect">
+            <a:avLst/>
+          </a:prstGeom>
+          <a:solidFill>
+            <a:srgbClr val="262626"/>
+          </a:solidFill>
+          <a:ln>
+            <a:noFill/>
+          </a:ln>
+        </p:spPr>
+        <p:style>
+          <a:lnRef idx="2">
+            <a:schemeClr val="accent1">
+              <a:shade val="50000"/>
+            </a:schemeClr>
+          </a:lnRef>
+          <a:fillRef idx="1">
+            <a:schemeClr val="accent1"/>
+          </a:fillRef>
+          <a:effectRef idx="0">
+            <a:schemeClr val="accent1"/>
+          </a:effectRef>
+          <a:fontRef idx="minor">
+            <a:schemeClr val="lt1"/>
+          </a:fontRef>
+        </p:style>
+      </p:sp>
+    </p:spTree>
+    <p:extLst>
+      <p:ext uri="{BB962C8B-B14F-4D97-AF65-F5344CB8AC3E}">
+        <p14:creationId xmlns:p14="http://schemas.microsoft.com/office/powerpoint/2010/main" val="793699661"/>
+      </p:ext>
+    </p:extLst>
+  </p:cSld>
+  <p:clrMapOvr>
+    <a:overrideClrMapping bg1="dk1" tx1="lt1" bg2="dk2" tx2="lt2" accent1="accent1" accent2="accent2" accent3="accent3" accent4="accent4" accent5="accent5" accent6="accent6" hlink="hlink" folHlink="folHlink"/>
+  </p:clrMapOvr>
+</p:sld>
+</file>
+
+<file path=ppt/slides/slide8.xml><?xml version="1.0" encoding="utf-8"?>
+<p:sld xmlns:a="http://schemas.openxmlformats.org/drawingml/2006/main" xmlns:r="http://schemas.openxmlformats.org/officeDocument/2006/relationships" xmlns:p="http://schemas.openxmlformats.org/presentationml/2006/main">
+  <p:cSld>
+    <p:spTree>
+      <p:nvGrpSpPr>
+        <p:cNvPr id="1" name=""/>
+        <p:cNvGrpSpPr/>
+        <p:nvPr/>
+      </p:nvGrpSpPr>
+      <p:grpSpPr>
+        <a:xfrm>
+          <a:off x="0" y="0"/>
+          <a:ext cx="0" cy="0"/>
+          <a:chOff x="0" y="0"/>
+          <a:chExt cx="0" cy="0"/>
+        </a:xfrm>
+      </p:grpSpPr>
+      <p:sp>
+        <p:nvSpPr>
+          <p:cNvPr id="2" name="Titolo 1">
+            <a:extLst>
+              <a:ext uri="{FF2B5EF4-FFF2-40B4-BE49-F238E27FC236}">
+                <a16:creationId xmlns:a16="http://schemas.microsoft.com/office/drawing/2014/main" id="{F2F73469-22AB-40F1-BD5B-11F19203692B}"/>
+              </a:ext>
+            </a:extLst>
+          </p:cNvPr>
+          <p:cNvSpPr>
+            <a:spLocks noGrp="1"/>
+          </p:cNvSpPr>
+          <p:nvPr>
+            <p:ph type="title"/>
+          </p:nvPr>
+        </p:nvSpPr>
+        <p:spPr/>
+        <p:txBody>
+          <a:bodyPr/>
+          <a:lstStyle/>
+          <a:p>
+            <a:endParaRPr lang="it-IT"/>
           </a:p>
         </p:txBody>
       </p:sp>
@@ -5596,7 +9741,7 @@
           <p:cNvPr id="3" name="Segnaposto contenuto 2">
             <a:extLst>
               <a:ext uri="{FF2B5EF4-FFF2-40B4-BE49-F238E27FC236}">
-                <a16:creationId xmlns:a16="http://schemas.microsoft.com/office/drawing/2014/main" id="{826147A8-DF90-4366-B15E-EB61450D5B0C}"/>
+                <a16:creationId xmlns:a16="http://schemas.microsoft.com/office/drawing/2014/main" id="{F57F47D5-D61A-400A-BEF7-72402396984C}"/>
               </a:ext>
             </a:extLst>
           </p:cNvPr>
@@ -5607,80 +9752,19 @@
             <p:ph idx="1"/>
           </p:nvPr>
         </p:nvSpPr>
-        <p:spPr>
-          <a:xfrm>
-            <a:off x="5231958" y="605896"/>
-            <a:ext cx="5923721" cy="5646208"/>
-          </a:xfrm>
-        </p:spPr>
+        <p:spPr/>
         <p:txBody>
-          <a:bodyPr anchor="ctr">
-            <a:normAutofit/>
-          </a:bodyPr>
+          <a:bodyPr/>
           <a:lstStyle/>
           <a:p>
-            <a:pPr>
-              <a:buFont typeface="Courier New" panose="02070309020205020404" pitchFamily="49" charset="0"/>
-              <a:buChar char="o"/>
-            </a:pPr>
-            <a:r>
-              <a:rPr lang="it-IT" sz="2400" dirty="0"/>
-              <a:t> Alta reattività:</a:t>
-            </a:r>
-          </a:p>
-          <a:p>
-            <a:pPr lvl="1">
-              <a:buFont typeface="Courier New" panose="02070309020205020404" pitchFamily="49" charset="0"/>
-              <a:buChar char="o"/>
-            </a:pPr>
-            <a:r>
-              <a:rPr lang="it-IT" sz="2400" dirty="0"/>
-              <a:t> gestione efficiente degli algoritmi di ricerca</a:t>
-            </a:r>
-          </a:p>
-          <a:p>
-            <a:pPr lvl="1">
-              <a:buFont typeface="Courier New" panose="02070309020205020404" pitchFamily="49" charset="0"/>
-              <a:buChar char="o"/>
-            </a:pPr>
-            <a:r>
-              <a:rPr lang="it-IT" sz="2400" dirty="0"/>
-              <a:t> interazione efficace con il database</a:t>
-            </a:r>
-          </a:p>
-          <a:p>
-            <a:pPr lvl="1">
-              <a:buFont typeface="Courier New" panose="02070309020205020404" pitchFamily="49" charset="0"/>
-              <a:buChar char="o"/>
-            </a:pPr>
-            <a:endParaRPr lang="it-IT" sz="2400" dirty="0"/>
-          </a:p>
-          <a:p>
-            <a:pPr>
-              <a:buFont typeface="Courier New" panose="02070309020205020404" pitchFamily="49" charset="0"/>
-              <a:buChar char="o"/>
-            </a:pPr>
-            <a:r>
-              <a:rPr lang="it-IT" sz="2600" dirty="0"/>
-              <a:t> Interfaccia semplice e intuitiva</a:t>
-            </a:r>
-          </a:p>
-          <a:p>
-            <a:pPr>
-              <a:buFont typeface="Courier New" panose="02070309020205020404" pitchFamily="49" charset="0"/>
-              <a:buChar char="o"/>
-            </a:pPr>
-            <a:r>
-              <a:rPr lang="it-IT" sz="2600" dirty="0"/>
-              <a:t> Necessità di integrare dati aggiornati</a:t>
-            </a:r>
+            <a:endParaRPr lang="it-IT"/>
           </a:p>
         </p:txBody>
       </p:sp>
     </p:spTree>
     <p:extLst>
       <p:ext uri="{BB962C8B-B14F-4D97-AF65-F5344CB8AC3E}">
-        <p14:creationId xmlns:p14="http://schemas.microsoft.com/office/powerpoint/2010/main" val="4225200906"/>
+        <p14:creationId xmlns:p14="http://schemas.microsoft.com/office/powerpoint/2010/main" val="1690679534"/>
       </p:ext>
     </p:extLst>
   </p:cSld>

</xml_diff>